<commit_message>
Some simple presentation slides
</commit_message>
<xml_diff>
--- a/presentation/group_presentation.pptx
+++ b/presentation/group_presentation.pptx
@@ -8,7 +8,9 @@
     <p:sldId id="256" r:id="rId2"/>
     <p:sldId id="257" r:id="rId3"/>
     <p:sldId id="258" r:id="rId4"/>
-    <p:sldId id="259" r:id="rId5"/>
+    <p:sldId id="260" r:id="rId5"/>
+    <p:sldId id="259" r:id="rId6"/>
+    <p:sldId id="261" r:id="rId7"/>
   </p:sldIdLst>
   <p:sldSz cx="9144000" cy="6858000" type="screen4x3"/>
   <p:notesSz cx="6858000" cy="9144000"/>
@@ -108,8 +110,22 @@
     </a:lvl9pPr>
   </p:defaultTextStyle>
   <p:extLst>
+    <p:ext uri="{521415D9-36F7-43E2-AB2F-B90AF26B5E84}">
+      <p14:sectionLst xmlns:p14="http://schemas.microsoft.com/office/powerpoint/2010/main">
+        <p14:section name="Default Section" id="{F7272B1B-1D7D-F44F-A01C-12D00D596020}">
+          <p14:sldIdLst>
+            <p14:sldId id="256"/>
+            <p14:sldId id="257"/>
+            <p14:sldId id="258"/>
+            <p14:sldId id="260"/>
+            <p14:sldId id="259"/>
+            <p14:sldId id="261"/>
+          </p14:sldIdLst>
+        </p14:section>
+      </p14:sectionLst>
+    </p:ext>
     <p:ext uri="{EFAFB233-063F-42B5-8137-9DF3F51BA10A}">
-      <p15:sldGuideLst xmlns:p15="http://schemas.microsoft.com/office/powerpoint/2012/main" xmlns="">
+      <p15:sldGuideLst xmlns="" xmlns:p15="http://schemas.microsoft.com/office/powerpoint/2012/main">
         <p15:guide id="1" orient="horz" pos="2160">
           <p15:clr>
             <a:srgbClr val="A4A3A4"/>
@@ -314,7 +330,7 @@
           <a:p>
             <a:fld id="{C8A432C8-69A7-458B-9684-2BFA64B31948}" type="datetime2">
               <a:rPr lang="en-US" smtClean="0"/>
-              <a:t>Thursday, 17 May 18</a:t>
+              <a:t>Monday, 21 May 18</a:t>
             </a:fld>
             <a:endParaRPr lang="en-US"/>
           </a:p>
@@ -516,7 +532,7 @@
           <a:p>
             <a:fld id="{8CC057FC-95B6-4D89-AFDA-ABA33EE921E5}" type="datetime2">
               <a:rPr lang="en-US" smtClean="0"/>
-              <a:t>Thursday, 17 May 18</a:t>
+              <a:t>Monday, 21 May 18</a:t>
             </a:fld>
             <a:endParaRPr lang="en-US"/>
           </a:p>
@@ -693,7 +709,7 @@
           <a:p>
             <a:fld id="{EC4549AC-EB31-477F-92A9-B1988E232878}" type="datetime2">
               <a:rPr lang="en-US" smtClean="0"/>
-              <a:t>Thursday, 17 May 18</a:t>
+              <a:t>Monday, 21 May 18</a:t>
             </a:fld>
             <a:endParaRPr lang="en-US"/>
           </a:p>
@@ -860,7 +876,7 @@
           <a:p>
             <a:fld id="{6396A3A3-94A6-4E5B-AF39-173ACA3E61CC}" type="datetime2">
               <a:rPr lang="en-US" smtClean="0"/>
-              <a:t>Thursday, 17 May 18</a:t>
+              <a:t>Monday, 21 May 18</a:t>
             </a:fld>
             <a:endParaRPr lang="en-US"/>
           </a:p>
@@ -1110,7 +1126,7 @@
           <a:p>
             <a:fld id="{9933D019-A32C-4EAD-B8E6-DBDA699692FD}" type="datetime2">
               <a:rPr lang="en-US" smtClean="0"/>
-              <a:t>Thursday, 17 May 18</a:t>
+              <a:t>Monday, 21 May 18</a:t>
             </a:fld>
             <a:endParaRPr lang="en-US"/>
           </a:p>
@@ -1430,7 +1446,7 @@
           <a:p>
             <a:fld id="{CCEBA98F-560C-4997-81C4-81D4D9187EAB}" type="datetime2">
               <a:rPr lang="en-US" smtClean="0"/>
-              <a:t>Thursday, 17 May 18</a:t>
+              <a:t>Monday, 21 May 18</a:t>
             </a:fld>
             <a:endParaRPr lang="en-US"/>
           </a:p>
@@ -1898,7 +1914,7 @@
           <a:p>
             <a:fld id="{150972B2-CA5C-437D-87D0-8081271A9E4B}" type="datetime2">
               <a:rPr lang="en-US" smtClean="0"/>
-              <a:t>Thursday, 17 May 18</a:t>
+              <a:t>Monday, 21 May 18</a:t>
             </a:fld>
             <a:endParaRPr lang="en-US"/>
           </a:p>
@@ -2048,7 +2064,7 @@
           <a:p>
             <a:fld id="{79CD4847-11EF-4466-A8AD-85CDB7B49118}" type="datetime2">
               <a:rPr lang="en-US" smtClean="0"/>
-              <a:t>Thursday, 17 May 18</a:t>
+              <a:t>Monday, 21 May 18</a:t>
             </a:fld>
             <a:endParaRPr lang="en-US"/>
           </a:p>
@@ -2140,7 +2156,7 @@
           <a:p>
             <a:fld id="{F168457A-3AB9-4880-8A0C-9F8524491207}" type="datetime2">
               <a:rPr lang="en-US" smtClean="0"/>
-              <a:t>Thursday, 17 May 18</a:t>
+              <a:t>Monday, 21 May 18</a:t>
             </a:fld>
             <a:endParaRPr lang="en-US"/>
           </a:p>
@@ -2416,7 +2432,7 @@
           <a:p>
             <a:fld id="{3FE976D3-5B7F-4300-ABED-C91F1B2AE209}" type="datetime2">
               <a:rPr lang="en-US" smtClean="0"/>
-              <a:t>Thursday, 17 May 18</a:t>
+              <a:t>Monday, 21 May 18</a:t>
             </a:fld>
             <a:endParaRPr lang="en-US"/>
           </a:p>
@@ -2723,7 +2739,7 @@
           <a:p>
             <a:fld id="{EBDC1E59-17DD-41CE-97CA-624A472382D4}" type="datetime2">
               <a:rPr lang="en-US" smtClean="0"/>
-              <a:t>Thursday, 17 May 18</a:t>
+              <a:t>Monday, 21 May 18</a:t>
             </a:fld>
             <a:endParaRPr lang="en-US"/>
           </a:p>
@@ -3023,7 +3039,7 @@
           <a:p>
             <a:fld id="{A80CB818-7379-467D-8E76-EF9D9074A26C}" type="datetime2">
               <a:rPr lang="en-US" smtClean="0"/>
-              <a:t>Thursday, 17 May 18</a:t>
+              <a:t>Monday, 21 May 18</a:t>
             </a:fld>
             <a:endParaRPr lang="en-US" dirty="0"/>
           </a:p>
@@ -3578,44 +3594,71 @@
           <a:p>
             <a:r>
               <a:rPr lang="en-US" dirty="0" smtClean="0"/>
-              <a:t>Project Background and Motivation</a:t>
-            </a:r>
-            <a:endParaRPr lang="en-US" dirty="0"/>
-          </a:p>
-        </p:txBody>
-      </p:sp>
-      <p:pic>
-        <p:nvPicPr>
-          <p:cNvPr id="4" name="Content Placeholder 3">
-            <a:extLst>
-              <a:ext uri="{FF2B5EF4-FFF2-40B4-BE49-F238E27FC236}">
-                <a16:creationId xmlns:a16="http://schemas.microsoft.com/office/drawing/2014/main" xmlns="" id="{DEF7A5A9-8477-4446-A047-619E4695C61A}"/>
-              </a:ext>
-            </a:extLst>
-          </p:cNvPr>
-          <p:cNvPicPr>
-            <a:picLocks noGrp="1" noChangeAspect="1"/>
-          </p:cNvPicPr>
+              <a:t>Background </a:t>
+            </a:r>
+            <a:r>
+              <a:rPr lang="en-US" dirty="0" smtClean="0"/>
+              <a:t>and Motivation</a:t>
+            </a:r>
+            <a:endParaRPr lang="en-US" dirty="0"/>
+          </a:p>
+        </p:txBody>
+      </p:sp>
+      <p:sp>
+        <p:nvSpPr>
+          <p:cNvPr id="3" name="Content Placeholder 2"/>
+          <p:cNvSpPr>
+            <a:spLocks noGrp="1"/>
+          </p:cNvSpPr>
           <p:nvPr>
             <p:ph idx="1"/>
           </p:nvPr>
-        </p:nvPicPr>
-        <p:blipFill>
-          <a:blip r:embed="rId2"/>
-          <a:stretch>
-            <a:fillRect/>
-          </a:stretch>
-        </p:blipFill>
-        <p:spPr>
-          <a:xfrm>
-            <a:off x="1699709" y="1947131"/>
-            <a:ext cx="5642634" cy="4062697"/>
-          </a:xfrm>
-          <a:prstGeom prst="rect">
-            <a:avLst/>
-          </a:prstGeom>
-        </p:spPr>
-      </p:pic>
+        </p:nvSpPr>
+        <p:spPr/>
+        <p:txBody>
+          <a:bodyPr/>
+          <a:lstStyle/>
+          <a:p>
+            <a:pPr marL="0" indent="0">
+              <a:buNone/>
+            </a:pPr>
+            <a:endParaRPr lang="en-US" dirty="0"/>
+          </a:p>
+          <a:p>
+            <a:r>
+              <a:rPr lang="en-US" dirty="0" smtClean="0"/>
+              <a:t>Best password cracking algorithms based on probability.</a:t>
+            </a:r>
+          </a:p>
+          <a:p>
+            <a:endParaRPr lang="en-US" dirty="0" smtClean="0"/>
+          </a:p>
+          <a:p>
+            <a:endParaRPr lang="en-US" dirty="0" smtClean="0"/>
+          </a:p>
+          <a:p>
+            <a:r>
+              <a:rPr lang="en-US" dirty="0" smtClean="0"/>
+              <a:t>Large dataset provides access to good statistical samples.</a:t>
+            </a:r>
+          </a:p>
+          <a:p>
+            <a:endParaRPr lang="en-US" dirty="0" smtClean="0"/>
+          </a:p>
+          <a:p>
+            <a:endParaRPr lang="en-US" dirty="0"/>
+          </a:p>
+          <a:p>
+            <a:r>
+              <a:rPr lang="en-US" dirty="0" smtClean="0"/>
+              <a:t>Work contributes to other scientific papers and forms of analysis.</a:t>
+            </a:r>
+          </a:p>
+          <a:p>
+            <a:endParaRPr lang="en-US" dirty="0"/>
+          </a:p>
+        </p:txBody>
+      </p:sp>
     </p:spTree>
     <p:extLst>
       <p:ext uri="{BB962C8B-B14F-4D97-AF65-F5344CB8AC3E}">
@@ -3669,38 +3712,428 @@
           </a:p>
         </p:txBody>
       </p:sp>
-      <p:pic>
-        <p:nvPicPr>
-          <p:cNvPr id="4" name="Content Placeholder 3">
-            <a:extLst>
-              <a:ext uri="{FF2B5EF4-FFF2-40B4-BE49-F238E27FC236}">
-                <a16:creationId xmlns:a16="http://schemas.microsoft.com/office/drawing/2014/main" xmlns="" id="{DEF7A5A9-8477-4446-A047-619E4695C61A}"/>
-              </a:ext>
-            </a:extLst>
-          </p:cNvPr>
-          <p:cNvPicPr>
-            <a:picLocks noGrp="1" noChangeAspect="1"/>
-          </p:cNvPicPr>
+      <p:sp>
+        <p:nvSpPr>
+          <p:cNvPr id="3" name="Content Placeholder 2"/>
+          <p:cNvSpPr>
+            <a:spLocks noGrp="1"/>
+          </p:cNvSpPr>
           <p:nvPr>
             <p:ph idx="1"/>
           </p:nvPr>
-        </p:nvPicPr>
-        <p:blipFill>
-          <a:blip r:embed="rId2"/>
-          <a:stretch>
-            <a:fillRect/>
-          </a:stretch>
-        </p:blipFill>
+        </p:nvSpPr>
+        <p:spPr/>
+        <p:txBody>
+          <a:bodyPr/>
+          <a:lstStyle/>
+          <a:p>
+            <a:r>
+              <a:rPr lang="en-US" dirty="0" smtClean="0"/>
+              <a:t>1.4 billion username-password pairs from the </a:t>
+            </a:r>
+            <a:r>
+              <a:rPr lang="en-US" dirty="0" err="1" smtClean="0"/>
+              <a:t>darkweb</a:t>
+            </a:r>
+            <a:r>
+              <a:rPr lang="en-US" dirty="0" smtClean="0"/>
+              <a:t>.</a:t>
+            </a:r>
+            <a:endParaRPr lang="en-US" dirty="0"/>
+          </a:p>
+          <a:p>
+            <a:endParaRPr lang="en-US" dirty="0" smtClean="0"/>
+          </a:p>
+          <a:p>
+            <a:r>
+              <a:rPr lang="en-US" dirty="0" smtClean="0"/>
+              <a:t>Focus on passwords only and reduce by count.</a:t>
+            </a:r>
+          </a:p>
+          <a:p>
+            <a:endParaRPr lang="en-US" dirty="0"/>
+          </a:p>
+          <a:p>
+            <a:r>
+              <a:rPr lang="en-US" dirty="0" smtClean="0"/>
+              <a:t>Split passwords into ‘alpha-strings’, ‘digit-strings’, ‘special-strings’.</a:t>
+            </a:r>
+          </a:p>
+          <a:p>
+            <a:endParaRPr lang="en-US" dirty="0"/>
+          </a:p>
+          <a:p>
+            <a:endParaRPr lang="en-US" dirty="0" smtClean="0"/>
+          </a:p>
+          <a:p>
+            <a:endParaRPr lang="en-US" dirty="0"/>
+          </a:p>
+          <a:p>
+            <a:endParaRPr lang="en-US" dirty="0" smtClean="0"/>
+          </a:p>
+          <a:p>
+            <a:r>
+              <a:rPr lang="en-US" dirty="0" smtClean="0"/>
+              <a:t>Perform various counts and return statistics.</a:t>
+            </a:r>
+            <a:endParaRPr lang="en-US" dirty="0"/>
+          </a:p>
+        </p:txBody>
+      </p:sp>
+      <p:sp>
+        <p:nvSpPr>
+          <p:cNvPr id="5" name="Rectangle 4"/>
+          <p:cNvSpPr/>
+          <p:nvPr/>
+        </p:nvSpPr>
         <p:spPr>
           <a:xfrm>
-            <a:off x="1699709" y="1947131"/>
-            <a:ext cx="5642634" cy="4062697"/>
+            <a:off x="3276151" y="4113423"/>
+            <a:ext cx="2227045" cy="487721"/>
           </a:xfrm>
           <a:prstGeom prst="rect">
             <a:avLst/>
           </a:prstGeom>
+          <a:solidFill>
+            <a:srgbClr val="1F5E12"/>
+          </a:solidFill>
         </p:spPr>
-      </p:pic>
+        <p:style>
+          <a:lnRef idx="1">
+            <a:schemeClr val="accent1"/>
+          </a:lnRef>
+          <a:fillRef idx="3">
+            <a:schemeClr val="accent1"/>
+          </a:fillRef>
+          <a:effectRef idx="2">
+            <a:schemeClr val="accent1"/>
+          </a:effectRef>
+          <a:fontRef idx="minor">
+            <a:schemeClr val="lt1"/>
+          </a:fontRef>
+        </p:style>
+        <p:txBody>
+          <a:bodyPr rtlCol="0" anchor="ctr"/>
+          <a:lstStyle/>
+          <a:p>
+            <a:pPr algn="ctr"/>
+            <a:r>
+              <a:rPr lang="en-US" dirty="0" smtClean="0"/>
+              <a:t>Password123$$A</a:t>
+            </a:r>
+            <a:endParaRPr lang="en-US" dirty="0"/>
+          </a:p>
+        </p:txBody>
+      </p:sp>
+      <p:sp>
+        <p:nvSpPr>
+          <p:cNvPr id="6" name="Rectangle 5"/>
+          <p:cNvSpPr/>
+          <p:nvPr/>
+        </p:nvSpPr>
+        <p:spPr>
+          <a:xfrm>
+            <a:off x="1246407" y="4509680"/>
+            <a:ext cx="1444819" cy="395698"/>
+          </a:xfrm>
+          <a:prstGeom prst="rect">
+            <a:avLst/>
+          </a:prstGeom>
+          <a:solidFill>
+            <a:schemeClr val="tx2">
+              <a:lumMod val="75000"/>
+            </a:schemeClr>
+          </a:solidFill>
+        </p:spPr>
+        <p:style>
+          <a:lnRef idx="1">
+            <a:schemeClr val="accent1"/>
+          </a:lnRef>
+          <a:fillRef idx="3">
+            <a:schemeClr val="accent1"/>
+          </a:fillRef>
+          <a:effectRef idx="2">
+            <a:schemeClr val="accent1"/>
+          </a:effectRef>
+          <a:fontRef idx="minor">
+            <a:schemeClr val="lt1"/>
+          </a:fontRef>
+        </p:style>
+        <p:txBody>
+          <a:bodyPr rtlCol="0" anchor="ctr"/>
+          <a:lstStyle/>
+          <a:p>
+            <a:pPr algn="ctr"/>
+            <a:r>
+              <a:rPr lang="en-US" dirty="0" smtClean="0"/>
+              <a:t>Password</a:t>
+            </a:r>
+            <a:endParaRPr lang="en-US" dirty="0"/>
+          </a:p>
+        </p:txBody>
+      </p:sp>
+      <p:sp>
+        <p:nvSpPr>
+          <p:cNvPr id="7" name="Rectangle 6"/>
+          <p:cNvSpPr/>
+          <p:nvPr/>
+        </p:nvSpPr>
+        <p:spPr>
+          <a:xfrm>
+            <a:off x="2967306" y="5085946"/>
+            <a:ext cx="1233157" cy="395698"/>
+          </a:xfrm>
+          <a:prstGeom prst="rect">
+            <a:avLst/>
+          </a:prstGeom>
+          <a:solidFill>
+            <a:schemeClr val="bg2">
+              <a:lumMod val="25000"/>
+            </a:schemeClr>
+          </a:solidFill>
+        </p:spPr>
+        <p:style>
+          <a:lnRef idx="1">
+            <a:schemeClr val="accent1"/>
+          </a:lnRef>
+          <a:fillRef idx="3">
+            <a:schemeClr val="accent1"/>
+          </a:fillRef>
+          <a:effectRef idx="2">
+            <a:schemeClr val="accent1"/>
+          </a:effectRef>
+          <a:fontRef idx="minor">
+            <a:schemeClr val="lt1"/>
+          </a:fontRef>
+        </p:style>
+        <p:txBody>
+          <a:bodyPr rtlCol="0" anchor="ctr"/>
+          <a:lstStyle/>
+          <a:p>
+            <a:pPr algn="ctr"/>
+            <a:r>
+              <a:rPr lang="en-US" dirty="0" smtClean="0"/>
+              <a:t>123</a:t>
+            </a:r>
+            <a:endParaRPr lang="en-US" dirty="0"/>
+          </a:p>
+        </p:txBody>
+      </p:sp>
+      <p:sp>
+        <p:nvSpPr>
+          <p:cNvPr id="8" name="Rectangle 7"/>
+          <p:cNvSpPr/>
+          <p:nvPr/>
+        </p:nvSpPr>
+        <p:spPr>
+          <a:xfrm>
+            <a:off x="4684159" y="5103227"/>
+            <a:ext cx="1233157" cy="395698"/>
+          </a:xfrm>
+          <a:prstGeom prst="rect">
+            <a:avLst/>
+          </a:prstGeom>
+          <a:solidFill>
+            <a:schemeClr val="accent4">
+              <a:lumMod val="75000"/>
+            </a:schemeClr>
+          </a:solidFill>
+        </p:spPr>
+        <p:style>
+          <a:lnRef idx="1">
+            <a:schemeClr val="accent1"/>
+          </a:lnRef>
+          <a:fillRef idx="3">
+            <a:schemeClr val="accent1"/>
+          </a:fillRef>
+          <a:effectRef idx="2">
+            <a:schemeClr val="accent1"/>
+          </a:effectRef>
+          <a:fontRef idx="minor">
+            <a:schemeClr val="lt1"/>
+          </a:fontRef>
+        </p:style>
+        <p:txBody>
+          <a:bodyPr rtlCol="0" anchor="ctr"/>
+          <a:lstStyle/>
+          <a:p>
+            <a:pPr algn="ctr"/>
+            <a:r>
+              <a:rPr lang="en-US" dirty="0" smtClean="0"/>
+              <a:t>$$</a:t>
+            </a:r>
+            <a:endParaRPr lang="en-US" dirty="0"/>
+          </a:p>
+        </p:txBody>
+      </p:sp>
+      <p:sp>
+        <p:nvSpPr>
+          <p:cNvPr id="9" name="Rectangle 8"/>
+          <p:cNvSpPr/>
+          <p:nvPr/>
+        </p:nvSpPr>
+        <p:spPr>
+          <a:xfrm>
+            <a:off x="6323343" y="4509680"/>
+            <a:ext cx="1233157" cy="395698"/>
+          </a:xfrm>
+          <a:prstGeom prst="rect">
+            <a:avLst/>
+          </a:prstGeom>
+          <a:solidFill>
+            <a:schemeClr val="tx2">
+              <a:lumMod val="75000"/>
+            </a:schemeClr>
+          </a:solidFill>
+        </p:spPr>
+        <p:style>
+          <a:lnRef idx="1">
+            <a:schemeClr val="accent1"/>
+          </a:lnRef>
+          <a:fillRef idx="3">
+            <a:schemeClr val="accent1"/>
+          </a:fillRef>
+          <a:effectRef idx="2">
+            <a:schemeClr val="accent1"/>
+          </a:effectRef>
+          <a:fontRef idx="minor">
+            <a:schemeClr val="lt1"/>
+          </a:fontRef>
+        </p:style>
+        <p:txBody>
+          <a:bodyPr rtlCol="0" anchor="ctr"/>
+          <a:lstStyle/>
+          <a:p>
+            <a:pPr algn="ctr"/>
+            <a:r>
+              <a:rPr lang="en-US" dirty="0"/>
+              <a:t>A</a:t>
+            </a:r>
+          </a:p>
+        </p:txBody>
+      </p:sp>
+      <p:cxnSp>
+        <p:nvCxnSpPr>
+          <p:cNvPr id="11" name="Straight Connector 10"/>
+          <p:cNvCxnSpPr>
+            <a:stCxn id="6" idx="3"/>
+          </p:cNvCxnSpPr>
+          <p:nvPr/>
+        </p:nvCxnSpPr>
+        <p:spPr>
+          <a:xfrm flipV="1">
+            <a:off x="2691226" y="4325072"/>
+            <a:ext cx="584925" cy="382457"/>
+          </a:xfrm>
+          <a:prstGeom prst="line">
+            <a:avLst/>
+          </a:prstGeom>
+        </p:spPr>
+        <p:style>
+          <a:lnRef idx="2">
+            <a:schemeClr val="accent1"/>
+          </a:lnRef>
+          <a:fillRef idx="0">
+            <a:schemeClr val="accent1"/>
+          </a:fillRef>
+          <a:effectRef idx="1">
+            <a:schemeClr val="accent1"/>
+          </a:effectRef>
+          <a:fontRef idx="minor">
+            <a:schemeClr val="tx1"/>
+          </a:fontRef>
+        </p:style>
+      </p:cxnSp>
+      <p:cxnSp>
+        <p:nvCxnSpPr>
+          <p:cNvPr id="12" name="Straight Connector 11"/>
+          <p:cNvCxnSpPr/>
+          <p:nvPr/>
+        </p:nvCxnSpPr>
+        <p:spPr>
+          <a:xfrm flipV="1">
+            <a:off x="3615538" y="4601144"/>
+            <a:ext cx="314001" cy="484803"/>
+          </a:xfrm>
+          <a:prstGeom prst="line">
+            <a:avLst/>
+          </a:prstGeom>
+        </p:spPr>
+        <p:style>
+          <a:lnRef idx="2">
+            <a:schemeClr val="accent1"/>
+          </a:lnRef>
+          <a:fillRef idx="0">
+            <a:schemeClr val="accent1"/>
+          </a:fillRef>
+          <a:effectRef idx="1">
+            <a:schemeClr val="accent1"/>
+          </a:effectRef>
+          <a:fontRef idx="minor">
+            <a:schemeClr val="tx1"/>
+          </a:fontRef>
+        </p:style>
+      </p:cxnSp>
+      <p:cxnSp>
+        <p:nvCxnSpPr>
+          <p:cNvPr id="14" name="Straight Connector 13"/>
+          <p:cNvCxnSpPr/>
+          <p:nvPr/>
+        </p:nvCxnSpPr>
+        <p:spPr>
+          <a:xfrm flipH="1" flipV="1">
+            <a:off x="5057424" y="4601145"/>
+            <a:ext cx="243312" cy="484801"/>
+          </a:xfrm>
+          <a:prstGeom prst="line">
+            <a:avLst/>
+          </a:prstGeom>
+        </p:spPr>
+        <p:style>
+          <a:lnRef idx="2">
+            <a:schemeClr val="accent1"/>
+          </a:lnRef>
+          <a:fillRef idx="0">
+            <a:schemeClr val="accent1"/>
+          </a:fillRef>
+          <a:effectRef idx="1">
+            <a:schemeClr val="accent1"/>
+          </a:effectRef>
+          <a:fontRef idx="minor">
+            <a:schemeClr val="tx1"/>
+          </a:fontRef>
+        </p:style>
+      </p:cxnSp>
+      <p:cxnSp>
+        <p:nvCxnSpPr>
+          <p:cNvPr id="16" name="Straight Connector 15"/>
+          <p:cNvCxnSpPr/>
+          <p:nvPr/>
+        </p:nvCxnSpPr>
+        <p:spPr>
+          <a:xfrm flipH="1" flipV="1">
+            <a:off x="5503196" y="4325073"/>
+            <a:ext cx="820147" cy="382456"/>
+          </a:xfrm>
+          <a:prstGeom prst="line">
+            <a:avLst/>
+          </a:prstGeom>
+        </p:spPr>
+        <p:style>
+          <a:lnRef idx="2">
+            <a:schemeClr val="accent1"/>
+          </a:lnRef>
+          <a:fillRef idx="0">
+            <a:schemeClr val="accent1"/>
+          </a:fillRef>
+          <a:effectRef idx="1">
+            <a:schemeClr val="accent1"/>
+          </a:effectRef>
+          <a:fontRef idx="minor">
+            <a:schemeClr val="tx1"/>
+          </a:fontRef>
+        </p:style>
+      </p:cxnSp>
     </p:spTree>
     <p:extLst>
       <p:ext uri="{BB962C8B-B14F-4D97-AF65-F5344CB8AC3E}">
@@ -3748,48 +4181,227 @@
           <a:p>
             <a:r>
               <a:rPr lang="en-US" dirty="0" smtClean="0"/>
+              <a:t>Methods and Tools</a:t>
+            </a:r>
+            <a:endParaRPr lang="en-US" dirty="0"/>
+          </a:p>
+        </p:txBody>
+      </p:sp>
+      <p:sp>
+        <p:nvSpPr>
+          <p:cNvPr id="3" name="Content Placeholder 2"/>
+          <p:cNvSpPr>
+            <a:spLocks noGrp="1"/>
+          </p:cNvSpPr>
+          <p:nvPr>
+            <p:ph idx="1"/>
+          </p:nvPr>
+        </p:nvSpPr>
+        <p:spPr/>
+        <p:txBody>
+          <a:bodyPr/>
+          <a:lstStyle/>
+          <a:p>
+            <a:r>
+              <a:rPr lang="en-US" dirty="0" smtClean="0"/>
+              <a:t>Apache Spark for data processing on distributed cloud</a:t>
+            </a:r>
+            <a:endParaRPr lang="en-US" dirty="0"/>
+          </a:p>
+          <a:p>
+            <a:endParaRPr lang="en-US" dirty="0" smtClean="0"/>
+          </a:p>
+          <a:p>
+            <a:r>
+              <a:rPr lang="en-US" dirty="0" smtClean="0"/>
+              <a:t>NFS versus HDFS?</a:t>
+            </a:r>
+          </a:p>
+        </p:txBody>
+      </p:sp>
+    </p:spTree>
+    <p:extLst>
+      <p:ext uri="{BB962C8B-B14F-4D97-AF65-F5344CB8AC3E}">
+        <p14:creationId xmlns:p14="http://schemas.microsoft.com/office/powerpoint/2010/main" val="1743501684"/>
+      </p:ext>
+    </p:extLst>
+  </p:cSld>
+  <p:clrMapOvr>
+    <a:masterClrMapping/>
+  </p:clrMapOvr>
+</p:sld>
+</file>
+
+<file path=ppt/slides/slide5.xml><?xml version="1.0" encoding="utf-8"?>
+<p:sld xmlns:a="http://schemas.openxmlformats.org/drawingml/2006/main" xmlns:r="http://schemas.openxmlformats.org/officeDocument/2006/relationships" xmlns:p="http://schemas.openxmlformats.org/presentationml/2006/main">
+  <p:cSld>
+    <p:spTree>
+      <p:nvGrpSpPr>
+        <p:cNvPr id="1" name=""/>
+        <p:cNvGrpSpPr/>
+        <p:nvPr/>
+      </p:nvGrpSpPr>
+      <p:grpSpPr>
+        <a:xfrm>
+          <a:off x="0" y="0"/>
+          <a:ext cx="0" cy="0"/>
+          <a:chOff x="0" y="0"/>
+          <a:chExt cx="0" cy="0"/>
+        </a:xfrm>
+      </p:grpSpPr>
+      <p:sp>
+        <p:nvSpPr>
+          <p:cNvPr id="2" name="Title 1"/>
+          <p:cNvSpPr>
+            <a:spLocks noGrp="1"/>
+          </p:cNvSpPr>
+          <p:nvPr>
+            <p:ph type="title"/>
+          </p:nvPr>
+        </p:nvSpPr>
+        <p:spPr/>
+        <p:txBody>
+          <a:bodyPr/>
+          <a:lstStyle/>
+          <a:p>
+            <a:r>
+              <a:rPr lang="en-US" dirty="0" smtClean="0"/>
               <a:t>Computational Experiments</a:t>
             </a:r>
             <a:endParaRPr lang="en-US" dirty="0"/>
           </a:p>
         </p:txBody>
       </p:sp>
-      <p:pic>
-        <p:nvPicPr>
-          <p:cNvPr id="4" name="Content Placeholder 3">
-            <a:extLst>
-              <a:ext uri="{FF2B5EF4-FFF2-40B4-BE49-F238E27FC236}">
-                <a16:creationId xmlns:a16="http://schemas.microsoft.com/office/drawing/2014/main" xmlns="" id="{DEF7A5A9-8477-4446-A047-619E4695C61A}"/>
-              </a:ext>
-            </a:extLst>
-          </p:cNvPr>
-          <p:cNvPicPr>
-            <a:picLocks noGrp="1" noChangeAspect="1"/>
-          </p:cNvPicPr>
+      <p:sp>
+        <p:nvSpPr>
+          <p:cNvPr id="3" name="Content Placeholder 2"/>
+          <p:cNvSpPr>
+            <a:spLocks noGrp="1"/>
+          </p:cNvSpPr>
           <p:nvPr>
             <p:ph idx="1"/>
           </p:nvPr>
-        </p:nvPicPr>
-        <p:blipFill>
-          <a:blip r:embed="rId2"/>
-          <a:stretch>
-            <a:fillRect/>
-          </a:stretch>
-        </p:blipFill>
-        <p:spPr>
-          <a:xfrm>
-            <a:off x="1699709" y="1947131"/>
-            <a:ext cx="5642634" cy="4062697"/>
-          </a:xfrm>
-          <a:prstGeom prst="rect">
-            <a:avLst/>
-          </a:prstGeom>
-        </p:spPr>
-      </p:pic>
+        </p:nvSpPr>
+        <p:spPr/>
+        <p:txBody>
+          <a:bodyPr/>
+          <a:lstStyle/>
+          <a:p>
+            <a:r>
+              <a:rPr lang="en-US" dirty="0" err="1" smtClean="0"/>
+              <a:t>Filesystem</a:t>
+            </a:r>
+            <a:r>
+              <a:rPr lang="en-US" dirty="0" smtClean="0"/>
+              <a:t> analysis</a:t>
+            </a:r>
+          </a:p>
+          <a:p>
+            <a:endParaRPr lang="en-US" dirty="0"/>
+          </a:p>
+          <a:p>
+            <a:r>
+              <a:rPr lang="en-US" dirty="0" smtClean="0"/>
+              <a:t>Weak tests</a:t>
+            </a:r>
+          </a:p>
+          <a:p>
+            <a:endParaRPr lang="en-US" dirty="0"/>
+          </a:p>
+          <a:p>
+            <a:r>
+              <a:rPr lang="en-US" dirty="0" smtClean="0"/>
+              <a:t>Strong tests</a:t>
+            </a:r>
+          </a:p>
+          <a:p>
+            <a:endParaRPr lang="en-US" dirty="0"/>
+          </a:p>
+          <a:p>
+            <a:endParaRPr lang="en-US" dirty="0"/>
+          </a:p>
+        </p:txBody>
+      </p:sp>
     </p:spTree>
     <p:extLst>
       <p:ext uri="{BB962C8B-B14F-4D97-AF65-F5344CB8AC3E}">
         <p14:creationId xmlns:p14="http://schemas.microsoft.com/office/powerpoint/2010/main" val="3771805064"/>
+      </p:ext>
+    </p:extLst>
+  </p:cSld>
+  <p:clrMapOvr>
+    <a:masterClrMapping/>
+  </p:clrMapOvr>
+</p:sld>
+</file>
+
+<file path=ppt/slides/slide6.xml><?xml version="1.0" encoding="utf-8"?>
+<p:sld xmlns:a="http://schemas.openxmlformats.org/drawingml/2006/main" xmlns:r="http://schemas.openxmlformats.org/officeDocument/2006/relationships" xmlns:p="http://schemas.openxmlformats.org/presentationml/2006/main">
+  <p:cSld>
+    <p:spTree>
+      <p:nvGrpSpPr>
+        <p:cNvPr id="1" name=""/>
+        <p:cNvGrpSpPr/>
+        <p:nvPr/>
+      </p:nvGrpSpPr>
+      <p:grpSpPr>
+        <a:xfrm>
+          <a:off x="0" y="0"/>
+          <a:ext cx="0" cy="0"/>
+          <a:chOff x="0" y="0"/>
+          <a:chExt cx="0" cy="0"/>
+        </a:xfrm>
+      </p:grpSpPr>
+      <p:sp>
+        <p:nvSpPr>
+          <p:cNvPr id="2" name="Title 1"/>
+          <p:cNvSpPr>
+            <a:spLocks noGrp="1"/>
+          </p:cNvSpPr>
+          <p:nvPr>
+            <p:ph type="title"/>
+          </p:nvPr>
+        </p:nvSpPr>
+        <p:spPr/>
+        <p:txBody>
+          <a:bodyPr/>
+          <a:lstStyle/>
+          <a:p>
+            <a:r>
+              <a:rPr lang="en-US" dirty="0" smtClean="0"/>
+              <a:t>Results to Date</a:t>
+            </a:r>
+            <a:endParaRPr lang="en-US" dirty="0"/>
+          </a:p>
+        </p:txBody>
+      </p:sp>
+      <p:sp>
+        <p:nvSpPr>
+          <p:cNvPr id="3" name="Content Placeholder 2"/>
+          <p:cNvSpPr>
+            <a:spLocks noGrp="1"/>
+          </p:cNvSpPr>
+          <p:nvPr>
+            <p:ph idx="1"/>
+          </p:nvPr>
+        </p:nvSpPr>
+        <p:spPr/>
+        <p:txBody>
+          <a:bodyPr/>
+          <a:lstStyle/>
+          <a:p>
+            <a:r>
+              <a:rPr lang="en-US" dirty="0" smtClean="0"/>
+              <a:t>What have we already learned ahead of publication?</a:t>
+            </a:r>
+            <a:endParaRPr lang="en-US" dirty="0"/>
+          </a:p>
+        </p:txBody>
+      </p:sp>
+    </p:spTree>
+    <p:extLst>
+      <p:ext uri="{BB962C8B-B14F-4D97-AF65-F5344CB8AC3E}">
+        <p14:creationId xmlns:p14="http://schemas.microsoft.com/office/powerpoint/2010/main" val="2649591459"/>
       </p:ext>
     </p:extLst>
   </p:cSld>

</xml_diff>

<commit_message>
Add some outline to the presentation
</commit_message>
<xml_diff>
--- a/presentation/group_presentation.pptx
+++ b/presentation/group_presentation.pptx
@@ -8,8 +8,8 @@
     <p:sldId id="256" r:id="rId2"/>
     <p:sldId id="257" r:id="rId3"/>
     <p:sldId id="258" r:id="rId4"/>
-    <p:sldId id="260" r:id="rId5"/>
-    <p:sldId id="259" r:id="rId6"/>
+    <p:sldId id="259" r:id="rId5"/>
+    <p:sldId id="260" r:id="rId6"/>
     <p:sldId id="261" r:id="rId7"/>
   </p:sldIdLst>
   <p:sldSz cx="9144000" cy="6858000" type="screen4x3"/>
@@ -110,22 +110,8 @@
     </a:lvl9pPr>
   </p:defaultTextStyle>
   <p:extLst>
-    <p:ext uri="{521415D9-36F7-43E2-AB2F-B90AF26B5E84}">
-      <p14:sectionLst xmlns:p14="http://schemas.microsoft.com/office/powerpoint/2010/main">
-        <p14:section name="Default Section" id="{F7272B1B-1D7D-F44F-A01C-12D00D596020}">
-          <p14:sldIdLst>
-            <p14:sldId id="256"/>
-            <p14:sldId id="257"/>
-            <p14:sldId id="258"/>
-            <p14:sldId id="260"/>
-            <p14:sldId id="259"/>
-            <p14:sldId id="261"/>
-          </p14:sldIdLst>
-        </p14:section>
-      </p14:sectionLst>
-    </p:ext>
     <p:ext uri="{EFAFB233-063F-42B5-8137-9DF3F51BA10A}">
-      <p15:sldGuideLst xmlns="" xmlns:p15="http://schemas.microsoft.com/office/powerpoint/2012/main">
+      <p15:sldGuideLst xmlns:p15="http://schemas.microsoft.com/office/powerpoint/2012/main">
         <p15:guide id="1" orient="horz" pos="2160">
           <p15:clr>
             <a:srgbClr val="A4A3A4"/>
@@ -330,7 +316,7 @@
           <a:p>
             <a:fld id="{C8A432C8-69A7-458B-9684-2BFA64B31948}" type="datetime2">
               <a:rPr lang="en-US" smtClean="0"/>
-              <a:t>Monday, 21 May 18</a:t>
+              <a:t>Tuesday, May 22, 2018</a:t>
             </a:fld>
             <a:endParaRPr lang="en-US"/>
           </a:p>
@@ -532,7 +518,7 @@
           <a:p>
             <a:fld id="{8CC057FC-95B6-4D89-AFDA-ABA33EE921E5}" type="datetime2">
               <a:rPr lang="en-US" smtClean="0"/>
-              <a:t>Monday, 21 May 18</a:t>
+              <a:t>Tuesday, May 22, 2018</a:t>
             </a:fld>
             <a:endParaRPr lang="en-US"/>
           </a:p>
@@ -709,7 +695,7 @@
           <a:p>
             <a:fld id="{EC4549AC-EB31-477F-92A9-B1988E232878}" type="datetime2">
               <a:rPr lang="en-US" smtClean="0"/>
-              <a:t>Monday, 21 May 18</a:t>
+              <a:t>Tuesday, May 22, 2018</a:t>
             </a:fld>
             <a:endParaRPr lang="en-US"/>
           </a:p>
@@ -876,7 +862,7 @@
           <a:p>
             <a:fld id="{6396A3A3-94A6-4E5B-AF39-173ACA3E61CC}" type="datetime2">
               <a:rPr lang="en-US" smtClean="0"/>
-              <a:t>Monday, 21 May 18</a:t>
+              <a:t>Tuesday, May 22, 2018</a:t>
             </a:fld>
             <a:endParaRPr lang="en-US"/>
           </a:p>
@@ -1126,7 +1112,7 @@
           <a:p>
             <a:fld id="{9933D019-A32C-4EAD-B8E6-DBDA699692FD}" type="datetime2">
               <a:rPr lang="en-US" smtClean="0"/>
-              <a:t>Monday, 21 May 18</a:t>
+              <a:t>Tuesday, May 22, 2018</a:t>
             </a:fld>
             <a:endParaRPr lang="en-US"/>
           </a:p>
@@ -1446,7 +1432,7 @@
           <a:p>
             <a:fld id="{CCEBA98F-560C-4997-81C4-81D4D9187EAB}" type="datetime2">
               <a:rPr lang="en-US" smtClean="0"/>
-              <a:t>Monday, 21 May 18</a:t>
+              <a:t>Tuesday, May 22, 2018</a:t>
             </a:fld>
             <a:endParaRPr lang="en-US"/>
           </a:p>
@@ -1914,7 +1900,7 @@
           <a:p>
             <a:fld id="{150972B2-CA5C-437D-87D0-8081271A9E4B}" type="datetime2">
               <a:rPr lang="en-US" smtClean="0"/>
-              <a:t>Monday, 21 May 18</a:t>
+              <a:t>Tuesday, May 22, 2018</a:t>
             </a:fld>
             <a:endParaRPr lang="en-US"/>
           </a:p>
@@ -2064,7 +2050,7 @@
           <a:p>
             <a:fld id="{79CD4847-11EF-4466-A8AD-85CDB7B49118}" type="datetime2">
               <a:rPr lang="en-US" smtClean="0"/>
-              <a:t>Monday, 21 May 18</a:t>
+              <a:t>Tuesday, May 22, 2018</a:t>
             </a:fld>
             <a:endParaRPr lang="en-US"/>
           </a:p>
@@ -2156,7 +2142,7 @@
           <a:p>
             <a:fld id="{F168457A-3AB9-4880-8A0C-9F8524491207}" type="datetime2">
               <a:rPr lang="en-US" smtClean="0"/>
-              <a:t>Monday, 21 May 18</a:t>
+              <a:t>Tuesday, May 22, 2018</a:t>
             </a:fld>
             <a:endParaRPr lang="en-US"/>
           </a:p>
@@ -2432,7 +2418,7 @@
           <a:p>
             <a:fld id="{3FE976D3-5B7F-4300-ABED-C91F1B2AE209}" type="datetime2">
               <a:rPr lang="en-US" smtClean="0"/>
-              <a:t>Monday, 21 May 18</a:t>
+              <a:t>Tuesday, May 22, 2018</a:t>
             </a:fld>
             <a:endParaRPr lang="en-US"/>
           </a:p>
@@ -2739,7 +2725,7 @@
           <a:p>
             <a:fld id="{EBDC1E59-17DD-41CE-97CA-624A472382D4}" type="datetime2">
               <a:rPr lang="en-US" smtClean="0"/>
-              <a:t>Monday, 21 May 18</a:t>
+              <a:t>Tuesday, May 22, 2018</a:t>
             </a:fld>
             <a:endParaRPr lang="en-US"/>
           </a:p>
@@ -3039,7 +3025,7 @@
           <a:p>
             <a:fld id="{A80CB818-7379-467D-8E76-EF9D9074A26C}" type="datetime2">
               <a:rPr lang="en-US" smtClean="0"/>
-              <a:t>Monday, 21 May 18</a:t>
+              <a:t>Tuesday, May 22, 2018</a:t>
             </a:fld>
             <a:endParaRPr lang="en-US" dirty="0"/>
           </a:p>
@@ -3455,10 +3441,9 @@
           <a:lstStyle/>
           <a:p>
             <a:r>
-              <a:rPr lang="en-US" sz="4000" dirty="0" smtClean="0"/>
+              <a:rPr lang="en-US" sz="4000" dirty="0"/>
               <a:t>Context FREE GRAMMAR ANALYSIS on 1.4 billion passwords with SPARK</a:t>
             </a:r>
-            <a:endParaRPr lang="en-US" sz="4000" dirty="0"/>
           </a:p>
         </p:txBody>
       </p:sp>
@@ -3485,62 +3470,53 @@
           <a:lstStyle/>
           <a:p>
             <a:r>
-              <a:rPr lang="en-GB" dirty="0" smtClean="0"/>
+              <a:rPr lang="en-GB" dirty="0"/>
               <a:t>Presented by:</a:t>
             </a:r>
           </a:p>
           <a:p>
             <a:r>
               <a:rPr lang="en-GB" dirty="0"/>
-              <a:t>	</a:t>
-            </a:r>
-            <a:r>
-              <a:rPr lang="en-GB" dirty="0" smtClean="0"/>
-              <a:t> </a:t>
-            </a:r>
-            <a:r>
-              <a:rPr lang="en-GB" i="1" dirty="0" smtClean="0"/>
+              <a:t>	 </a:t>
+            </a:r>
+            <a:r>
+              <a:rPr lang="en-GB" i="1" dirty="0"/>
               <a:t>[TBD].</a:t>
             </a:r>
-            <a:endParaRPr lang="en-GB" i="1" dirty="0"/>
-          </a:p>
-          <a:p>
-            <a:r>
-              <a:rPr lang="en-GB" dirty="0" smtClean="0"/>
+          </a:p>
+          <a:p>
+            <a:r>
+              <a:rPr lang="en-GB" dirty="0"/>
               <a:t>Contributors: </a:t>
             </a:r>
           </a:p>
           <a:p>
             <a:r>
               <a:rPr lang="en-GB" i="1" dirty="0"/>
-              <a:t>	</a:t>
-            </a:r>
-            <a:r>
-              <a:rPr lang="en-GB" i="1" dirty="0" smtClean="0"/>
-              <a:t>JH Darbyshire, M Al-</a:t>
-            </a:r>
-            <a:r>
-              <a:rPr lang="en-GB" i="1" dirty="0" err="1" smtClean="0"/>
+              <a:t>	JH Darbyshire, M Al-</a:t>
+            </a:r>
+            <a:r>
+              <a:rPr lang="en-GB" i="1" dirty="0" err="1"/>
               <a:t>Jaff</a:t>
             </a:r>
             <a:r>
-              <a:rPr lang="en-GB" i="1" dirty="0" smtClean="0"/>
+              <a:rPr lang="en-GB" i="1" dirty="0"/>
               <a:t>, A </a:t>
             </a:r>
             <a:r>
-              <a:rPr lang="en-GB" i="1" dirty="0" err="1" smtClean="0"/>
+              <a:rPr lang="en-GB" i="1" dirty="0" err="1"/>
               <a:t>Stjerna</a:t>
             </a:r>
             <a:r>
-              <a:rPr lang="en-GB" i="1" dirty="0" smtClean="0"/>
+              <a:rPr lang="en-GB" i="1" dirty="0"/>
               <a:t>, P </a:t>
             </a:r>
             <a:r>
-              <a:rPr lang="en-GB" i="1" dirty="0" err="1" smtClean="0"/>
+              <a:rPr lang="en-GB" i="1" dirty="0" err="1"/>
               <a:t>Hallden</a:t>
             </a:r>
             <a:r>
-              <a:rPr lang="en-GB" i="1" dirty="0" smtClean="0"/>
+              <a:rPr lang="en-GB" i="1" dirty="0"/>
               <a:t> </a:t>
             </a:r>
             <a:endParaRPr lang="en-US" i="1" dirty="0"/>
@@ -3593,20 +3569,21 @@
           <a:lstStyle/>
           <a:p>
             <a:r>
-              <a:rPr lang="en-US" dirty="0" smtClean="0"/>
-              <a:t>Background </a:t>
-            </a:r>
-            <a:r>
-              <a:rPr lang="en-US" dirty="0" smtClean="0"/>
-              <a:t>and Motivation</a:t>
-            </a:r>
-            <a:endParaRPr lang="en-US" dirty="0"/>
-          </a:p>
-        </p:txBody>
-      </p:sp>
-      <p:sp>
-        <p:nvSpPr>
-          <p:cNvPr id="3" name="Content Placeholder 2"/>
+              <a:rPr lang="en-US" dirty="0"/>
+              <a:t>Project Background and Motivation</a:t>
+            </a:r>
+          </a:p>
+        </p:txBody>
+      </p:sp>
+      <p:sp>
+        <p:nvSpPr>
+          <p:cNvPr id="5" name="Content Placeholder 4">
+            <a:extLst>
+              <a:ext uri="{FF2B5EF4-FFF2-40B4-BE49-F238E27FC236}">
+                <a16:creationId xmlns:a16="http://schemas.microsoft.com/office/drawing/2014/main" id="{59F35F09-3D93-6942-9815-83581FE0BF48}"/>
+              </a:ext>
+            </a:extLst>
+          </p:cNvPr>
           <p:cNvSpPr>
             <a:spLocks noGrp="1"/>
           </p:cNvSpPr>
@@ -3619,43 +3596,260 @@
           <a:bodyPr/>
           <a:lstStyle/>
           <a:p>
-            <a:pPr marL="0" indent="0">
+            <a:pPr lvl="1"/>
+            <a:r>
+              <a:rPr lang="sv-SE" dirty="0" err="1"/>
+              <a:t>What</a:t>
+            </a:r>
+            <a:r>
+              <a:rPr lang="sv-SE" dirty="0"/>
+              <a:t> </a:t>
+            </a:r>
+            <a:r>
+              <a:rPr lang="sv-SE" dirty="0" err="1"/>
+              <a:t>analysis</a:t>
+            </a:r>
+            <a:r>
+              <a:rPr lang="sv-SE" dirty="0"/>
+              <a:t> </a:t>
+            </a:r>
+            <a:r>
+              <a:rPr lang="sv-SE" dirty="0" err="1"/>
+              <a:t>have</a:t>
+            </a:r>
+            <a:r>
+              <a:rPr lang="sv-SE" dirty="0"/>
+              <a:t> </a:t>
+            </a:r>
+            <a:r>
+              <a:rPr lang="sv-SE" dirty="0" err="1"/>
+              <a:t>others</a:t>
+            </a:r>
+            <a:r>
+              <a:rPr lang="sv-SE" dirty="0"/>
+              <a:t> </a:t>
+            </a:r>
+            <a:r>
+              <a:rPr lang="sv-SE" dirty="0" err="1"/>
+              <a:t>done</a:t>
+            </a:r>
+            <a:r>
+              <a:rPr lang="sv-SE" dirty="0"/>
+              <a:t> on the </a:t>
+            </a:r>
+            <a:r>
+              <a:rPr lang="sv-SE" dirty="0" err="1"/>
+              <a:t>dataset</a:t>
+            </a:r>
+            <a:r>
+              <a:rPr lang="sv-SE" dirty="0"/>
+              <a:t>?</a:t>
+            </a:r>
+          </a:p>
+          <a:p>
+            <a:pPr lvl="1"/>
+            <a:r>
+              <a:rPr lang="sv-SE" dirty="0" err="1"/>
+              <a:t>What</a:t>
+            </a:r>
+            <a:r>
+              <a:rPr lang="sv-SE" dirty="0"/>
+              <a:t> </a:t>
+            </a:r>
+            <a:r>
+              <a:rPr lang="sv-SE" dirty="0" err="1"/>
+              <a:t>questions</a:t>
+            </a:r>
+            <a:r>
+              <a:rPr lang="sv-SE" dirty="0"/>
+              <a:t> </a:t>
+            </a:r>
+            <a:r>
+              <a:rPr lang="sv-SE" dirty="0" err="1"/>
+              <a:t>are</a:t>
+            </a:r>
+            <a:r>
+              <a:rPr lang="sv-SE" dirty="0"/>
+              <a:t> </a:t>
+            </a:r>
+            <a:r>
+              <a:rPr lang="sv-SE" dirty="0" err="1"/>
+              <a:t>interesting</a:t>
+            </a:r>
+            <a:r>
+              <a:rPr lang="sv-SE" dirty="0"/>
+              <a:t>?</a:t>
+            </a:r>
+          </a:p>
+          <a:p>
+            <a:pPr marL="274320" lvl="1" indent="0">
               <a:buNone/>
             </a:pPr>
-            <a:endParaRPr lang="en-US" dirty="0"/>
-          </a:p>
-          <a:p>
-            <a:r>
-              <a:rPr lang="en-US" dirty="0" smtClean="0"/>
-              <a:t>Best password cracking algorithms based on probability.</a:t>
-            </a:r>
-          </a:p>
-          <a:p>
-            <a:endParaRPr lang="en-US" dirty="0" smtClean="0"/>
-          </a:p>
-          <a:p>
-            <a:endParaRPr lang="en-US" dirty="0" smtClean="0"/>
-          </a:p>
-          <a:p>
-            <a:r>
-              <a:rPr lang="en-US" dirty="0" smtClean="0"/>
-              <a:t>Large dataset provides access to good statistical samples.</a:t>
-            </a:r>
-          </a:p>
-          <a:p>
-            <a:endParaRPr lang="en-US" dirty="0" smtClean="0"/>
-          </a:p>
-          <a:p>
-            <a:endParaRPr lang="en-US" dirty="0"/>
-          </a:p>
-          <a:p>
-            <a:r>
-              <a:rPr lang="en-US" dirty="0" smtClean="0"/>
-              <a:t>Work contributes to other scientific papers and forms of analysis.</a:t>
-            </a:r>
-          </a:p>
-          <a:p>
-            <a:endParaRPr lang="en-US" dirty="0"/>
+            <a:endParaRPr lang="sv-SE" dirty="0"/>
+          </a:p>
+          <a:p>
+            <a:pPr marL="274320" lvl="1" indent="0">
+              <a:buNone/>
+            </a:pPr>
+            <a:r>
+              <a:rPr lang="sv-SE" dirty="0" err="1"/>
+              <a:t>Previous</a:t>
+            </a:r>
+            <a:r>
+              <a:rPr lang="sv-SE" dirty="0"/>
+              <a:t> research:</a:t>
+            </a:r>
+          </a:p>
+          <a:p>
+            <a:pPr lvl="1"/>
+            <a:r>
+              <a:rPr lang="sv-SE" dirty="0" err="1"/>
+              <a:t>Reverse</a:t>
+            </a:r>
+            <a:r>
+              <a:rPr lang="sv-SE" dirty="0"/>
+              <a:t> </a:t>
+            </a:r>
+            <a:r>
+              <a:rPr lang="sv-SE" dirty="0" err="1"/>
+              <a:t>engineer</a:t>
+            </a:r>
+            <a:r>
+              <a:rPr lang="sv-SE" dirty="0"/>
+              <a:t> site </a:t>
+            </a:r>
+            <a:r>
+              <a:rPr lang="sv-SE" dirty="0" err="1"/>
+              <a:t>security</a:t>
+            </a:r>
+            <a:r>
+              <a:rPr lang="sv-SE" dirty="0"/>
+              <a:t> </a:t>
+            </a:r>
+            <a:r>
+              <a:rPr lang="sv-SE" dirty="0" err="1"/>
+              <a:t>practices</a:t>
+            </a:r>
+            <a:endParaRPr lang="sv-SE" dirty="0"/>
+          </a:p>
+          <a:p>
+            <a:pPr lvl="1"/>
+            <a:r>
+              <a:rPr lang="sv-SE" dirty="0" err="1"/>
+              <a:t>Understanding</a:t>
+            </a:r>
+            <a:r>
+              <a:rPr lang="sv-SE" dirty="0"/>
+              <a:t> </a:t>
+            </a:r>
+            <a:r>
+              <a:rPr lang="sv-SE" dirty="0" err="1"/>
+              <a:t>user</a:t>
+            </a:r>
+            <a:r>
+              <a:rPr lang="sv-SE" dirty="0"/>
+              <a:t> </a:t>
+            </a:r>
+            <a:r>
+              <a:rPr lang="sv-SE" dirty="0" err="1"/>
+              <a:t>behaviour</a:t>
+            </a:r>
+            <a:endParaRPr lang="sv-SE" dirty="0"/>
+          </a:p>
+          <a:p>
+            <a:pPr lvl="2"/>
+            <a:r>
+              <a:rPr lang="sv-SE" dirty="0" err="1"/>
+              <a:t>Password</a:t>
+            </a:r>
+            <a:r>
+              <a:rPr lang="sv-SE" dirty="0"/>
+              <a:t> </a:t>
+            </a:r>
+            <a:r>
+              <a:rPr lang="sv-SE" dirty="0" err="1"/>
+              <a:t>reuse</a:t>
+            </a:r>
+            <a:endParaRPr lang="sv-SE" dirty="0"/>
+          </a:p>
+          <a:p>
+            <a:pPr lvl="2"/>
+            <a:r>
+              <a:rPr lang="sv-SE" dirty="0" err="1"/>
+              <a:t>Patterns</a:t>
+            </a:r>
+            <a:r>
+              <a:rPr lang="sv-SE" dirty="0"/>
+              <a:t>, variations, and </a:t>
+            </a:r>
+            <a:r>
+              <a:rPr lang="sv-SE" dirty="0" err="1"/>
+              <a:t>password</a:t>
+            </a:r>
+            <a:r>
+              <a:rPr lang="sv-SE" dirty="0"/>
+              <a:t> </a:t>
+            </a:r>
+            <a:r>
+              <a:rPr lang="sv-SE" dirty="0" err="1"/>
+              <a:t>history</a:t>
+            </a:r>
+            <a:endParaRPr lang="sv-SE" dirty="0"/>
+          </a:p>
+          <a:p>
+            <a:pPr lvl="2"/>
+            <a:r>
+              <a:rPr lang="sv-SE" dirty="0"/>
+              <a:t>Regional </a:t>
+            </a:r>
+            <a:r>
+              <a:rPr lang="sv-SE" dirty="0" err="1"/>
+              <a:t>differences</a:t>
+            </a:r>
+            <a:endParaRPr lang="sv-SE" dirty="0"/>
+          </a:p>
+          <a:p>
+            <a:pPr lvl="1"/>
+            <a:r>
+              <a:rPr lang="sv-SE" dirty="0" err="1"/>
+              <a:t>Training</a:t>
+            </a:r>
+            <a:r>
+              <a:rPr lang="sv-SE" dirty="0"/>
+              <a:t> neural </a:t>
+            </a:r>
+            <a:r>
+              <a:rPr lang="sv-SE" dirty="0" err="1"/>
+              <a:t>networks</a:t>
+            </a:r>
+            <a:r>
+              <a:rPr lang="sv-SE" dirty="0"/>
+              <a:t> to </a:t>
+            </a:r>
+            <a:r>
+              <a:rPr lang="sv-SE" dirty="0" err="1"/>
+              <a:t>evaluate</a:t>
+            </a:r>
+            <a:r>
+              <a:rPr lang="sv-SE" dirty="0"/>
+              <a:t> </a:t>
+            </a:r>
+            <a:r>
+              <a:rPr lang="sv-SE" dirty="0" err="1"/>
+              <a:t>password</a:t>
+            </a:r>
+            <a:r>
+              <a:rPr lang="sv-SE" dirty="0"/>
+              <a:t> </a:t>
+            </a:r>
+            <a:r>
+              <a:rPr lang="sv-SE" dirty="0" err="1"/>
+              <a:t>security</a:t>
+            </a:r>
+            <a:r>
+              <a:rPr lang="sv-SE" dirty="0"/>
+              <a:t> (!)</a:t>
+            </a:r>
           </a:p>
         </p:txBody>
       </p:sp>
@@ -3705,435 +3899,44 @@
           <a:lstStyle/>
           <a:p>
             <a:r>
-              <a:rPr lang="en-US" dirty="0" smtClean="0"/>
+              <a:rPr lang="en-US" dirty="0"/>
               <a:t>Dataset and Operations</a:t>
             </a:r>
-            <a:endParaRPr lang="en-US" dirty="0"/>
-          </a:p>
-        </p:txBody>
-      </p:sp>
-      <p:sp>
-        <p:nvSpPr>
-          <p:cNvPr id="3" name="Content Placeholder 2"/>
-          <p:cNvSpPr>
-            <a:spLocks noGrp="1"/>
-          </p:cNvSpPr>
+          </a:p>
+        </p:txBody>
+      </p:sp>
+      <p:pic>
+        <p:nvPicPr>
+          <p:cNvPr id="4" name="Content Placeholder 3">
+            <a:extLst>
+              <a:ext uri="{FF2B5EF4-FFF2-40B4-BE49-F238E27FC236}">
+                <a16:creationId xmlns:a16="http://schemas.microsoft.com/office/drawing/2014/main" id="{DEF7A5A9-8477-4446-A047-619E4695C61A}"/>
+              </a:ext>
+            </a:extLst>
+          </p:cNvPr>
+          <p:cNvPicPr>
+            <a:picLocks noGrp="1" noChangeAspect="1"/>
+          </p:cNvPicPr>
           <p:nvPr>
             <p:ph idx="1"/>
           </p:nvPr>
-        </p:nvSpPr>
-        <p:spPr/>
-        <p:txBody>
-          <a:bodyPr/>
-          <a:lstStyle/>
-          <a:p>
-            <a:r>
-              <a:rPr lang="en-US" dirty="0" smtClean="0"/>
-              <a:t>1.4 billion username-password pairs from the </a:t>
-            </a:r>
-            <a:r>
-              <a:rPr lang="en-US" dirty="0" err="1" smtClean="0"/>
-              <a:t>darkweb</a:t>
-            </a:r>
-            <a:r>
-              <a:rPr lang="en-US" dirty="0" smtClean="0"/>
-              <a:t>.</a:t>
-            </a:r>
-            <a:endParaRPr lang="en-US" dirty="0"/>
-          </a:p>
-          <a:p>
-            <a:endParaRPr lang="en-US" dirty="0" smtClean="0"/>
-          </a:p>
-          <a:p>
-            <a:r>
-              <a:rPr lang="en-US" dirty="0" smtClean="0"/>
-              <a:t>Focus on passwords only and reduce by count.</a:t>
-            </a:r>
-          </a:p>
-          <a:p>
-            <a:endParaRPr lang="en-US" dirty="0"/>
-          </a:p>
-          <a:p>
-            <a:r>
-              <a:rPr lang="en-US" dirty="0" smtClean="0"/>
-              <a:t>Split passwords into ‘alpha-strings’, ‘digit-strings’, ‘special-strings’.</a:t>
-            </a:r>
-          </a:p>
-          <a:p>
-            <a:endParaRPr lang="en-US" dirty="0"/>
-          </a:p>
-          <a:p>
-            <a:endParaRPr lang="en-US" dirty="0" smtClean="0"/>
-          </a:p>
-          <a:p>
-            <a:endParaRPr lang="en-US" dirty="0"/>
-          </a:p>
-          <a:p>
-            <a:endParaRPr lang="en-US" dirty="0" smtClean="0"/>
-          </a:p>
-          <a:p>
-            <a:r>
-              <a:rPr lang="en-US" dirty="0" smtClean="0"/>
-              <a:t>Perform various counts and return statistics.</a:t>
-            </a:r>
-            <a:endParaRPr lang="en-US" dirty="0"/>
-          </a:p>
-        </p:txBody>
-      </p:sp>
-      <p:sp>
-        <p:nvSpPr>
-          <p:cNvPr id="5" name="Rectangle 4"/>
-          <p:cNvSpPr/>
-          <p:nvPr/>
-        </p:nvSpPr>
+        </p:nvPicPr>
+        <p:blipFill>
+          <a:blip r:embed="rId2"/>
+          <a:stretch>
+            <a:fillRect/>
+          </a:stretch>
+        </p:blipFill>
         <p:spPr>
           <a:xfrm>
-            <a:off x="3276151" y="4113423"/>
-            <a:ext cx="2227045" cy="487721"/>
+            <a:off x="1699709" y="1947131"/>
+            <a:ext cx="5642634" cy="4062697"/>
           </a:xfrm>
           <a:prstGeom prst="rect">
             <a:avLst/>
           </a:prstGeom>
-          <a:solidFill>
-            <a:srgbClr val="1F5E12"/>
-          </a:solidFill>
         </p:spPr>
-        <p:style>
-          <a:lnRef idx="1">
-            <a:schemeClr val="accent1"/>
-          </a:lnRef>
-          <a:fillRef idx="3">
-            <a:schemeClr val="accent1"/>
-          </a:fillRef>
-          <a:effectRef idx="2">
-            <a:schemeClr val="accent1"/>
-          </a:effectRef>
-          <a:fontRef idx="minor">
-            <a:schemeClr val="lt1"/>
-          </a:fontRef>
-        </p:style>
-        <p:txBody>
-          <a:bodyPr rtlCol="0" anchor="ctr"/>
-          <a:lstStyle/>
-          <a:p>
-            <a:pPr algn="ctr"/>
-            <a:r>
-              <a:rPr lang="en-US" dirty="0" smtClean="0"/>
-              <a:t>Password123$$A</a:t>
-            </a:r>
-            <a:endParaRPr lang="en-US" dirty="0"/>
-          </a:p>
-        </p:txBody>
-      </p:sp>
-      <p:sp>
-        <p:nvSpPr>
-          <p:cNvPr id="6" name="Rectangle 5"/>
-          <p:cNvSpPr/>
-          <p:nvPr/>
-        </p:nvSpPr>
-        <p:spPr>
-          <a:xfrm>
-            <a:off x="1246407" y="4509680"/>
-            <a:ext cx="1444819" cy="395698"/>
-          </a:xfrm>
-          <a:prstGeom prst="rect">
-            <a:avLst/>
-          </a:prstGeom>
-          <a:solidFill>
-            <a:schemeClr val="tx2">
-              <a:lumMod val="75000"/>
-            </a:schemeClr>
-          </a:solidFill>
-        </p:spPr>
-        <p:style>
-          <a:lnRef idx="1">
-            <a:schemeClr val="accent1"/>
-          </a:lnRef>
-          <a:fillRef idx="3">
-            <a:schemeClr val="accent1"/>
-          </a:fillRef>
-          <a:effectRef idx="2">
-            <a:schemeClr val="accent1"/>
-          </a:effectRef>
-          <a:fontRef idx="minor">
-            <a:schemeClr val="lt1"/>
-          </a:fontRef>
-        </p:style>
-        <p:txBody>
-          <a:bodyPr rtlCol="0" anchor="ctr"/>
-          <a:lstStyle/>
-          <a:p>
-            <a:pPr algn="ctr"/>
-            <a:r>
-              <a:rPr lang="en-US" dirty="0" smtClean="0"/>
-              <a:t>Password</a:t>
-            </a:r>
-            <a:endParaRPr lang="en-US" dirty="0"/>
-          </a:p>
-        </p:txBody>
-      </p:sp>
-      <p:sp>
-        <p:nvSpPr>
-          <p:cNvPr id="7" name="Rectangle 6"/>
-          <p:cNvSpPr/>
-          <p:nvPr/>
-        </p:nvSpPr>
-        <p:spPr>
-          <a:xfrm>
-            <a:off x="2967306" y="5085946"/>
-            <a:ext cx="1233157" cy="395698"/>
-          </a:xfrm>
-          <a:prstGeom prst="rect">
-            <a:avLst/>
-          </a:prstGeom>
-          <a:solidFill>
-            <a:schemeClr val="bg2">
-              <a:lumMod val="25000"/>
-            </a:schemeClr>
-          </a:solidFill>
-        </p:spPr>
-        <p:style>
-          <a:lnRef idx="1">
-            <a:schemeClr val="accent1"/>
-          </a:lnRef>
-          <a:fillRef idx="3">
-            <a:schemeClr val="accent1"/>
-          </a:fillRef>
-          <a:effectRef idx="2">
-            <a:schemeClr val="accent1"/>
-          </a:effectRef>
-          <a:fontRef idx="minor">
-            <a:schemeClr val="lt1"/>
-          </a:fontRef>
-        </p:style>
-        <p:txBody>
-          <a:bodyPr rtlCol="0" anchor="ctr"/>
-          <a:lstStyle/>
-          <a:p>
-            <a:pPr algn="ctr"/>
-            <a:r>
-              <a:rPr lang="en-US" dirty="0" smtClean="0"/>
-              <a:t>123</a:t>
-            </a:r>
-            <a:endParaRPr lang="en-US" dirty="0"/>
-          </a:p>
-        </p:txBody>
-      </p:sp>
-      <p:sp>
-        <p:nvSpPr>
-          <p:cNvPr id="8" name="Rectangle 7"/>
-          <p:cNvSpPr/>
-          <p:nvPr/>
-        </p:nvSpPr>
-        <p:spPr>
-          <a:xfrm>
-            <a:off x="4684159" y="5103227"/>
-            <a:ext cx="1233157" cy="395698"/>
-          </a:xfrm>
-          <a:prstGeom prst="rect">
-            <a:avLst/>
-          </a:prstGeom>
-          <a:solidFill>
-            <a:schemeClr val="accent4">
-              <a:lumMod val="75000"/>
-            </a:schemeClr>
-          </a:solidFill>
-        </p:spPr>
-        <p:style>
-          <a:lnRef idx="1">
-            <a:schemeClr val="accent1"/>
-          </a:lnRef>
-          <a:fillRef idx="3">
-            <a:schemeClr val="accent1"/>
-          </a:fillRef>
-          <a:effectRef idx="2">
-            <a:schemeClr val="accent1"/>
-          </a:effectRef>
-          <a:fontRef idx="minor">
-            <a:schemeClr val="lt1"/>
-          </a:fontRef>
-        </p:style>
-        <p:txBody>
-          <a:bodyPr rtlCol="0" anchor="ctr"/>
-          <a:lstStyle/>
-          <a:p>
-            <a:pPr algn="ctr"/>
-            <a:r>
-              <a:rPr lang="en-US" dirty="0" smtClean="0"/>
-              <a:t>$$</a:t>
-            </a:r>
-            <a:endParaRPr lang="en-US" dirty="0"/>
-          </a:p>
-        </p:txBody>
-      </p:sp>
-      <p:sp>
-        <p:nvSpPr>
-          <p:cNvPr id="9" name="Rectangle 8"/>
-          <p:cNvSpPr/>
-          <p:nvPr/>
-        </p:nvSpPr>
-        <p:spPr>
-          <a:xfrm>
-            <a:off x="6323343" y="4509680"/>
-            <a:ext cx="1233157" cy="395698"/>
-          </a:xfrm>
-          <a:prstGeom prst="rect">
-            <a:avLst/>
-          </a:prstGeom>
-          <a:solidFill>
-            <a:schemeClr val="tx2">
-              <a:lumMod val="75000"/>
-            </a:schemeClr>
-          </a:solidFill>
-        </p:spPr>
-        <p:style>
-          <a:lnRef idx="1">
-            <a:schemeClr val="accent1"/>
-          </a:lnRef>
-          <a:fillRef idx="3">
-            <a:schemeClr val="accent1"/>
-          </a:fillRef>
-          <a:effectRef idx="2">
-            <a:schemeClr val="accent1"/>
-          </a:effectRef>
-          <a:fontRef idx="minor">
-            <a:schemeClr val="lt1"/>
-          </a:fontRef>
-        </p:style>
-        <p:txBody>
-          <a:bodyPr rtlCol="0" anchor="ctr"/>
-          <a:lstStyle/>
-          <a:p>
-            <a:pPr algn="ctr"/>
-            <a:r>
-              <a:rPr lang="en-US" dirty="0"/>
-              <a:t>A</a:t>
-            </a:r>
-          </a:p>
-        </p:txBody>
-      </p:sp>
-      <p:cxnSp>
-        <p:nvCxnSpPr>
-          <p:cNvPr id="11" name="Straight Connector 10"/>
-          <p:cNvCxnSpPr>
-            <a:stCxn id="6" idx="3"/>
-          </p:cNvCxnSpPr>
-          <p:nvPr/>
-        </p:nvCxnSpPr>
-        <p:spPr>
-          <a:xfrm flipV="1">
-            <a:off x="2691226" y="4325072"/>
-            <a:ext cx="584925" cy="382457"/>
-          </a:xfrm>
-          <a:prstGeom prst="line">
-            <a:avLst/>
-          </a:prstGeom>
-        </p:spPr>
-        <p:style>
-          <a:lnRef idx="2">
-            <a:schemeClr val="accent1"/>
-          </a:lnRef>
-          <a:fillRef idx="0">
-            <a:schemeClr val="accent1"/>
-          </a:fillRef>
-          <a:effectRef idx="1">
-            <a:schemeClr val="accent1"/>
-          </a:effectRef>
-          <a:fontRef idx="minor">
-            <a:schemeClr val="tx1"/>
-          </a:fontRef>
-        </p:style>
-      </p:cxnSp>
-      <p:cxnSp>
-        <p:nvCxnSpPr>
-          <p:cNvPr id="12" name="Straight Connector 11"/>
-          <p:cNvCxnSpPr/>
-          <p:nvPr/>
-        </p:nvCxnSpPr>
-        <p:spPr>
-          <a:xfrm flipV="1">
-            <a:off x="3615538" y="4601144"/>
-            <a:ext cx="314001" cy="484803"/>
-          </a:xfrm>
-          <a:prstGeom prst="line">
-            <a:avLst/>
-          </a:prstGeom>
-        </p:spPr>
-        <p:style>
-          <a:lnRef idx="2">
-            <a:schemeClr val="accent1"/>
-          </a:lnRef>
-          <a:fillRef idx="0">
-            <a:schemeClr val="accent1"/>
-          </a:fillRef>
-          <a:effectRef idx="1">
-            <a:schemeClr val="accent1"/>
-          </a:effectRef>
-          <a:fontRef idx="minor">
-            <a:schemeClr val="tx1"/>
-          </a:fontRef>
-        </p:style>
-      </p:cxnSp>
-      <p:cxnSp>
-        <p:nvCxnSpPr>
-          <p:cNvPr id="14" name="Straight Connector 13"/>
-          <p:cNvCxnSpPr/>
-          <p:nvPr/>
-        </p:nvCxnSpPr>
-        <p:spPr>
-          <a:xfrm flipH="1" flipV="1">
-            <a:off x="5057424" y="4601145"/>
-            <a:ext cx="243312" cy="484801"/>
-          </a:xfrm>
-          <a:prstGeom prst="line">
-            <a:avLst/>
-          </a:prstGeom>
-        </p:spPr>
-        <p:style>
-          <a:lnRef idx="2">
-            <a:schemeClr val="accent1"/>
-          </a:lnRef>
-          <a:fillRef idx="0">
-            <a:schemeClr val="accent1"/>
-          </a:fillRef>
-          <a:effectRef idx="1">
-            <a:schemeClr val="accent1"/>
-          </a:effectRef>
-          <a:fontRef idx="minor">
-            <a:schemeClr val="tx1"/>
-          </a:fontRef>
-        </p:style>
-      </p:cxnSp>
-      <p:cxnSp>
-        <p:nvCxnSpPr>
-          <p:cNvPr id="16" name="Straight Connector 15"/>
-          <p:cNvCxnSpPr/>
-          <p:nvPr/>
-        </p:nvCxnSpPr>
-        <p:spPr>
-          <a:xfrm flipH="1" flipV="1">
-            <a:off x="5503196" y="4325073"/>
-            <a:ext cx="820147" cy="382456"/>
-          </a:xfrm>
-          <a:prstGeom prst="line">
-            <a:avLst/>
-          </a:prstGeom>
-        </p:spPr>
-        <p:style>
-          <a:lnRef idx="2">
-            <a:schemeClr val="accent1"/>
-          </a:lnRef>
-          <a:fillRef idx="0">
-            <a:schemeClr val="accent1"/>
-          </a:fillRef>
-          <a:effectRef idx="1">
-            <a:schemeClr val="accent1"/>
-          </a:effectRef>
-          <a:fontRef idx="minor">
-            <a:schemeClr val="tx1"/>
-          </a:fontRef>
-        </p:style>
-      </p:cxnSp>
+      </p:pic>
     </p:spTree>
     <p:extLst>
       <p:ext uri="{BB962C8B-B14F-4D97-AF65-F5344CB8AC3E}">
@@ -4180,16 +3983,21 @@
           <a:lstStyle/>
           <a:p>
             <a:r>
-              <a:rPr lang="en-US" dirty="0" smtClean="0"/>
-              <a:t>Methods and Tools</a:t>
-            </a:r>
-            <a:endParaRPr lang="en-US" dirty="0"/>
-          </a:p>
-        </p:txBody>
-      </p:sp>
-      <p:sp>
-        <p:nvSpPr>
-          <p:cNvPr id="3" name="Content Placeholder 2"/>
+              <a:rPr lang="en-US" dirty="0"/>
+              <a:t>Computational Experiments</a:t>
+            </a:r>
+          </a:p>
+        </p:txBody>
+      </p:sp>
+      <p:sp>
+        <p:nvSpPr>
+          <p:cNvPr id="5" name="Content Placeholder 4">
+            <a:extLst>
+              <a:ext uri="{FF2B5EF4-FFF2-40B4-BE49-F238E27FC236}">
+                <a16:creationId xmlns:a16="http://schemas.microsoft.com/office/drawing/2014/main" id="{905301C1-B205-E74E-A1BC-348C940E813B}"/>
+              </a:ext>
+            </a:extLst>
+          </p:cNvPr>
           <p:cNvSpPr>
             <a:spLocks noGrp="1"/>
           </p:cNvSpPr>
@@ -4203,26 +4011,214 @@
           <a:lstStyle/>
           <a:p>
             <a:r>
-              <a:rPr lang="en-US" dirty="0" smtClean="0"/>
-              <a:t>Apache Spark for data processing on distributed cloud</a:t>
-            </a:r>
-            <a:endParaRPr lang="en-US" dirty="0"/>
-          </a:p>
-          <a:p>
-            <a:endParaRPr lang="en-US" dirty="0" smtClean="0"/>
-          </a:p>
-          <a:p>
-            <a:r>
-              <a:rPr lang="en-US" dirty="0" smtClean="0"/>
-              <a:t>NFS versus HDFS?</a:t>
-            </a:r>
+              <a:rPr lang="sv-SE" dirty="0" err="1"/>
+              <a:t>Storage</a:t>
+            </a:r>
+            <a:r>
+              <a:rPr lang="sv-SE" dirty="0"/>
+              <a:t>: NFS vs HDFS</a:t>
+            </a:r>
+          </a:p>
+          <a:p>
+            <a:pPr lvl="1"/>
+            <a:r>
+              <a:rPr lang="sv-SE" dirty="0" err="1"/>
+              <a:t>Network</a:t>
+            </a:r>
+            <a:r>
+              <a:rPr lang="sv-SE" dirty="0"/>
+              <a:t> </a:t>
+            </a:r>
+            <a:r>
+              <a:rPr lang="sv-SE" dirty="0" err="1"/>
+              <a:t>characteristics</a:t>
+            </a:r>
+            <a:r>
+              <a:rPr lang="sv-SE" dirty="0"/>
+              <a:t>?</a:t>
+            </a:r>
+          </a:p>
+          <a:p>
+            <a:r>
+              <a:rPr lang="sv-SE" dirty="0" err="1"/>
+              <a:t>Scaling</a:t>
+            </a:r>
+            <a:r>
+              <a:rPr lang="sv-SE" dirty="0"/>
+              <a:t> on the </a:t>
+            </a:r>
+            <a:r>
+              <a:rPr lang="sv-SE" dirty="0" err="1"/>
+              <a:t>dataset</a:t>
+            </a:r>
+            <a:endParaRPr lang="sv-SE" dirty="0"/>
+          </a:p>
+          <a:p>
+            <a:pPr lvl="1"/>
+            <a:r>
+              <a:rPr lang="sv-SE" dirty="0" err="1"/>
+              <a:t>Weak</a:t>
+            </a:r>
+            <a:r>
+              <a:rPr lang="sv-SE" dirty="0"/>
+              <a:t> (</a:t>
+            </a:r>
+            <a:r>
+              <a:rPr lang="sv-SE" dirty="0" err="1"/>
+              <a:t>Dennard</a:t>
+            </a:r>
+            <a:r>
+              <a:rPr lang="sv-SE" dirty="0"/>
+              <a:t>) </a:t>
+            </a:r>
+            <a:r>
+              <a:rPr lang="sv-SE" dirty="0" err="1"/>
+              <a:t>scaling</a:t>
+            </a:r>
+            <a:endParaRPr lang="sv-SE" dirty="0"/>
+          </a:p>
+          <a:p>
+            <a:pPr lvl="1"/>
+            <a:r>
+              <a:rPr lang="sv-SE" dirty="0"/>
+              <a:t>Strong </a:t>
+            </a:r>
+            <a:r>
+              <a:rPr lang="sv-SE" dirty="0" err="1"/>
+              <a:t>scaling</a:t>
+            </a:r>
+            <a:endParaRPr lang="sv-SE" dirty="0"/>
+          </a:p>
+          <a:p>
+            <a:pPr lvl="1"/>
+            <a:endParaRPr lang="sv-SE" dirty="0"/>
+          </a:p>
+          <a:p>
+            <a:r>
+              <a:rPr lang="sv-SE" dirty="0" err="1"/>
+              <a:t>Run</a:t>
+            </a:r>
+            <a:r>
+              <a:rPr lang="sv-SE" dirty="0"/>
+              <a:t> experiments on 1–11 </a:t>
+            </a:r>
+            <a:r>
+              <a:rPr lang="sv-SE" dirty="0" err="1"/>
+              <a:t>nodes</a:t>
+            </a:r>
+            <a:endParaRPr lang="sv-SE" dirty="0"/>
+          </a:p>
+          <a:p>
+            <a:r>
+              <a:rPr lang="sv-SE" dirty="0" err="1"/>
+              <a:t>Variance</a:t>
+            </a:r>
+            <a:r>
+              <a:rPr lang="sv-SE" dirty="0"/>
+              <a:t>: </a:t>
+            </a:r>
+            <a:r>
+              <a:rPr lang="sv-SE" dirty="0" err="1"/>
+              <a:t>how</a:t>
+            </a:r>
+            <a:r>
+              <a:rPr lang="sv-SE" dirty="0"/>
+              <a:t> </a:t>
+            </a:r>
+            <a:r>
+              <a:rPr lang="sv-SE" dirty="0" err="1"/>
+              <a:t>reliable</a:t>
+            </a:r>
+            <a:r>
+              <a:rPr lang="sv-SE" dirty="0"/>
+              <a:t> is </a:t>
+            </a:r>
+            <a:r>
+              <a:rPr lang="sv-SE" dirty="0" err="1"/>
+              <a:t>any</a:t>
+            </a:r>
+            <a:r>
+              <a:rPr lang="sv-SE" dirty="0"/>
+              <a:t> </a:t>
+            </a:r>
+            <a:r>
+              <a:rPr lang="sv-SE" dirty="0" err="1"/>
+              <a:t>one</a:t>
+            </a:r>
+            <a:r>
+              <a:rPr lang="sv-SE" dirty="0"/>
+              <a:t> </a:t>
+            </a:r>
+            <a:r>
+              <a:rPr lang="sv-SE" dirty="0" err="1"/>
+              <a:t>measurement</a:t>
+            </a:r>
+            <a:r>
+              <a:rPr lang="sv-SE" dirty="0"/>
+              <a:t>?</a:t>
+            </a:r>
+          </a:p>
+          <a:p>
+            <a:pPr lvl="1"/>
+            <a:r>
+              <a:rPr lang="sv-SE" dirty="0" err="1"/>
+              <a:t>Can</a:t>
+            </a:r>
+            <a:r>
+              <a:rPr lang="sv-SE" dirty="0"/>
+              <a:t> </a:t>
+            </a:r>
+            <a:r>
+              <a:rPr lang="sv-SE" dirty="0" err="1"/>
+              <a:t>we</a:t>
+            </a:r>
+            <a:r>
+              <a:rPr lang="sv-SE" dirty="0"/>
+              <a:t> trust the </a:t>
+            </a:r>
+            <a:r>
+              <a:rPr lang="sv-SE" dirty="0" err="1"/>
+              <a:t>cloud</a:t>
+            </a:r>
+            <a:r>
+              <a:rPr lang="sv-SE" dirty="0"/>
+              <a:t> </a:t>
+            </a:r>
+            <a:r>
+              <a:rPr lang="sv-SE" dirty="0" err="1"/>
+              <a:t>with</a:t>
+            </a:r>
+            <a:r>
+              <a:rPr lang="sv-SE" dirty="0"/>
+              <a:t> </a:t>
+            </a:r>
+            <a:r>
+              <a:rPr lang="sv-SE" dirty="0" err="1"/>
+              <a:t>performance</a:t>
+            </a:r>
+            <a:r>
+              <a:rPr lang="sv-SE" dirty="0"/>
+              <a:t> </a:t>
+            </a:r>
+            <a:r>
+              <a:rPr lang="sv-SE" dirty="0" err="1"/>
+              <a:t>benchmarks</a:t>
+            </a:r>
+            <a:r>
+              <a:rPr lang="sv-SE" dirty="0"/>
+              <a:t>?</a:t>
+            </a:r>
+          </a:p>
+          <a:p>
+            <a:pPr lvl="1"/>
+            <a:endParaRPr lang="sv-SE" dirty="0"/>
           </a:p>
         </p:txBody>
       </p:sp>
     </p:spTree>
     <p:extLst>
       <p:ext uri="{BB962C8B-B14F-4D97-AF65-F5344CB8AC3E}">
-        <p14:creationId xmlns:p14="http://schemas.microsoft.com/office/powerpoint/2010/main" val="1743501684"/>
+        <p14:creationId xmlns:p14="http://schemas.microsoft.com/office/powerpoint/2010/main" val="3771805064"/>
       </p:ext>
     </p:extLst>
   </p:cSld>
@@ -4265,16 +4261,21 @@
           <a:lstStyle/>
           <a:p>
             <a:r>
-              <a:rPr lang="en-US" dirty="0" smtClean="0"/>
-              <a:t>Computational Experiments</a:t>
-            </a:r>
-            <a:endParaRPr lang="en-US" dirty="0"/>
-          </a:p>
-        </p:txBody>
-      </p:sp>
-      <p:sp>
-        <p:nvSpPr>
-          <p:cNvPr id="3" name="Content Placeholder 2"/>
+              <a:rPr lang="en-US" dirty="0"/>
+              <a:t>Preliminary Results</a:t>
+            </a:r>
+          </a:p>
+        </p:txBody>
+      </p:sp>
+      <p:sp>
+        <p:nvSpPr>
+          <p:cNvPr id="5" name="Content Placeholder 4">
+            <a:extLst>
+              <a:ext uri="{FF2B5EF4-FFF2-40B4-BE49-F238E27FC236}">
+                <a16:creationId xmlns:a16="http://schemas.microsoft.com/office/drawing/2014/main" id="{905301C1-B205-E74E-A1BC-348C940E813B}"/>
+              </a:ext>
+            </a:extLst>
+          </p:cNvPr>
           <p:cNvSpPr>
             <a:spLocks noGrp="1"/>
           </p:cNvSpPr>
@@ -4282,50 +4283,181 @@
             <p:ph idx="1"/>
           </p:nvPr>
         </p:nvSpPr>
-        <p:spPr/>
-        <p:txBody>
-          <a:bodyPr/>
-          <a:lstStyle/>
-          <a:p>
-            <a:r>
-              <a:rPr lang="en-US" dirty="0" err="1" smtClean="0"/>
-              <a:t>Filesystem</a:t>
-            </a:r>
-            <a:r>
-              <a:rPr lang="en-US" dirty="0" smtClean="0"/>
-              <a:t> analysis</a:t>
-            </a:r>
-          </a:p>
-          <a:p>
-            <a:endParaRPr lang="en-US" dirty="0"/>
-          </a:p>
-          <a:p>
-            <a:r>
-              <a:rPr lang="en-US" dirty="0" smtClean="0"/>
-              <a:t>Weak tests</a:t>
-            </a:r>
-          </a:p>
-          <a:p>
-            <a:endParaRPr lang="en-US" dirty="0"/>
-          </a:p>
-          <a:p>
-            <a:r>
-              <a:rPr lang="en-US" dirty="0" smtClean="0"/>
-              <a:t>Strong tests</a:t>
-            </a:r>
-          </a:p>
-          <a:p>
-            <a:endParaRPr lang="en-US" dirty="0"/>
-          </a:p>
-          <a:p>
-            <a:endParaRPr lang="en-US" dirty="0"/>
-          </a:p>
-        </p:txBody>
-      </p:sp>
+        <p:spPr>
+          <a:xfrm>
+            <a:off x="457200" y="1600200"/>
+            <a:ext cx="4613564" cy="4876800"/>
+          </a:xfrm>
+        </p:spPr>
+        <p:txBody>
+          <a:bodyPr/>
+          <a:lstStyle/>
+          <a:p>
+            <a:r>
+              <a:rPr lang="sv-SE" dirty="0" err="1"/>
+              <a:t>Really</a:t>
+            </a:r>
+            <a:r>
+              <a:rPr lang="sv-SE" dirty="0"/>
+              <a:t> </a:t>
+            </a:r>
+            <a:r>
+              <a:rPr lang="sv-SE" dirty="0" err="1"/>
+              <a:t>good</a:t>
+            </a:r>
+            <a:r>
+              <a:rPr lang="sv-SE" dirty="0"/>
+              <a:t> </a:t>
+            </a:r>
+            <a:r>
+              <a:rPr lang="sv-SE" dirty="0" err="1"/>
+              <a:t>preliminary</a:t>
+            </a:r>
+            <a:r>
+              <a:rPr lang="sv-SE" dirty="0"/>
+              <a:t> </a:t>
+            </a:r>
+            <a:r>
+              <a:rPr lang="sv-SE" dirty="0" err="1"/>
+              <a:t>scaling</a:t>
+            </a:r>
+            <a:endParaRPr lang="sv-SE" dirty="0"/>
+          </a:p>
+          <a:p>
+            <a:r>
+              <a:rPr lang="sv-SE" dirty="0"/>
+              <a:t>NFS </a:t>
+            </a:r>
+            <a:r>
+              <a:rPr lang="sv-SE" dirty="0" err="1"/>
+              <a:t>seems</a:t>
+            </a:r>
+            <a:r>
+              <a:rPr lang="sv-SE" dirty="0"/>
+              <a:t> OK for </a:t>
+            </a:r>
+            <a:r>
+              <a:rPr lang="sv-SE" dirty="0" err="1"/>
+              <a:t>our</a:t>
+            </a:r>
+            <a:r>
+              <a:rPr lang="sv-SE" dirty="0"/>
+              <a:t> problem</a:t>
+            </a:r>
+          </a:p>
+          <a:p>
+            <a:pPr lvl="1"/>
+            <a:r>
+              <a:rPr lang="sv-SE" dirty="0"/>
+              <a:t>HDFS is </a:t>
+            </a:r>
+            <a:r>
+              <a:rPr lang="sv-SE" dirty="0" err="1"/>
+              <a:t>around</a:t>
+            </a:r>
+            <a:r>
+              <a:rPr lang="sv-SE" dirty="0"/>
+              <a:t> 8% </a:t>
+            </a:r>
+            <a:r>
+              <a:rPr lang="sv-SE" dirty="0" err="1"/>
+              <a:t>worse</a:t>
+            </a:r>
+            <a:r>
+              <a:rPr lang="sv-SE" dirty="0"/>
+              <a:t>!</a:t>
+            </a:r>
+          </a:p>
+          <a:p>
+            <a:r>
+              <a:rPr lang="sv-SE" dirty="0" err="1"/>
+              <a:t>Scales</a:t>
+            </a:r>
+            <a:r>
+              <a:rPr lang="sv-SE" dirty="0"/>
+              <a:t> </a:t>
+            </a:r>
+            <a:r>
+              <a:rPr lang="sv-SE" dirty="0" err="1"/>
+              <a:t>well</a:t>
+            </a:r>
+            <a:r>
+              <a:rPr lang="sv-SE" dirty="0"/>
+              <a:t> in initial tests</a:t>
+            </a:r>
+          </a:p>
+          <a:p>
+            <a:r>
+              <a:rPr lang="sv-SE" dirty="0" err="1"/>
+              <a:t>Very</a:t>
+            </a:r>
+            <a:r>
+              <a:rPr lang="sv-SE" dirty="0"/>
+              <a:t> </a:t>
+            </a:r>
+            <a:r>
+              <a:rPr lang="sv-SE" dirty="0" err="1"/>
+              <a:t>consistent</a:t>
+            </a:r>
+            <a:r>
+              <a:rPr lang="sv-SE" dirty="0"/>
+              <a:t> </a:t>
+            </a:r>
+            <a:r>
+              <a:rPr lang="sv-SE" dirty="0" err="1"/>
+              <a:t>measurements</a:t>
+            </a:r>
+            <a:r>
+              <a:rPr lang="sv-SE" dirty="0"/>
+              <a:t>!</a:t>
+            </a:r>
+          </a:p>
+          <a:p>
+            <a:pPr lvl="1"/>
+            <a:endParaRPr lang="sv-SE" dirty="0"/>
+          </a:p>
+        </p:txBody>
+      </p:sp>
+      <p:pic>
+        <p:nvPicPr>
+          <p:cNvPr id="4" name="Picture 3">
+            <a:extLst>
+              <a:ext uri="{FF2B5EF4-FFF2-40B4-BE49-F238E27FC236}">
+                <a16:creationId xmlns:a16="http://schemas.microsoft.com/office/drawing/2014/main" id="{86D9A4EE-3865-B146-BE85-7340B3FBA3CA}"/>
+              </a:ext>
+            </a:extLst>
+          </p:cNvPr>
+          <p:cNvPicPr>
+            <a:picLocks noChangeAspect="1"/>
+          </p:cNvPicPr>
+          <p:nvPr/>
+        </p:nvPicPr>
+        <p:blipFill>
+          <a:blip r:embed="rId2">
+            <a:extLst>
+              <a:ext uri="{28A0092B-C50C-407E-A947-70E740481C1C}">
+                <a14:useLocalDpi xmlns:a14="http://schemas.microsoft.com/office/drawing/2010/main" val="0"/>
+              </a:ext>
+            </a:extLst>
+          </a:blip>
+          <a:stretch>
+            <a:fillRect/>
+          </a:stretch>
+        </p:blipFill>
+        <p:spPr>
+          <a:xfrm>
+            <a:off x="4197927" y="2389909"/>
+            <a:ext cx="4946073" cy="3297382"/>
+          </a:xfrm>
+          <a:prstGeom prst="rect">
+            <a:avLst/>
+          </a:prstGeom>
+        </p:spPr>
+      </p:pic>
     </p:spTree>
     <p:extLst>
       <p:ext uri="{BB962C8B-B14F-4D97-AF65-F5344CB8AC3E}">
-        <p14:creationId xmlns:p14="http://schemas.microsoft.com/office/powerpoint/2010/main" val="3771805064"/>
+        <p14:creationId xmlns:p14="http://schemas.microsoft.com/office/powerpoint/2010/main" val="2772554887"/>
       </p:ext>
     </p:extLst>
   </p:cSld>
@@ -4364,20 +4496,27 @@
         </p:nvSpPr>
         <p:spPr/>
         <p:txBody>
-          <a:bodyPr/>
-          <a:lstStyle/>
-          <a:p>
-            <a:r>
-              <a:rPr lang="en-US" dirty="0" smtClean="0"/>
-              <a:t>Results to Date</a:t>
-            </a:r>
-            <a:endParaRPr lang="en-US" dirty="0"/>
-          </a:p>
-        </p:txBody>
-      </p:sp>
-      <p:sp>
-        <p:nvSpPr>
-          <p:cNvPr id="3" name="Content Placeholder 2"/>
+          <a:bodyPr>
+            <a:normAutofit/>
+          </a:bodyPr>
+          <a:lstStyle/>
+          <a:p>
+            <a:r>
+              <a:rPr lang="en-US" dirty="0"/>
+              <a:t>References</a:t>
+            </a:r>
+          </a:p>
+        </p:txBody>
+      </p:sp>
+      <p:sp>
+        <p:nvSpPr>
+          <p:cNvPr id="5" name="Content Placeholder 4">
+            <a:extLst>
+              <a:ext uri="{FF2B5EF4-FFF2-40B4-BE49-F238E27FC236}">
+                <a16:creationId xmlns:a16="http://schemas.microsoft.com/office/drawing/2014/main" id="{905301C1-B205-E74E-A1BC-348C940E813B}"/>
+              </a:ext>
+            </a:extLst>
+          </p:cNvPr>
           <p:cNvSpPr>
             <a:spLocks noGrp="1"/>
           </p:cNvSpPr>
@@ -4390,18 +4529,14 @@
           <a:bodyPr/>
           <a:lstStyle/>
           <a:p>
-            <a:r>
-              <a:rPr lang="en-US" dirty="0" smtClean="0"/>
-              <a:t>What have we already learned ahead of publication?</a:t>
-            </a:r>
-            <a:endParaRPr lang="en-US" dirty="0"/>
+            <a:endParaRPr lang="sv-SE" dirty="0"/>
           </a:p>
         </p:txBody>
       </p:sp>
     </p:spTree>
     <p:extLst>
       <p:ext uri="{BB962C8B-B14F-4D97-AF65-F5344CB8AC3E}">
-        <p14:creationId xmlns:p14="http://schemas.microsoft.com/office/powerpoint/2010/main" val="2649591459"/>
+        <p14:creationId xmlns:p14="http://schemas.microsoft.com/office/powerpoint/2010/main" val="3524345119"/>
       </p:ext>
     </p:extLst>
   </p:cSld>

</xml_diff>

<commit_message>
Add scaling graph to presentation
</commit_message>
<xml_diff>
--- a/presentation/group_presentation.pptx
+++ b/presentation/group_presentation.pptx
@@ -316,7 +316,7 @@
           <a:p>
             <a:fld id="{C8A432C8-69A7-458B-9684-2BFA64B31948}" type="datetime2">
               <a:rPr lang="en-US" smtClean="0"/>
-              <a:t>Tuesday, May 22, 2018</a:t>
+              <a:t>Wednesday, May 23, 2018</a:t>
             </a:fld>
             <a:endParaRPr lang="en-US"/>
           </a:p>
@@ -518,7 +518,7 @@
           <a:p>
             <a:fld id="{8CC057FC-95B6-4D89-AFDA-ABA33EE921E5}" type="datetime2">
               <a:rPr lang="en-US" smtClean="0"/>
-              <a:t>Tuesday, May 22, 2018</a:t>
+              <a:t>Wednesday, May 23, 2018</a:t>
             </a:fld>
             <a:endParaRPr lang="en-US"/>
           </a:p>
@@ -695,7 +695,7 @@
           <a:p>
             <a:fld id="{EC4549AC-EB31-477F-92A9-B1988E232878}" type="datetime2">
               <a:rPr lang="en-US" smtClean="0"/>
-              <a:t>Tuesday, May 22, 2018</a:t>
+              <a:t>Wednesday, May 23, 2018</a:t>
             </a:fld>
             <a:endParaRPr lang="en-US"/>
           </a:p>
@@ -862,7 +862,7 @@
           <a:p>
             <a:fld id="{6396A3A3-94A6-4E5B-AF39-173ACA3E61CC}" type="datetime2">
               <a:rPr lang="en-US" smtClean="0"/>
-              <a:t>Tuesday, May 22, 2018</a:t>
+              <a:t>Wednesday, May 23, 2018</a:t>
             </a:fld>
             <a:endParaRPr lang="en-US"/>
           </a:p>
@@ -1112,7 +1112,7 @@
           <a:p>
             <a:fld id="{9933D019-A32C-4EAD-B8E6-DBDA699692FD}" type="datetime2">
               <a:rPr lang="en-US" smtClean="0"/>
-              <a:t>Tuesday, May 22, 2018</a:t>
+              <a:t>Wednesday, May 23, 2018</a:t>
             </a:fld>
             <a:endParaRPr lang="en-US"/>
           </a:p>
@@ -1432,7 +1432,7 @@
           <a:p>
             <a:fld id="{CCEBA98F-560C-4997-81C4-81D4D9187EAB}" type="datetime2">
               <a:rPr lang="en-US" smtClean="0"/>
-              <a:t>Tuesday, May 22, 2018</a:t>
+              <a:t>Wednesday, May 23, 2018</a:t>
             </a:fld>
             <a:endParaRPr lang="en-US"/>
           </a:p>
@@ -1900,7 +1900,7 @@
           <a:p>
             <a:fld id="{150972B2-CA5C-437D-87D0-8081271A9E4B}" type="datetime2">
               <a:rPr lang="en-US" smtClean="0"/>
-              <a:t>Tuesday, May 22, 2018</a:t>
+              <a:t>Wednesday, May 23, 2018</a:t>
             </a:fld>
             <a:endParaRPr lang="en-US"/>
           </a:p>
@@ -2050,7 +2050,7 @@
           <a:p>
             <a:fld id="{79CD4847-11EF-4466-A8AD-85CDB7B49118}" type="datetime2">
               <a:rPr lang="en-US" smtClean="0"/>
-              <a:t>Tuesday, May 22, 2018</a:t>
+              <a:t>Wednesday, May 23, 2018</a:t>
             </a:fld>
             <a:endParaRPr lang="en-US"/>
           </a:p>
@@ -2142,7 +2142,7 @@
           <a:p>
             <a:fld id="{F168457A-3AB9-4880-8A0C-9F8524491207}" type="datetime2">
               <a:rPr lang="en-US" smtClean="0"/>
-              <a:t>Tuesday, May 22, 2018</a:t>
+              <a:t>Wednesday, May 23, 2018</a:t>
             </a:fld>
             <a:endParaRPr lang="en-US"/>
           </a:p>
@@ -2418,7 +2418,7 @@
           <a:p>
             <a:fld id="{3FE976D3-5B7F-4300-ABED-C91F1B2AE209}" type="datetime2">
               <a:rPr lang="en-US" smtClean="0"/>
-              <a:t>Tuesday, May 22, 2018</a:t>
+              <a:t>Wednesday, May 23, 2018</a:t>
             </a:fld>
             <a:endParaRPr lang="en-US"/>
           </a:p>
@@ -2725,7 +2725,7 @@
           <a:p>
             <a:fld id="{EBDC1E59-17DD-41CE-97CA-624A472382D4}" type="datetime2">
               <a:rPr lang="en-US" smtClean="0"/>
-              <a:t>Tuesday, May 22, 2018</a:t>
+              <a:t>Wednesday, May 23, 2018</a:t>
             </a:fld>
             <a:endParaRPr lang="en-US"/>
           </a:p>
@@ -3025,7 +3025,7 @@
           <a:p>
             <a:fld id="{A80CB818-7379-467D-8E76-EF9D9074A26C}" type="datetime2">
               <a:rPr lang="en-US" smtClean="0"/>
-              <a:t>Tuesday, May 22, 2018</a:t>
+              <a:t>Wednesday, May 23, 2018</a:t>
             </a:fld>
             <a:endParaRPr lang="en-US" dirty="0"/>
           </a:p>
@@ -4432,8 +4432,43 @@
           </p:cNvPicPr>
           <p:nvPr/>
         </p:nvPicPr>
+        <p:blipFill rotWithShape="1">
+          <a:blip r:embed="rId2">
+            <a:extLst>
+              <a:ext uri="{28A0092B-C50C-407E-A947-70E740481C1C}">
+                <a14:useLocalDpi xmlns:a14="http://schemas.microsoft.com/office/drawing/2010/main" val="0"/>
+              </a:ext>
+            </a:extLst>
+          </a:blip>
+          <a:srcRect t="8087"/>
+          <a:stretch/>
+        </p:blipFill>
+        <p:spPr>
+          <a:xfrm>
+            <a:off x="5070764" y="3381153"/>
+            <a:ext cx="4073562" cy="2438424"/>
+          </a:xfrm>
+          <a:prstGeom prst="rect">
+            <a:avLst/>
+          </a:prstGeom>
+        </p:spPr>
+      </p:pic>
+      <p:pic>
+        <p:nvPicPr>
+          <p:cNvPr id="6" name="Picture 5">
+            <a:extLst>
+              <a:ext uri="{FF2B5EF4-FFF2-40B4-BE49-F238E27FC236}">
+                <a16:creationId xmlns:a16="http://schemas.microsoft.com/office/drawing/2014/main" id="{E5ECEFCE-AAA5-1047-B334-7F79C8B16681}"/>
+              </a:ext>
+            </a:extLst>
+          </p:cNvPr>
+          <p:cNvPicPr>
+            <a:picLocks noChangeAspect="1"/>
+          </p:cNvPicPr>
+          <p:nvPr/>
+        </p:nvPicPr>
         <p:blipFill>
-          <a:blip r:embed="rId2">
+          <a:blip r:embed="rId3">
             <a:extLst>
               <a:ext uri="{28A0092B-C50C-407E-A947-70E740481C1C}">
                 <a14:useLocalDpi xmlns:a14="http://schemas.microsoft.com/office/drawing/2010/main" val="0"/>
@@ -4446,8 +4481,8 @@
         </p:blipFill>
         <p:spPr>
           <a:xfrm>
-            <a:off x="4197927" y="2389909"/>
-            <a:ext cx="4946073" cy="3297382"/>
+            <a:off x="5070764" y="759796"/>
+            <a:ext cx="3924060" cy="2616040"/>
           </a:xfrm>
           <a:prstGeom prst="rect">
             <a:avLst/>

</xml_diff>

<commit_message>
Dataset and Operations slides added.
</commit_message>
<xml_diff>
--- a/presentation/group_presentation.pptx
+++ b/presentation/group_presentation.pptx
@@ -9,11 +9,15 @@
     <p:sldId id="263" r:id="rId3"/>
     <p:sldId id="264" r:id="rId4"/>
     <p:sldId id="257" r:id="rId5"/>
-    <p:sldId id="258" r:id="rId6"/>
-    <p:sldId id="262" r:id="rId7"/>
-    <p:sldId id="259" r:id="rId8"/>
-    <p:sldId id="260" r:id="rId9"/>
-    <p:sldId id="261" r:id="rId10"/>
+    <p:sldId id="267" r:id="rId6"/>
+    <p:sldId id="265" r:id="rId7"/>
+    <p:sldId id="266" r:id="rId8"/>
+    <p:sldId id="268" r:id="rId9"/>
+    <p:sldId id="269" r:id="rId10"/>
+    <p:sldId id="262" r:id="rId11"/>
+    <p:sldId id="259" r:id="rId12"/>
+    <p:sldId id="260" r:id="rId13"/>
+    <p:sldId id="261" r:id="rId14"/>
   </p:sldIdLst>
   <p:sldSz cx="9144000" cy="6858000" type="screen4x3"/>
   <p:notesSz cx="6858000" cy="9144000"/>
@@ -114,7 +118,7 @@
   </p:defaultTextStyle>
   <p:extLst>
     <p:ext uri="{EFAFB233-063F-42B5-8137-9DF3F51BA10A}">
-      <p15:sldGuideLst xmlns:p15="http://schemas.microsoft.com/office/powerpoint/2012/main" xmlns="">
+      <p15:sldGuideLst xmlns="" xmlns:p15="http://schemas.microsoft.com/office/powerpoint/2012/main">
         <p15:guide id="1" orient="horz" pos="2160">
           <p15:clr>
             <a:srgbClr val="A4A3A4"/>
@@ -3472,13 +3476,12 @@
           </a:bodyPr>
           <a:lstStyle/>
           <a:p>
+            <a:endParaRPr lang="en-GB" dirty="0" smtClean="0"/>
+          </a:p>
+          <a:p>
             <a:r>
               <a:rPr lang="en-GB" dirty="0" smtClean="0"/>
-              <a:t>Contributors</a:t>
-            </a:r>
-            <a:r>
-              <a:rPr lang="en-GB" dirty="0"/>
-              <a:t> </a:t>
+              <a:t>Contributors </a:t>
             </a:r>
             <a:r>
               <a:rPr lang="en-GB" dirty="0" smtClean="0"/>
@@ -3543,7 +3546,7 @@
 </p:sld>
 </file>
 
-<file path=ppt/slides/slide2.xml><?xml version="1.0" encoding="utf-8"?>
+<file path=ppt/slides/slide10.xml><?xml version="1.0" encoding="utf-8"?>
 <p:sld xmlns:a="http://schemas.openxmlformats.org/drawingml/2006/main" xmlns:r="http://schemas.openxmlformats.org/officeDocument/2006/relationships" xmlns:p="http://schemas.openxmlformats.org/presentationml/2006/main">
   <p:cSld>
     <p:spTree>
@@ -3570,19 +3573,14 @@
             <p:ph type="title"/>
           </p:nvPr>
         </p:nvSpPr>
-        <p:spPr>
-          <a:xfrm>
-            <a:off x="457200" y="569951"/>
-            <a:ext cx="8229600" cy="990600"/>
-          </a:xfrm>
-        </p:spPr>
-        <p:txBody>
-          <a:bodyPr/>
-          <a:lstStyle/>
-          <a:p>
-            <a:r>
-              <a:rPr lang="en-US" dirty="0" smtClean="0"/>
-              <a:t>Presentation Outline</a:t>
+        <p:spPr/>
+        <p:txBody>
+          <a:bodyPr/>
+          <a:lstStyle/>
+          <a:p>
+            <a:r>
+              <a:rPr lang="en-US" smtClean="0"/>
+              <a:t>Choice of Study</a:t>
             </a:r>
             <a:endParaRPr lang="en-US" dirty="0"/>
           </a:p>
@@ -3593,7 +3591,7 @@
           <p:cNvPr id="5" name="Content Placeholder 4">
             <a:extLst>
               <a:ext uri="{FF2B5EF4-FFF2-40B4-BE49-F238E27FC236}">
-                <a16:creationId xmlns:a16="http://schemas.microsoft.com/office/drawing/2014/main" xmlns="" id="{59F35F09-3D93-6942-9815-83581FE0BF48}"/>
+                <a16:creationId xmlns="" xmlns:a16="http://schemas.microsoft.com/office/drawing/2014/main" id="{59F35F09-3D93-6942-9815-83581FE0BF48}"/>
               </a:ext>
             </a:extLst>
           </p:cNvPr>
@@ -3610,7 +3608,89 @@
           <a:lstStyle/>
           <a:p>
             <a:pPr lvl="1"/>
-            <a:endParaRPr lang="sv-SE" dirty="0" smtClean="0"/>
+            <a:r>
+              <a:rPr lang="sv-SE" dirty="0" err="1"/>
+              <a:t>What</a:t>
+            </a:r>
+            <a:r>
+              <a:rPr lang="sv-SE" dirty="0"/>
+              <a:t> </a:t>
+            </a:r>
+            <a:r>
+              <a:rPr lang="sv-SE" dirty="0" err="1"/>
+              <a:t>analysis</a:t>
+            </a:r>
+            <a:r>
+              <a:rPr lang="sv-SE" dirty="0"/>
+              <a:t> </a:t>
+            </a:r>
+            <a:r>
+              <a:rPr lang="sv-SE" dirty="0" err="1"/>
+              <a:t>have</a:t>
+            </a:r>
+            <a:r>
+              <a:rPr lang="sv-SE" dirty="0"/>
+              <a:t> </a:t>
+            </a:r>
+            <a:r>
+              <a:rPr lang="sv-SE" dirty="0" err="1"/>
+              <a:t>others</a:t>
+            </a:r>
+            <a:r>
+              <a:rPr lang="sv-SE" dirty="0"/>
+              <a:t> </a:t>
+            </a:r>
+            <a:r>
+              <a:rPr lang="sv-SE" dirty="0" err="1"/>
+              <a:t>done</a:t>
+            </a:r>
+            <a:r>
+              <a:rPr lang="sv-SE" dirty="0"/>
+              <a:t> on the </a:t>
+            </a:r>
+            <a:r>
+              <a:rPr lang="sv-SE" dirty="0" err="1"/>
+              <a:t>dataset</a:t>
+            </a:r>
+            <a:r>
+              <a:rPr lang="sv-SE" dirty="0"/>
+              <a:t>?</a:t>
+            </a:r>
+          </a:p>
+          <a:p>
+            <a:pPr lvl="1"/>
+            <a:r>
+              <a:rPr lang="sv-SE" dirty="0" err="1"/>
+              <a:t>What</a:t>
+            </a:r>
+            <a:r>
+              <a:rPr lang="sv-SE" dirty="0"/>
+              <a:t> </a:t>
+            </a:r>
+            <a:r>
+              <a:rPr lang="sv-SE" dirty="0" err="1"/>
+              <a:t>questions</a:t>
+            </a:r>
+            <a:r>
+              <a:rPr lang="sv-SE" dirty="0"/>
+              <a:t> </a:t>
+            </a:r>
+            <a:r>
+              <a:rPr lang="sv-SE" dirty="0" err="1"/>
+              <a:t>are</a:t>
+            </a:r>
+            <a:r>
+              <a:rPr lang="sv-SE" dirty="0"/>
+              <a:t> </a:t>
+            </a:r>
+            <a:r>
+              <a:rPr lang="sv-SE" dirty="0" err="1"/>
+              <a:t>interesting</a:t>
+            </a:r>
+            <a:r>
+              <a:rPr lang="sv-SE" dirty="0"/>
+              <a:t>?</a:t>
+            </a:r>
           </a:p>
           <a:p>
             <a:pPr marL="274320" lvl="1" indent="0">
@@ -3622,20 +3702,172 @@
             <a:pPr marL="274320" lvl="1" indent="0">
               <a:buNone/>
             </a:pPr>
-            <a:endParaRPr lang="sv-SE" dirty="0" smtClean="0"/>
-          </a:p>
-          <a:p>
-            <a:pPr marL="274320" lvl="1" indent="0">
-              <a:buNone/>
-            </a:pPr>
-            <a:endParaRPr lang="sv-SE" dirty="0" smtClean="0"/>
+            <a:r>
+              <a:rPr lang="sv-SE" dirty="0" err="1"/>
+              <a:t>Previous</a:t>
+            </a:r>
+            <a:r>
+              <a:rPr lang="sv-SE" dirty="0"/>
+              <a:t> research:</a:t>
+            </a:r>
+          </a:p>
+          <a:p>
+            <a:pPr lvl="1"/>
+            <a:r>
+              <a:rPr lang="sv-SE" dirty="0" err="1"/>
+              <a:t>Reverse</a:t>
+            </a:r>
+            <a:r>
+              <a:rPr lang="sv-SE" dirty="0"/>
+              <a:t> </a:t>
+            </a:r>
+            <a:r>
+              <a:rPr lang="sv-SE" dirty="0" err="1"/>
+              <a:t>engineer</a:t>
+            </a:r>
+            <a:r>
+              <a:rPr lang="sv-SE" dirty="0"/>
+              <a:t> site </a:t>
+            </a:r>
+            <a:r>
+              <a:rPr lang="sv-SE" dirty="0" err="1"/>
+              <a:t>security</a:t>
+            </a:r>
+            <a:r>
+              <a:rPr lang="sv-SE" dirty="0"/>
+              <a:t> </a:t>
+            </a:r>
+            <a:r>
+              <a:rPr lang="sv-SE" dirty="0" err="1"/>
+              <a:t>practices</a:t>
+            </a:r>
+            <a:endParaRPr lang="sv-SE" dirty="0"/>
+          </a:p>
+          <a:p>
+            <a:pPr lvl="1"/>
+            <a:r>
+              <a:rPr lang="sv-SE" dirty="0" err="1"/>
+              <a:t>Understanding</a:t>
+            </a:r>
+            <a:r>
+              <a:rPr lang="sv-SE" dirty="0"/>
+              <a:t> </a:t>
+            </a:r>
+            <a:r>
+              <a:rPr lang="sv-SE" dirty="0" err="1"/>
+              <a:t>user</a:t>
+            </a:r>
+            <a:r>
+              <a:rPr lang="sv-SE" dirty="0"/>
+              <a:t> </a:t>
+            </a:r>
+            <a:r>
+              <a:rPr lang="sv-SE" dirty="0" err="1"/>
+              <a:t>behaviour</a:t>
+            </a:r>
+            <a:endParaRPr lang="sv-SE" dirty="0"/>
+          </a:p>
+          <a:p>
+            <a:pPr lvl="2"/>
+            <a:r>
+              <a:rPr lang="sv-SE" dirty="0" err="1"/>
+              <a:t>Password</a:t>
+            </a:r>
+            <a:r>
+              <a:rPr lang="sv-SE" dirty="0"/>
+              <a:t> </a:t>
+            </a:r>
+            <a:r>
+              <a:rPr lang="sv-SE" dirty="0" err="1"/>
+              <a:t>reuse</a:t>
+            </a:r>
+            <a:endParaRPr lang="sv-SE" dirty="0"/>
+          </a:p>
+          <a:p>
+            <a:pPr lvl="2"/>
+            <a:r>
+              <a:rPr lang="sv-SE" dirty="0" err="1"/>
+              <a:t>Patterns</a:t>
+            </a:r>
+            <a:r>
+              <a:rPr lang="sv-SE" dirty="0"/>
+              <a:t>, variations, and </a:t>
+            </a:r>
+            <a:r>
+              <a:rPr lang="sv-SE" dirty="0" err="1"/>
+              <a:t>password</a:t>
+            </a:r>
+            <a:r>
+              <a:rPr lang="sv-SE" dirty="0"/>
+              <a:t> </a:t>
+            </a:r>
+            <a:r>
+              <a:rPr lang="sv-SE" dirty="0" err="1"/>
+              <a:t>history</a:t>
+            </a:r>
+            <a:endParaRPr lang="sv-SE" dirty="0"/>
+          </a:p>
+          <a:p>
+            <a:pPr lvl="2"/>
+            <a:r>
+              <a:rPr lang="sv-SE" dirty="0"/>
+              <a:t>Regional </a:t>
+            </a:r>
+            <a:r>
+              <a:rPr lang="sv-SE" dirty="0" err="1"/>
+              <a:t>differences</a:t>
+            </a:r>
+            <a:endParaRPr lang="sv-SE" dirty="0"/>
+          </a:p>
+          <a:p>
+            <a:pPr lvl="1"/>
+            <a:r>
+              <a:rPr lang="sv-SE" dirty="0" err="1"/>
+              <a:t>Training</a:t>
+            </a:r>
+            <a:r>
+              <a:rPr lang="sv-SE" dirty="0"/>
+              <a:t> neural </a:t>
+            </a:r>
+            <a:r>
+              <a:rPr lang="sv-SE" dirty="0" err="1"/>
+              <a:t>networks</a:t>
+            </a:r>
+            <a:r>
+              <a:rPr lang="sv-SE" dirty="0"/>
+              <a:t> to </a:t>
+            </a:r>
+            <a:r>
+              <a:rPr lang="sv-SE" dirty="0" err="1"/>
+              <a:t>evaluate</a:t>
+            </a:r>
+            <a:r>
+              <a:rPr lang="sv-SE" dirty="0"/>
+              <a:t> </a:t>
+            </a:r>
+            <a:r>
+              <a:rPr lang="sv-SE" dirty="0" err="1"/>
+              <a:t>password</a:t>
+            </a:r>
+            <a:r>
+              <a:rPr lang="sv-SE" dirty="0"/>
+              <a:t> </a:t>
+            </a:r>
+            <a:r>
+              <a:rPr lang="sv-SE" dirty="0" err="1"/>
+              <a:t>security</a:t>
+            </a:r>
+            <a:r>
+              <a:rPr lang="sv-SE" dirty="0"/>
+              <a:t> (!)</a:t>
+            </a:r>
           </a:p>
         </p:txBody>
       </p:sp>
     </p:spTree>
     <p:extLst>
       <p:ext uri="{BB962C8B-B14F-4D97-AF65-F5344CB8AC3E}">
-        <p14:creationId xmlns:p14="http://schemas.microsoft.com/office/powerpoint/2010/main" val="3862794373"/>
+        <p14:creationId xmlns:p14="http://schemas.microsoft.com/office/powerpoint/2010/main" val="3894717909"/>
       </p:ext>
     </p:extLst>
   </p:cSld>
@@ -3645,7 +3877,7 @@
 </p:sld>
 </file>
 
-<file path=ppt/slides/slide3.xml><?xml version="1.0" encoding="utf-8"?>
+<file path=ppt/slides/slide11.xml><?xml version="1.0" encoding="utf-8"?>
 <p:sld xmlns:a="http://schemas.openxmlformats.org/drawingml/2006/main" xmlns:r="http://schemas.openxmlformats.org/officeDocument/2006/relationships" xmlns:p="http://schemas.openxmlformats.org/presentationml/2006/main">
   <p:cSld>
     <p:spTree>
@@ -3672,21 +3904,15 @@
             <p:ph type="title"/>
           </p:nvPr>
         </p:nvSpPr>
-        <p:spPr>
-          <a:xfrm>
-            <a:off x="457200" y="569951"/>
-            <a:ext cx="8229600" cy="990600"/>
-          </a:xfrm>
-        </p:spPr>
-        <p:txBody>
-          <a:bodyPr/>
-          <a:lstStyle/>
-          <a:p>
-            <a:r>
-              <a:rPr lang="en-US" dirty="0" smtClean="0"/>
-              <a:t>Presentation Outline</a:t>
-            </a:r>
-            <a:endParaRPr lang="en-US" dirty="0"/>
+        <p:spPr/>
+        <p:txBody>
+          <a:bodyPr/>
+          <a:lstStyle/>
+          <a:p>
+            <a:r>
+              <a:rPr lang="en-US" dirty="0"/>
+              <a:t>Computational Experiments</a:t>
+            </a:r>
           </a:p>
         </p:txBody>
       </p:sp>
@@ -3695,7 +3921,7 @@
           <p:cNvPr id="5" name="Content Placeholder 4">
             <a:extLst>
               <a:ext uri="{FF2B5EF4-FFF2-40B4-BE49-F238E27FC236}">
-                <a16:creationId xmlns:a16="http://schemas.microsoft.com/office/drawing/2014/main" xmlns="" id="{59F35F09-3D93-6942-9815-83581FE0BF48}"/>
+                <a16:creationId xmlns="" xmlns:a16="http://schemas.microsoft.com/office/drawing/2014/main" id="{905301C1-B205-E74E-A1BC-348C940E813B}"/>
               </a:ext>
             </a:extLst>
           </p:cNvPr>
@@ -3711,178 +3937,215 @@
           <a:bodyPr/>
           <a:lstStyle/>
           <a:p>
+            <a:r>
+              <a:rPr lang="sv-SE" dirty="0" err="1"/>
+              <a:t>Storage</a:t>
+            </a:r>
+            <a:r>
+              <a:rPr lang="sv-SE" dirty="0"/>
+              <a:t>: NFS vs HDFS</a:t>
+            </a:r>
+          </a:p>
+          <a:p>
             <a:pPr lvl="1"/>
-            <a:endParaRPr lang="sv-SE" dirty="0" smtClean="0"/>
-          </a:p>
-          <a:p>
-            <a:pPr lvl="1"/>
-            <a:endParaRPr lang="sv-SE" dirty="0" smtClean="0"/>
-          </a:p>
-          <a:p>
-            <a:pPr lvl="1"/>
-            <a:endParaRPr lang="sv-SE" dirty="0" smtClean="0"/>
-          </a:p>
-          <a:p>
-            <a:pPr lvl="1"/>
-            <a:r>
-              <a:rPr lang="sv-SE" i="1" dirty="0" err="1" smtClean="0"/>
-              <a:t>What</a:t>
-            </a:r>
-            <a:r>
-              <a:rPr lang="sv-SE" i="1" dirty="0" smtClean="0"/>
-              <a:t> is </a:t>
-            </a:r>
-            <a:r>
-              <a:rPr lang="sv-SE" i="1" dirty="0" err="1" smtClean="0"/>
-              <a:t>our</a:t>
-            </a:r>
-            <a:r>
-              <a:rPr lang="sv-SE" i="1" dirty="0" smtClean="0"/>
+            <a:r>
+              <a:rPr lang="sv-SE" dirty="0" err="1"/>
+              <a:t>Network</a:t>
+            </a:r>
+            <a:r>
+              <a:rPr lang="sv-SE" dirty="0"/>
               <a:t> </a:t>
             </a:r>
             <a:r>
-              <a:rPr lang="sv-SE" i="1" dirty="0" err="1" smtClean="0"/>
-              <a:t>dataset</a:t>
-            </a:r>
-            <a:r>
-              <a:rPr lang="sv-SE" dirty="0" smtClean="0"/>
-              <a:t>?</a:t>
-            </a:r>
-          </a:p>
-          <a:p>
-            <a:pPr lvl="1"/>
-            <a:r>
-              <a:rPr lang="sv-SE" dirty="0"/>
-              <a:t>A</a:t>
-            </a:r>
-            <a:r>
-              <a:rPr lang="sv-SE" dirty="0" smtClean="0"/>
-              <a:t>nd </a:t>
-            </a:r>
-            <a:r>
-              <a:rPr lang="sv-SE" i="1" dirty="0" err="1" smtClean="0"/>
-              <a:t>why</a:t>
-            </a:r>
-            <a:r>
-              <a:rPr lang="sv-SE" i="1" dirty="0" smtClean="0"/>
-              <a:t> is it </a:t>
-            </a:r>
-            <a:r>
-              <a:rPr lang="sv-SE" i="1" dirty="0" err="1" smtClean="0"/>
-              <a:t>interesting</a:t>
+              <a:rPr lang="sv-SE" dirty="0" err="1"/>
+              <a:t>characteristics</a:t>
             </a:r>
             <a:r>
               <a:rPr lang="sv-SE" dirty="0"/>
               <a:t>?</a:t>
             </a:r>
+          </a:p>
+          <a:p>
+            <a:r>
+              <a:rPr lang="sv-SE" dirty="0" err="1"/>
+              <a:t>Scaling</a:t>
+            </a:r>
+            <a:r>
+              <a:rPr lang="sv-SE" dirty="0"/>
+              <a:t> on the </a:t>
+            </a:r>
+            <a:r>
+              <a:rPr lang="sv-SE" dirty="0" err="1"/>
+              <a:t>dataset</a:t>
+            </a:r>
             <a:endParaRPr lang="sv-SE" dirty="0"/>
           </a:p>
           <a:p>
-            <a:pPr marL="274320" lvl="1" indent="0">
-              <a:buNone/>
-            </a:pPr>
+            <a:pPr lvl="1"/>
+            <a:r>
+              <a:rPr lang="sv-SE" dirty="0" err="1"/>
+              <a:t>Weak</a:t>
+            </a:r>
+            <a:r>
+              <a:rPr lang="sv-SE" dirty="0"/>
+              <a:t> (</a:t>
+            </a:r>
+            <a:r>
+              <a:rPr lang="sv-SE" dirty="0" err="1"/>
+              <a:t>Dennard</a:t>
+            </a:r>
+            <a:r>
+              <a:rPr lang="sv-SE" dirty="0"/>
+              <a:t>) </a:t>
+            </a:r>
+            <a:r>
+              <a:rPr lang="sv-SE" dirty="0" err="1"/>
+              <a:t>scaling</a:t>
+            </a:r>
             <a:endParaRPr lang="sv-SE" dirty="0"/>
           </a:p>
           <a:p>
-            <a:pPr marL="274320" lvl="1" indent="0">
-              <a:buNone/>
-            </a:pPr>
-            <a:endParaRPr lang="sv-SE" dirty="0" smtClean="0"/>
-          </a:p>
-          <a:p>
-            <a:pPr marL="274320" lvl="1" indent="0">
-              <a:buNone/>
-            </a:pPr>
-            <a:endParaRPr lang="sv-SE" dirty="0" smtClean="0"/>
-          </a:p>
-        </p:txBody>
-      </p:sp>
-      <p:sp>
-        <p:nvSpPr>
-          <p:cNvPr id="3" name="Rectangle 2"/>
-          <p:cNvSpPr/>
-          <p:nvPr/>
-        </p:nvSpPr>
-        <p:spPr>
-          <a:xfrm>
-            <a:off x="686444" y="2482896"/>
-            <a:ext cx="7756812" cy="1235728"/>
-          </a:xfrm>
-          <a:prstGeom prst="rect">
-            <a:avLst/>
-          </a:prstGeom>
-          <a:noFill/>
-          <a:ln w="44450">
-            <a:solidFill>
-              <a:srgbClr val="1F5E12"/>
-            </a:solidFill>
-          </a:ln>
-        </p:spPr>
-        <p:style>
-          <a:lnRef idx="1">
-            <a:schemeClr val="accent1"/>
-          </a:lnRef>
-          <a:fillRef idx="3">
-            <a:schemeClr val="accent1"/>
-          </a:fillRef>
-          <a:effectRef idx="2">
-            <a:schemeClr val="accent1"/>
-          </a:effectRef>
-          <a:fontRef idx="minor">
-            <a:schemeClr val="lt1"/>
-          </a:fontRef>
-        </p:style>
-        <p:txBody>
-          <a:bodyPr rtlCol="0" anchor="ctr"/>
-          <a:lstStyle/>
-          <a:p>
-            <a:pPr algn="ctr"/>
-            <a:endParaRPr lang="en-US"/>
-          </a:p>
-        </p:txBody>
-      </p:sp>
-      <p:sp>
-        <p:nvSpPr>
-          <p:cNvPr id="4" name="TextBox 3"/>
-          <p:cNvSpPr txBox="1"/>
-          <p:nvPr/>
-        </p:nvSpPr>
-        <p:spPr>
-          <a:xfrm>
-            <a:off x="7390719" y="2837596"/>
-            <a:ext cx="1006784" cy="461665"/>
-          </a:xfrm>
-          <a:prstGeom prst="rect">
-            <a:avLst/>
-          </a:prstGeom>
-          <a:noFill/>
-        </p:spPr>
-        <p:txBody>
-          <a:bodyPr wrap="square" rtlCol="0">
-            <a:spAutoFit/>
-          </a:bodyPr>
-          <a:lstStyle/>
-          <a:p>
-            <a:r>
-              <a:rPr lang="en-US" sz="2400" i="1" dirty="0" smtClean="0">
-                <a:solidFill>
-                  <a:srgbClr val="C63D2E"/>
-                </a:solidFill>
-              </a:rPr>
-              <a:t>John</a:t>
-            </a:r>
-            <a:endParaRPr lang="en-US" sz="2400" i="1" dirty="0">
-              <a:solidFill>
-                <a:srgbClr val="C63D2E"/>
-              </a:solidFill>
-            </a:endParaRPr>
+            <a:pPr lvl="1"/>
+            <a:r>
+              <a:rPr lang="sv-SE" dirty="0"/>
+              <a:t>Strong </a:t>
+            </a:r>
+            <a:r>
+              <a:rPr lang="sv-SE" dirty="0" err="1"/>
+              <a:t>scaling</a:t>
+            </a:r>
+            <a:endParaRPr lang="sv-SE" dirty="0"/>
+          </a:p>
+          <a:p>
+            <a:pPr lvl="1"/>
+            <a:endParaRPr lang="sv-SE" dirty="0"/>
+          </a:p>
+          <a:p>
+            <a:r>
+              <a:rPr lang="sv-SE" dirty="0" err="1"/>
+              <a:t>Run</a:t>
+            </a:r>
+            <a:r>
+              <a:rPr lang="sv-SE" dirty="0"/>
+              <a:t> experiments on 1–11 </a:t>
+            </a:r>
+            <a:r>
+              <a:rPr lang="sv-SE" dirty="0" err="1"/>
+              <a:t>nodes</a:t>
+            </a:r>
+            <a:endParaRPr lang="sv-SE" dirty="0"/>
+          </a:p>
+          <a:p>
+            <a:r>
+              <a:rPr lang="sv-SE" dirty="0" err="1"/>
+              <a:t>Variance</a:t>
+            </a:r>
+            <a:r>
+              <a:rPr lang="sv-SE" dirty="0"/>
+              <a:t>: </a:t>
+            </a:r>
+            <a:r>
+              <a:rPr lang="sv-SE" dirty="0" err="1"/>
+              <a:t>how</a:t>
+            </a:r>
+            <a:r>
+              <a:rPr lang="sv-SE" dirty="0"/>
+              <a:t> </a:t>
+            </a:r>
+            <a:r>
+              <a:rPr lang="sv-SE" dirty="0" err="1"/>
+              <a:t>reliable</a:t>
+            </a:r>
+            <a:r>
+              <a:rPr lang="sv-SE" dirty="0"/>
+              <a:t> is </a:t>
+            </a:r>
+            <a:r>
+              <a:rPr lang="sv-SE" dirty="0" err="1"/>
+              <a:t>any</a:t>
+            </a:r>
+            <a:r>
+              <a:rPr lang="sv-SE" dirty="0"/>
+              <a:t> </a:t>
+            </a:r>
+            <a:r>
+              <a:rPr lang="sv-SE" dirty="0" err="1"/>
+              <a:t>one</a:t>
+            </a:r>
+            <a:r>
+              <a:rPr lang="sv-SE" dirty="0"/>
+              <a:t> </a:t>
+            </a:r>
+            <a:r>
+              <a:rPr lang="sv-SE" dirty="0" err="1"/>
+              <a:t>measurement</a:t>
+            </a:r>
+            <a:r>
+              <a:rPr lang="sv-SE" dirty="0"/>
+              <a:t>?</a:t>
+            </a:r>
+          </a:p>
+          <a:p>
+            <a:pPr lvl="1"/>
+            <a:r>
+              <a:rPr lang="sv-SE" dirty="0" err="1"/>
+              <a:t>Can</a:t>
+            </a:r>
+            <a:r>
+              <a:rPr lang="sv-SE" dirty="0"/>
+              <a:t> </a:t>
+            </a:r>
+            <a:r>
+              <a:rPr lang="sv-SE" dirty="0" err="1"/>
+              <a:t>we</a:t>
+            </a:r>
+            <a:r>
+              <a:rPr lang="sv-SE" dirty="0"/>
+              <a:t> trust the </a:t>
+            </a:r>
+            <a:r>
+              <a:rPr lang="sv-SE" dirty="0" err="1"/>
+              <a:t>cloud</a:t>
+            </a:r>
+            <a:r>
+              <a:rPr lang="sv-SE" dirty="0"/>
+              <a:t> </a:t>
+            </a:r>
+            <a:r>
+              <a:rPr lang="sv-SE" dirty="0" err="1"/>
+              <a:t>with</a:t>
+            </a:r>
+            <a:r>
+              <a:rPr lang="sv-SE" dirty="0"/>
+              <a:t> </a:t>
+            </a:r>
+            <a:r>
+              <a:rPr lang="sv-SE" dirty="0" err="1"/>
+              <a:t>performance</a:t>
+            </a:r>
+            <a:r>
+              <a:rPr lang="sv-SE" dirty="0"/>
+              <a:t> </a:t>
+            </a:r>
+            <a:r>
+              <a:rPr lang="sv-SE" dirty="0" err="1"/>
+              <a:t>benchmarks</a:t>
+            </a:r>
+            <a:r>
+              <a:rPr lang="sv-SE" dirty="0"/>
+              <a:t>?</a:t>
+            </a:r>
+          </a:p>
+          <a:p>
+            <a:pPr lvl="1"/>
+            <a:endParaRPr lang="sv-SE" dirty="0"/>
           </a:p>
         </p:txBody>
       </p:sp>
     </p:spTree>
     <p:extLst>
       <p:ext uri="{BB962C8B-B14F-4D97-AF65-F5344CB8AC3E}">
-        <p14:creationId xmlns:p14="http://schemas.microsoft.com/office/powerpoint/2010/main" val="877112333"/>
+        <p14:creationId xmlns:p14="http://schemas.microsoft.com/office/powerpoint/2010/main" val="3771805064"/>
       </p:ext>
     </p:extLst>
   </p:cSld>
@@ -3892,7 +4155,7 @@
 </p:sld>
 </file>
 
-<file path=ppt/slides/slide4.xml><?xml version="1.0" encoding="utf-8"?>
+<file path=ppt/slides/slide12.xml><?xml version="1.0" encoding="utf-8"?>
 <p:sld xmlns:a="http://schemas.openxmlformats.org/drawingml/2006/main" xmlns:r="http://schemas.openxmlformats.org/officeDocument/2006/relationships" xmlns:p="http://schemas.openxmlformats.org/presentationml/2006/main">
   <p:cSld>
     <p:spTree>
@@ -3919,21 +4182,15 @@
             <p:ph type="title"/>
           </p:nvPr>
         </p:nvSpPr>
-        <p:spPr>
-          <a:xfrm>
-            <a:off x="457200" y="569951"/>
-            <a:ext cx="8229600" cy="990600"/>
-          </a:xfrm>
-        </p:spPr>
-        <p:txBody>
-          <a:bodyPr/>
-          <a:lstStyle/>
-          <a:p>
-            <a:r>
-              <a:rPr lang="en-US" dirty="0" smtClean="0"/>
-              <a:t>Presentation Outline</a:t>
-            </a:r>
-            <a:endParaRPr lang="en-US" dirty="0"/>
+        <p:spPr/>
+        <p:txBody>
+          <a:bodyPr/>
+          <a:lstStyle/>
+          <a:p>
+            <a:r>
+              <a:rPr lang="en-US" dirty="0"/>
+              <a:t>Preliminary Results</a:t>
+            </a:r>
           </a:p>
         </p:txBody>
       </p:sp>
@@ -3942,1123 +4199,7 @@
           <p:cNvPr id="5" name="Content Placeholder 4">
             <a:extLst>
               <a:ext uri="{FF2B5EF4-FFF2-40B4-BE49-F238E27FC236}">
-                <a16:creationId xmlns:a16="http://schemas.microsoft.com/office/drawing/2014/main" xmlns="" id="{59F35F09-3D93-6942-9815-83581FE0BF48}"/>
-              </a:ext>
-            </a:extLst>
-          </p:cNvPr>
-          <p:cNvSpPr>
-            <a:spLocks noGrp="1"/>
-          </p:cNvSpPr>
-          <p:nvPr>
-            <p:ph idx="1"/>
-          </p:nvPr>
-        </p:nvSpPr>
-        <p:spPr/>
-        <p:txBody>
-          <a:bodyPr/>
-          <a:lstStyle/>
-          <a:p>
-            <a:pPr lvl="1"/>
-            <a:endParaRPr lang="sv-SE" dirty="0" smtClean="0"/>
-          </a:p>
-          <a:p>
-            <a:pPr lvl="1"/>
-            <a:endParaRPr lang="sv-SE" dirty="0" smtClean="0"/>
-          </a:p>
-          <a:p>
-            <a:pPr lvl="1"/>
-            <a:endParaRPr lang="sv-SE" dirty="0" smtClean="0"/>
-          </a:p>
-          <a:p>
-            <a:pPr lvl="1"/>
-            <a:r>
-              <a:rPr lang="sv-SE" i="1" dirty="0" err="1" smtClean="0"/>
-              <a:t>What</a:t>
-            </a:r>
-            <a:r>
-              <a:rPr lang="sv-SE" i="1" dirty="0" smtClean="0"/>
-              <a:t> is </a:t>
-            </a:r>
-            <a:r>
-              <a:rPr lang="sv-SE" i="1" dirty="0" err="1" smtClean="0"/>
-              <a:t>our</a:t>
-            </a:r>
-            <a:r>
-              <a:rPr lang="sv-SE" i="1" dirty="0" smtClean="0"/>
-              <a:t> </a:t>
-            </a:r>
-            <a:r>
-              <a:rPr lang="sv-SE" i="1" dirty="0" err="1" smtClean="0"/>
-              <a:t>dataset</a:t>
-            </a:r>
-            <a:r>
-              <a:rPr lang="sv-SE" dirty="0" smtClean="0"/>
-              <a:t>?</a:t>
-            </a:r>
-          </a:p>
-          <a:p>
-            <a:pPr lvl="1"/>
-            <a:r>
-              <a:rPr lang="sv-SE" dirty="0"/>
-              <a:t>A</a:t>
-            </a:r>
-            <a:r>
-              <a:rPr lang="sv-SE" dirty="0" smtClean="0"/>
-              <a:t>nd </a:t>
-            </a:r>
-            <a:r>
-              <a:rPr lang="sv-SE" i="1" dirty="0" err="1" smtClean="0"/>
-              <a:t>why</a:t>
-            </a:r>
-            <a:r>
-              <a:rPr lang="sv-SE" i="1" dirty="0" smtClean="0"/>
-              <a:t> is it </a:t>
-            </a:r>
-            <a:r>
-              <a:rPr lang="sv-SE" i="1" dirty="0" err="1" smtClean="0"/>
-              <a:t>interesting</a:t>
-            </a:r>
-            <a:r>
-              <a:rPr lang="sv-SE" dirty="0"/>
-              <a:t>?</a:t>
-            </a:r>
-            <a:endParaRPr lang="sv-SE" dirty="0"/>
-          </a:p>
-          <a:p>
-            <a:pPr marL="274320" lvl="1" indent="0">
-              <a:buNone/>
-            </a:pPr>
-            <a:endParaRPr lang="sv-SE" dirty="0"/>
-          </a:p>
-          <a:p>
-            <a:pPr marL="274320" lvl="1" indent="0">
-              <a:buNone/>
-            </a:pPr>
-            <a:endParaRPr lang="sv-SE" dirty="0" smtClean="0"/>
-          </a:p>
-          <a:p>
-            <a:pPr lvl="1"/>
-            <a:endParaRPr lang="sv-SE" dirty="0" smtClean="0"/>
-          </a:p>
-          <a:p>
-            <a:pPr lvl="1"/>
-            <a:r>
-              <a:rPr lang="sv-SE" i="1" dirty="0" err="1" smtClean="0"/>
-              <a:t>What</a:t>
-            </a:r>
-            <a:r>
-              <a:rPr lang="sv-SE" i="1" dirty="0" smtClean="0"/>
-              <a:t> </a:t>
-            </a:r>
-            <a:r>
-              <a:rPr lang="sv-SE" i="1" dirty="0" err="1" smtClean="0"/>
-              <a:t>tools</a:t>
-            </a:r>
-            <a:r>
-              <a:rPr lang="sv-SE" i="1" dirty="0" smtClean="0"/>
-              <a:t> </a:t>
-            </a:r>
-            <a:r>
-              <a:rPr lang="sv-SE" i="1" dirty="0" err="1" smtClean="0"/>
-              <a:t>are</a:t>
-            </a:r>
-            <a:r>
-              <a:rPr lang="sv-SE" i="1" dirty="0" smtClean="0"/>
-              <a:t> </a:t>
-            </a:r>
-            <a:r>
-              <a:rPr lang="sv-SE" i="1" dirty="0" err="1" smtClean="0"/>
-              <a:t>we</a:t>
-            </a:r>
-            <a:r>
-              <a:rPr lang="sv-SE" i="1" dirty="0" smtClean="0"/>
-              <a:t> </a:t>
-            </a:r>
-            <a:r>
-              <a:rPr lang="sv-SE" i="1" dirty="0" err="1" smtClean="0"/>
-              <a:t>using</a:t>
-            </a:r>
-            <a:r>
-              <a:rPr lang="sv-SE" dirty="0" smtClean="0"/>
-              <a:t> for </a:t>
-            </a:r>
-            <a:r>
-              <a:rPr lang="sv-SE" dirty="0" err="1" smtClean="0"/>
-              <a:t>processing</a:t>
-            </a:r>
-            <a:r>
-              <a:rPr lang="sv-SE" dirty="0" smtClean="0"/>
-              <a:t>?</a:t>
-            </a:r>
-          </a:p>
-          <a:p>
-            <a:pPr lvl="1"/>
-            <a:r>
-              <a:rPr lang="sv-SE" dirty="0"/>
-              <a:t>A</a:t>
-            </a:r>
-            <a:r>
-              <a:rPr lang="sv-SE" dirty="0" smtClean="0"/>
-              <a:t>nd </a:t>
-            </a:r>
-            <a:r>
-              <a:rPr lang="sv-SE" i="1" dirty="0" err="1" smtClean="0"/>
-              <a:t>how</a:t>
-            </a:r>
-            <a:r>
-              <a:rPr lang="sv-SE" i="1" dirty="0" smtClean="0"/>
-              <a:t> </a:t>
-            </a:r>
-            <a:r>
-              <a:rPr lang="sv-SE" i="1" dirty="0" err="1" smtClean="0"/>
-              <a:t>effective</a:t>
-            </a:r>
-            <a:r>
-              <a:rPr lang="sv-SE" i="1" dirty="0" smtClean="0"/>
-              <a:t> </a:t>
-            </a:r>
-            <a:r>
-              <a:rPr lang="sv-SE" i="1" dirty="0" err="1" smtClean="0"/>
-              <a:t>are</a:t>
-            </a:r>
-            <a:r>
-              <a:rPr lang="sv-SE" i="1" dirty="0" smtClean="0"/>
-              <a:t> </a:t>
-            </a:r>
-            <a:r>
-              <a:rPr lang="sv-SE" i="1" dirty="0" err="1" smtClean="0"/>
-              <a:t>they</a:t>
-            </a:r>
-            <a:r>
-              <a:rPr lang="sv-SE" dirty="0" smtClean="0"/>
-              <a:t>?</a:t>
-            </a:r>
-            <a:endParaRPr lang="sv-SE" dirty="0"/>
-          </a:p>
-        </p:txBody>
-      </p:sp>
-      <p:sp>
-        <p:nvSpPr>
-          <p:cNvPr id="3" name="Rectangle 2"/>
-          <p:cNvSpPr/>
-          <p:nvPr/>
-        </p:nvSpPr>
-        <p:spPr>
-          <a:xfrm>
-            <a:off x="686444" y="2482896"/>
-            <a:ext cx="7756812" cy="1235728"/>
-          </a:xfrm>
-          <a:prstGeom prst="rect">
-            <a:avLst/>
-          </a:prstGeom>
-          <a:noFill/>
-          <a:ln w="44450">
-            <a:solidFill>
-              <a:srgbClr val="1F5E12"/>
-            </a:solidFill>
-          </a:ln>
-        </p:spPr>
-        <p:style>
-          <a:lnRef idx="1">
-            <a:schemeClr val="accent1"/>
-          </a:lnRef>
-          <a:fillRef idx="3">
-            <a:schemeClr val="accent1"/>
-          </a:fillRef>
-          <a:effectRef idx="2">
-            <a:schemeClr val="accent1"/>
-          </a:effectRef>
-          <a:fontRef idx="minor">
-            <a:schemeClr val="lt1"/>
-          </a:fontRef>
-        </p:style>
-        <p:txBody>
-          <a:bodyPr rtlCol="0" anchor="ctr"/>
-          <a:lstStyle/>
-          <a:p>
-            <a:pPr algn="ctr"/>
-            <a:endParaRPr lang="en-US"/>
-          </a:p>
-        </p:txBody>
-      </p:sp>
-      <p:sp>
-        <p:nvSpPr>
-          <p:cNvPr id="6" name="Rectangle 5"/>
-          <p:cNvSpPr/>
-          <p:nvPr/>
-        </p:nvSpPr>
-        <p:spPr>
-          <a:xfrm>
-            <a:off x="686444" y="4305816"/>
-            <a:ext cx="7756812" cy="1235728"/>
-          </a:xfrm>
-          <a:prstGeom prst="rect">
-            <a:avLst/>
-          </a:prstGeom>
-          <a:noFill/>
-          <a:ln w="44450">
-            <a:solidFill>
-              <a:srgbClr val="1F5E12"/>
-            </a:solidFill>
-          </a:ln>
-        </p:spPr>
-        <p:style>
-          <a:lnRef idx="1">
-            <a:schemeClr val="accent1"/>
-          </a:lnRef>
-          <a:fillRef idx="3">
-            <a:schemeClr val="accent1"/>
-          </a:fillRef>
-          <a:effectRef idx="2">
-            <a:schemeClr val="accent1"/>
-          </a:effectRef>
-          <a:fontRef idx="minor">
-            <a:schemeClr val="lt1"/>
-          </a:fontRef>
-        </p:style>
-        <p:txBody>
-          <a:bodyPr rtlCol="0" anchor="ctr"/>
-          <a:lstStyle/>
-          <a:p>
-            <a:pPr algn="ctr"/>
-            <a:endParaRPr lang="en-US"/>
-          </a:p>
-        </p:txBody>
-      </p:sp>
-      <p:sp>
-        <p:nvSpPr>
-          <p:cNvPr id="4" name="TextBox 3"/>
-          <p:cNvSpPr txBox="1"/>
-          <p:nvPr/>
-        </p:nvSpPr>
-        <p:spPr>
-          <a:xfrm>
-            <a:off x="7390719" y="2837596"/>
-            <a:ext cx="1006784" cy="461665"/>
-          </a:xfrm>
-          <a:prstGeom prst="rect">
-            <a:avLst/>
-          </a:prstGeom>
-          <a:noFill/>
-        </p:spPr>
-        <p:txBody>
-          <a:bodyPr wrap="square" rtlCol="0">
-            <a:spAutoFit/>
-          </a:bodyPr>
-          <a:lstStyle/>
-          <a:p>
-            <a:r>
-              <a:rPr lang="en-US" sz="2400" i="1" dirty="0" smtClean="0">
-                <a:solidFill>
-                  <a:srgbClr val="C63D2E"/>
-                </a:solidFill>
-              </a:rPr>
-              <a:t>John</a:t>
-            </a:r>
-            <a:endParaRPr lang="en-US" sz="2400" i="1" dirty="0">
-              <a:solidFill>
-                <a:srgbClr val="C63D2E"/>
-              </a:solidFill>
-            </a:endParaRPr>
-          </a:p>
-        </p:txBody>
-      </p:sp>
-      <p:sp>
-        <p:nvSpPr>
-          <p:cNvPr id="7" name="TextBox 6"/>
-          <p:cNvSpPr txBox="1"/>
-          <p:nvPr/>
-        </p:nvSpPr>
-        <p:spPr>
-          <a:xfrm>
-            <a:off x="6063591" y="4717726"/>
-            <a:ext cx="2173738" cy="461665"/>
-          </a:xfrm>
-          <a:prstGeom prst="rect">
-            <a:avLst/>
-          </a:prstGeom>
-          <a:noFill/>
-        </p:spPr>
-        <p:txBody>
-          <a:bodyPr wrap="square" rtlCol="0">
-            <a:spAutoFit/>
-          </a:bodyPr>
-          <a:lstStyle/>
-          <a:p>
-            <a:r>
-              <a:rPr lang="en-US" sz="2400" i="1" dirty="0" smtClean="0">
-                <a:solidFill>
-                  <a:srgbClr val="C63D2E"/>
-                </a:solidFill>
-              </a:rPr>
-              <a:t>Pontus &amp; </a:t>
-            </a:r>
-            <a:r>
-              <a:rPr lang="en-US" sz="2400" i="1" dirty="0" err="1" smtClean="0">
-                <a:solidFill>
-                  <a:srgbClr val="C63D2E"/>
-                </a:solidFill>
-              </a:rPr>
-              <a:t>Albin</a:t>
-            </a:r>
-            <a:endParaRPr lang="en-US" sz="2400" i="1" dirty="0">
-              <a:solidFill>
-                <a:srgbClr val="C63D2E"/>
-              </a:solidFill>
-            </a:endParaRPr>
-          </a:p>
-        </p:txBody>
-      </p:sp>
-    </p:spTree>
-    <p:extLst>
-      <p:ext uri="{BB962C8B-B14F-4D97-AF65-F5344CB8AC3E}">
-        <p14:creationId xmlns:p14="http://schemas.microsoft.com/office/powerpoint/2010/main" val="1990212181"/>
-      </p:ext>
-    </p:extLst>
-  </p:cSld>
-  <p:clrMapOvr>
-    <a:masterClrMapping/>
-  </p:clrMapOvr>
-</p:sld>
-</file>
-
-<file path=ppt/slides/slide5.xml><?xml version="1.0" encoding="utf-8"?>
-<p:sld xmlns:a="http://schemas.openxmlformats.org/drawingml/2006/main" xmlns:r="http://schemas.openxmlformats.org/officeDocument/2006/relationships" xmlns:p="http://schemas.openxmlformats.org/presentationml/2006/main">
-  <p:cSld>
-    <p:spTree>
-      <p:nvGrpSpPr>
-        <p:cNvPr id="1" name=""/>
-        <p:cNvGrpSpPr/>
-        <p:nvPr/>
-      </p:nvGrpSpPr>
-      <p:grpSpPr>
-        <a:xfrm>
-          <a:off x="0" y="0"/>
-          <a:ext cx="0" cy="0"/>
-          <a:chOff x="0" y="0"/>
-          <a:chExt cx="0" cy="0"/>
-        </a:xfrm>
-      </p:grpSpPr>
-      <p:sp>
-        <p:nvSpPr>
-          <p:cNvPr id="2" name="Title 1"/>
-          <p:cNvSpPr>
-            <a:spLocks noGrp="1"/>
-          </p:cNvSpPr>
-          <p:nvPr>
-            <p:ph type="title"/>
-          </p:nvPr>
-        </p:nvSpPr>
-        <p:spPr/>
-        <p:txBody>
-          <a:bodyPr/>
-          <a:lstStyle/>
-          <a:p>
-            <a:r>
-              <a:rPr lang="en-US" dirty="0"/>
-              <a:t>Dataset and Operations</a:t>
-            </a:r>
-          </a:p>
-        </p:txBody>
-      </p:sp>
-      <p:pic>
-        <p:nvPicPr>
-          <p:cNvPr id="4" name="Content Placeholder 3">
-            <a:extLst>
-              <a:ext uri="{FF2B5EF4-FFF2-40B4-BE49-F238E27FC236}">
-                <a16:creationId xmlns:a16="http://schemas.microsoft.com/office/drawing/2014/main" xmlns="" id="{DEF7A5A9-8477-4446-A047-619E4695C61A}"/>
-              </a:ext>
-            </a:extLst>
-          </p:cNvPr>
-          <p:cNvPicPr>
-            <a:picLocks noGrp="1" noChangeAspect="1"/>
-          </p:cNvPicPr>
-          <p:nvPr>
-            <p:ph idx="1"/>
-          </p:nvPr>
-        </p:nvPicPr>
-        <p:blipFill>
-          <a:blip r:embed="rId2"/>
-          <a:stretch>
-            <a:fillRect/>
-          </a:stretch>
-        </p:blipFill>
-        <p:spPr>
-          <a:xfrm>
-            <a:off x="1699709" y="1947131"/>
-            <a:ext cx="5642634" cy="4062697"/>
-          </a:xfrm>
-          <a:prstGeom prst="rect">
-            <a:avLst/>
-          </a:prstGeom>
-        </p:spPr>
-      </p:pic>
-    </p:spTree>
-    <p:extLst>
-      <p:ext uri="{BB962C8B-B14F-4D97-AF65-F5344CB8AC3E}">
-        <p14:creationId xmlns:p14="http://schemas.microsoft.com/office/powerpoint/2010/main" val="3272793681"/>
-      </p:ext>
-    </p:extLst>
-  </p:cSld>
-  <p:clrMapOvr>
-    <a:masterClrMapping/>
-  </p:clrMapOvr>
-</p:sld>
-</file>
-
-<file path=ppt/slides/slide6.xml><?xml version="1.0" encoding="utf-8"?>
-<p:sld xmlns:a="http://schemas.openxmlformats.org/drawingml/2006/main" xmlns:r="http://schemas.openxmlformats.org/officeDocument/2006/relationships" xmlns:p="http://schemas.openxmlformats.org/presentationml/2006/main">
-  <p:cSld>
-    <p:spTree>
-      <p:nvGrpSpPr>
-        <p:cNvPr id="1" name=""/>
-        <p:cNvGrpSpPr/>
-        <p:nvPr/>
-      </p:nvGrpSpPr>
-      <p:grpSpPr>
-        <a:xfrm>
-          <a:off x="0" y="0"/>
-          <a:ext cx="0" cy="0"/>
-          <a:chOff x="0" y="0"/>
-          <a:chExt cx="0" cy="0"/>
-        </a:xfrm>
-      </p:grpSpPr>
-      <p:sp>
-        <p:nvSpPr>
-          <p:cNvPr id="2" name="Title 1"/>
-          <p:cNvSpPr>
-            <a:spLocks noGrp="1"/>
-          </p:cNvSpPr>
-          <p:nvPr>
-            <p:ph type="title"/>
-          </p:nvPr>
-        </p:nvSpPr>
-        <p:spPr/>
-        <p:txBody>
-          <a:bodyPr/>
-          <a:lstStyle/>
-          <a:p>
-            <a:r>
-              <a:rPr lang="en-US" dirty="0"/>
-              <a:t>Project Background and Motivation</a:t>
-            </a:r>
-          </a:p>
-        </p:txBody>
-      </p:sp>
-      <p:sp>
-        <p:nvSpPr>
-          <p:cNvPr id="5" name="Content Placeholder 4">
-            <a:extLst>
-              <a:ext uri="{FF2B5EF4-FFF2-40B4-BE49-F238E27FC236}">
-                <a16:creationId xmlns:a16="http://schemas.microsoft.com/office/drawing/2014/main" xmlns="" id="{59F35F09-3D93-6942-9815-83581FE0BF48}"/>
-              </a:ext>
-            </a:extLst>
-          </p:cNvPr>
-          <p:cNvSpPr>
-            <a:spLocks noGrp="1"/>
-          </p:cNvSpPr>
-          <p:nvPr>
-            <p:ph idx="1"/>
-          </p:nvPr>
-        </p:nvSpPr>
-        <p:spPr/>
-        <p:txBody>
-          <a:bodyPr/>
-          <a:lstStyle/>
-          <a:p>
-            <a:pPr lvl="1"/>
-            <a:r>
-              <a:rPr lang="sv-SE" dirty="0" err="1"/>
-              <a:t>What</a:t>
-            </a:r>
-            <a:r>
-              <a:rPr lang="sv-SE" dirty="0"/>
-              <a:t> </a:t>
-            </a:r>
-            <a:r>
-              <a:rPr lang="sv-SE" dirty="0" err="1"/>
-              <a:t>analysis</a:t>
-            </a:r>
-            <a:r>
-              <a:rPr lang="sv-SE" dirty="0"/>
-              <a:t> </a:t>
-            </a:r>
-            <a:r>
-              <a:rPr lang="sv-SE" dirty="0" err="1"/>
-              <a:t>have</a:t>
-            </a:r>
-            <a:r>
-              <a:rPr lang="sv-SE" dirty="0"/>
-              <a:t> </a:t>
-            </a:r>
-            <a:r>
-              <a:rPr lang="sv-SE" dirty="0" err="1"/>
-              <a:t>others</a:t>
-            </a:r>
-            <a:r>
-              <a:rPr lang="sv-SE" dirty="0"/>
-              <a:t> </a:t>
-            </a:r>
-            <a:r>
-              <a:rPr lang="sv-SE" dirty="0" err="1"/>
-              <a:t>done</a:t>
-            </a:r>
-            <a:r>
-              <a:rPr lang="sv-SE" dirty="0"/>
-              <a:t> on the </a:t>
-            </a:r>
-            <a:r>
-              <a:rPr lang="sv-SE" dirty="0" err="1"/>
-              <a:t>dataset</a:t>
-            </a:r>
-            <a:r>
-              <a:rPr lang="sv-SE" dirty="0"/>
-              <a:t>?</a:t>
-            </a:r>
-          </a:p>
-          <a:p>
-            <a:pPr lvl="1"/>
-            <a:r>
-              <a:rPr lang="sv-SE" dirty="0" err="1"/>
-              <a:t>What</a:t>
-            </a:r>
-            <a:r>
-              <a:rPr lang="sv-SE" dirty="0"/>
-              <a:t> </a:t>
-            </a:r>
-            <a:r>
-              <a:rPr lang="sv-SE" dirty="0" err="1"/>
-              <a:t>questions</a:t>
-            </a:r>
-            <a:r>
-              <a:rPr lang="sv-SE" dirty="0"/>
-              <a:t> </a:t>
-            </a:r>
-            <a:r>
-              <a:rPr lang="sv-SE" dirty="0" err="1"/>
-              <a:t>are</a:t>
-            </a:r>
-            <a:r>
-              <a:rPr lang="sv-SE" dirty="0"/>
-              <a:t> </a:t>
-            </a:r>
-            <a:r>
-              <a:rPr lang="sv-SE" dirty="0" err="1"/>
-              <a:t>interesting</a:t>
-            </a:r>
-            <a:r>
-              <a:rPr lang="sv-SE" dirty="0"/>
-              <a:t>?</a:t>
-            </a:r>
-          </a:p>
-          <a:p>
-            <a:pPr marL="274320" lvl="1" indent="0">
-              <a:buNone/>
-            </a:pPr>
-            <a:endParaRPr lang="sv-SE" dirty="0"/>
-          </a:p>
-          <a:p>
-            <a:pPr marL="274320" lvl="1" indent="0">
-              <a:buNone/>
-            </a:pPr>
-            <a:r>
-              <a:rPr lang="sv-SE" dirty="0" err="1"/>
-              <a:t>Previous</a:t>
-            </a:r>
-            <a:r>
-              <a:rPr lang="sv-SE" dirty="0"/>
-              <a:t> research:</a:t>
-            </a:r>
-          </a:p>
-          <a:p>
-            <a:pPr lvl="1"/>
-            <a:r>
-              <a:rPr lang="sv-SE" dirty="0" err="1"/>
-              <a:t>Reverse</a:t>
-            </a:r>
-            <a:r>
-              <a:rPr lang="sv-SE" dirty="0"/>
-              <a:t> </a:t>
-            </a:r>
-            <a:r>
-              <a:rPr lang="sv-SE" dirty="0" err="1"/>
-              <a:t>engineer</a:t>
-            </a:r>
-            <a:r>
-              <a:rPr lang="sv-SE" dirty="0"/>
-              <a:t> site </a:t>
-            </a:r>
-            <a:r>
-              <a:rPr lang="sv-SE" dirty="0" err="1"/>
-              <a:t>security</a:t>
-            </a:r>
-            <a:r>
-              <a:rPr lang="sv-SE" dirty="0"/>
-              <a:t> </a:t>
-            </a:r>
-            <a:r>
-              <a:rPr lang="sv-SE" dirty="0" err="1"/>
-              <a:t>practices</a:t>
-            </a:r>
-            <a:endParaRPr lang="sv-SE" dirty="0"/>
-          </a:p>
-          <a:p>
-            <a:pPr lvl="1"/>
-            <a:r>
-              <a:rPr lang="sv-SE" dirty="0" err="1"/>
-              <a:t>Understanding</a:t>
-            </a:r>
-            <a:r>
-              <a:rPr lang="sv-SE" dirty="0"/>
-              <a:t> </a:t>
-            </a:r>
-            <a:r>
-              <a:rPr lang="sv-SE" dirty="0" err="1"/>
-              <a:t>user</a:t>
-            </a:r>
-            <a:r>
-              <a:rPr lang="sv-SE" dirty="0"/>
-              <a:t> </a:t>
-            </a:r>
-            <a:r>
-              <a:rPr lang="sv-SE" dirty="0" err="1"/>
-              <a:t>behaviour</a:t>
-            </a:r>
-            <a:endParaRPr lang="sv-SE" dirty="0"/>
-          </a:p>
-          <a:p>
-            <a:pPr lvl="2"/>
-            <a:r>
-              <a:rPr lang="sv-SE" dirty="0" err="1"/>
-              <a:t>Password</a:t>
-            </a:r>
-            <a:r>
-              <a:rPr lang="sv-SE" dirty="0"/>
-              <a:t> </a:t>
-            </a:r>
-            <a:r>
-              <a:rPr lang="sv-SE" dirty="0" err="1"/>
-              <a:t>reuse</a:t>
-            </a:r>
-            <a:endParaRPr lang="sv-SE" dirty="0"/>
-          </a:p>
-          <a:p>
-            <a:pPr lvl="2"/>
-            <a:r>
-              <a:rPr lang="sv-SE" dirty="0" err="1"/>
-              <a:t>Patterns</a:t>
-            </a:r>
-            <a:r>
-              <a:rPr lang="sv-SE" dirty="0"/>
-              <a:t>, variations, and </a:t>
-            </a:r>
-            <a:r>
-              <a:rPr lang="sv-SE" dirty="0" err="1"/>
-              <a:t>password</a:t>
-            </a:r>
-            <a:r>
-              <a:rPr lang="sv-SE" dirty="0"/>
-              <a:t> </a:t>
-            </a:r>
-            <a:r>
-              <a:rPr lang="sv-SE" dirty="0" err="1"/>
-              <a:t>history</a:t>
-            </a:r>
-            <a:endParaRPr lang="sv-SE" dirty="0"/>
-          </a:p>
-          <a:p>
-            <a:pPr lvl="2"/>
-            <a:r>
-              <a:rPr lang="sv-SE" dirty="0"/>
-              <a:t>Regional </a:t>
-            </a:r>
-            <a:r>
-              <a:rPr lang="sv-SE" dirty="0" err="1"/>
-              <a:t>differences</a:t>
-            </a:r>
-            <a:endParaRPr lang="sv-SE" dirty="0"/>
-          </a:p>
-          <a:p>
-            <a:pPr lvl="1"/>
-            <a:r>
-              <a:rPr lang="sv-SE" dirty="0" err="1"/>
-              <a:t>Training</a:t>
-            </a:r>
-            <a:r>
-              <a:rPr lang="sv-SE" dirty="0"/>
-              <a:t> neural </a:t>
-            </a:r>
-            <a:r>
-              <a:rPr lang="sv-SE" dirty="0" err="1"/>
-              <a:t>networks</a:t>
-            </a:r>
-            <a:r>
-              <a:rPr lang="sv-SE" dirty="0"/>
-              <a:t> to </a:t>
-            </a:r>
-            <a:r>
-              <a:rPr lang="sv-SE" dirty="0" err="1"/>
-              <a:t>evaluate</a:t>
-            </a:r>
-            <a:r>
-              <a:rPr lang="sv-SE" dirty="0"/>
-              <a:t> </a:t>
-            </a:r>
-            <a:r>
-              <a:rPr lang="sv-SE" dirty="0" err="1"/>
-              <a:t>password</a:t>
-            </a:r>
-            <a:r>
-              <a:rPr lang="sv-SE" dirty="0"/>
-              <a:t> </a:t>
-            </a:r>
-            <a:r>
-              <a:rPr lang="sv-SE" dirty="0" err="1"/>
-              <a:t>security</a:t>
-            </a:r>
-            <a:r>
-              <a:rPr lang="sv-SE" dirty="0"/>
-              <a:t> (!)</a:t>
-            </a:r>
-          </a:p>
-        </p:txBody>
-      </p:sp>
-    </p:spTree>
-    <p:extLst>
-      <p:ext uri="{BB962C8B-B14F-4D97-AF65-F5344CB8AC3E}">
-        <p14:creationId xmlns:p14="http://schemas.microsoft.com/office/powerpoint/2010/main" val="3894717909"/>
-      </p:ext>
-    </p:extLst>
-  </p:cSld>
-  <p:clrMapOvr>
-    <a:masterClrMapping/>
-  </p:clrMapOvr>
-</p:sld>
-</file>
-
-<file path=ppt/slides/slide7.xml><?xml version="1.0" encoding="utf-8"?>
-<p:sld xmlns:a="http://schemas.openxmlformats.org/drawingml/2006/main" xmlns:r="http://schemas.openxmlformats.org/officeDocument/2006/relationships" xmlns:p="http://schemas.openxmlformats.org/presentationml/2006/main">
-  <p:cSld>
-    <p:spTree>
-      <p:nvGrpSpPr>
-        <p:cNvPr id="1" name=""/>
-        <p:cNvGrpSpPr/>
-        <p:nvPr/>
-      </p:nvGrpSpPr>
-      <p:grpSpPr>
-        <a:xfrm>
-          <a:off x="0" y="0"/>
-          <a:ext cx="0" cy="0"/>
-          <a:chOff x="0" y="0"/>
-          <a:chExt cx="0" cy="0"/>
-        </a:xfrm>
-      </p:grpSpPr>
-      <p:sp>
-        <p:nvSpPr>
-          <p:cNvPr id="2" name="Title 1"/>
-          <p:cNvSpPr>
-            <a:spLocks noGrp="1"/>
-          </p:cNvSpPr>
-          <p:nvPr>
-            <p:ph type="title"/>
-          </p:nvPr>
-        </p:nvSpPr>
-        <p:spPr/>
-        <p:txBody>
-          <a:bodyPr/>
-          <a:lstStyle/>
-          <a:p>
-            <a:r>
-              <a:rPr lang="en-US" dirty="0"/>
-              <a:t>Computational Experiments</a:t>
-            </a:r>
-          </a:p>
-        </p:txBody>
-      </p:sp>
-      <p:sp>
-        <p:nvSpPr>
-          <p:cNvPr id="5" name="Content Placeholder 4">
-            <a:extLst>
-              <a:ext uri="{FF2B5EF4-FFF2-40B4-BE49-F238E27FC236}">
-                <a16:creationId xmlns:a16="http://schemas.microsoft.com/office/drawing/2014/main" xmlns="" id="{905301C1-B205-E74E-A1BC-348C940E813B}"/>
-              </a:ext>
-            </a:extLst>
-          </p:cNvPr>
-          <p:cNvSpPr>
-            <a:spLocks noGrp="1"/>
-          </p:cNvSpPr>
-          <p:nvPr>
-            <p:ph idx="1"/>
-          </p:nvPr>
-        </p:nvSpPr>
-        <p:spPr/>
-        <p:txBody>
-          <a:bodyPr/>
-          <a:lstStyle/>
-          <a:p>
-            <a:r>
-              <a:rPr lang="sv-SE" dirty="0" err="1"/>
-              <a:t>Storage</a:t>
-            </a:r>
-            <a:r>
-              <a:rPr lang="sv-SE" dirty="0"/>
-              <a:t>: NFS vs HDFS</a:t>
-            </a:r>
-          </a:p>
-          <a:p>
-            <a:pPr lvl="1"/>
-            <a:r>
-              <a:rPr lang="sv-SE" dirty="0" err="1"/>
-              <a:t>Network</a:t>
-            </a:r>
-            <a:r>
-              <a:rPr lang="sv-SE" dirty="0"/>
-              <a:t> </a:t>
-            </a:r>
-            <a:r>
-              <a:rPr lang="sv-SE" dirty="0" err="1"/>
-              <a:t>characteristics</a:t>
-            </a:r>
-            <a:r>
-              <a:rPr lang="sv-SE" dirty="0"/>
-              <a:t>?</a:t>
-            </a:r>
-          </a:p>
-          <a:p>
-            <a:r>
-              <a:rPr lang="sv-SE" dirty="0" err="1"/>
-              <a:t>Scaling</a:t>
-            </a:r>
-            <a:r>
-              <a:rPr lang="sv-SE" dirty="0"/>
-              <a:t> on the </a:t>
-            </a:r>
-            <a:r>
-              <a:rPr lang="sv-SE" dirty="0" err="1"/>
-              <a:t>dataset</a:t>
-            </a:r>
-            <a:endParaRPr lang="sv-SE" dirty="0"/>
-          </a:p>
-          <a:p>
-            <a:pPr lvl="1"/>
-            <a:r>
-              <a:rPr lang="sv-SE" dirty="0" err="1"/>
-              <a:t>Weak</a:t>
-            </a:r>
-            <a:r>
-              <a:rPr lang="sv-SE" dirty="0"/>
-              <a:t> (</a:t>
-            </a:r>
-            <a:r>
-              <a:rPr lang="sv-SE" dirty="0" err="1"/>
-              <a:t>Dennard</a:t>
-            </a:r>
-            <a:r>
-              <a:rPr lang="sv-SE" dirty="0"/>
-              <a:t>) </a:t>
-            </a:r>
-            <a:r>
-              <a:rPr lang="sv-SE" dirty="0" err="1"/>
-              <a:t>scaling</a:t>
-            </a:r>
-            <a:endParaRPr lang="sv-SE" dirty="0"/>
-          </a:p>
-          <a:p>
-            <a:pPr lvl="1"/>
-            <a:r>
-              <a:rPr lang="sv-SE" dirty="0"/>
-              <a:t>Strong </a:t>
-            </a:r>
-            <a:r>
-              <a:rPr lang="sv-SE" dirty="0" err="1"/>
-              <a:t>scaling</a:t>
-            </a:r>
-            <a:endParaRPr lang="sv-SE" dirty="0"/>
-          </a:p>
-          <a:p>
-            <a:pPr lvl="1"/>
-            <a:endParaRPr lang="sv-SE" dirty="0"/>
-          </a:p>
-          <a:p>
-            <a:r>
-              <a:rPr lang="sv-SE" dirty="0" err="1"/>
-              <a:t>Run</a:t>
-            </a:r>
-            <a:r>
-              <a:rPr lang="sv-SE" dirty="0"/>
-              <a:t> experiments on 1–11 </a:t>
-            </a:r>
-            <a:r>
-              <a:rPr lang="sv-SE" dirty="0" err="1"/>
-              <a:t>nodes</a:t>
-            </a:r>
-            <a:endParaRPr lang="sv-SE" dirty="0"/>
-          </a:p>
-          <a:p>
-            <a:r>
-              <a:rPr lang="sv-SE" dirty="0" err="1"/>
-              <a:t>Variance</a:t>
-            </a:r>
-            <a:r>
-              <a:rPr lang="sv-SE" dirty="0"/>
-              <a:t>: </a:t>
-            </a:r>
-            <a:r>
-              <a:rPr lang="sv-SE" dirty="0" err="1"/>
-              <a:t>how</a:t>
-            </a:r>
-            <a:r>
-              <a:rPr lang="sv-SE" dirty="0"/>
-              <a:t> </a:t>
-            </a:r>
-            <a:r>
-              <a:rPr lang="sv-SE" dirty="0" err="1"/>
-              <a:t>reliable</a:t>
-            </a:r>
-            <a:r>
-              <a:rPr lang="sv-SE" dirty="0"/>
-              <a:t> is </a:t>
-            </a:r>
-            <a:r>
-              <a:rPr lang="sv-SE" dirty="0" err="1"/>
-              <a:t>any</a:t>
-            </a:r>
-            <a:r>
-              <a:rPr lang="sv-SE" dirty="0"/>
-              <a:t> </a:t>
-            </a:r>
-            <a:r>
-              <a:rPr lang="sv-SE" dirty="0" err="1"/>
-              <a:t>one</a:t>
-            </a:r>
-            <a:r>
-              <a:rPr lang="sv-SE" dirty="0"/>
-              <a:t> </a:t>
-            </a:r>
-            <a:r>
-              <a:rPr lang="sv-SE" dirty="0" err="1"/>
-              <a:t>measurement</a:t>
-            </a:r>
-            <a:r>
-              <a:rPr lang="sv-SE" dirty="0"/>
-              <a:t>?</a:t>
-            </a:r>
-          </a:p>
-          <a:p>
-            <a:pPr lvl="1"/>
-            <a:r>
-              <a:rPr lang="sv-SE" dirty="0" err="1"/>
-              <a:t>Can</a:t>
-            </a:r>
-            <a:r>
-              <a:rPr lang="sv-SE" dirty="0"/>
-              <a:t> </a:t>
-            </a:r>
-            <a:r>
-              <a:rPr lang="sv-SE" dirty="0" err="1"/>
-              <a:t>we</a:t>
-            </a:r>
-            <a:r>
-              <a:rPr lang="sv-SE" dirty="0"/>
-              <a:t> trust the </a:t>
-            </a:r>
-            <a:r>
-              <a:rPr lang="sv-SE" dirty="0" err="1"/>
-              <a:t>cloud</a:t>
-            </a:r>
-            <a:r>
-              <a:rPr lang="sv-SE" dirty="0"/>
-              <a:t> </a:t>
-            </a:r>
-            <a:r>
-              <a:rPr lang="sv-SE" dirty="0" err="1"/>
-              <a:t>with</a:t>
-            </a:r>
-            <a:r>
-              <a:rPr lang="sv-SE" dirty="0"/>
-              <a:t> </a:t>
-            </a:r>
-            <a:r>
-              <a:rPr lang="sv-SE" dirty="0" err="1"/>
-              <a:t>performance</a:t>
-            </a:r>
-            <a:r>
-              <a:rPr lang="sv-SE" dirty="0"/>
-              <a:t> </a:t>
-            </a:r>
-            <a:r>
-              <a:rPr lang="sv-SE" dirty="0" err="1"/>
-              <a:t>benchmarks</a:t>
-            </a:r>
-            <a:r>
-              <a:rPr lang="sv-SE" dirty="0"/>
-              <a:t>?</a:t>
-            </a:r>
-          </a:p>
-          <a:p>
-            <a:pPr lvl="1"/>
-            <a:endParaRPr lang="sv-SE" dirty="0"/>
-          </a:p>
-        </p:txBody>
-      </p:sp>
-    </p:spTree>
-    <p:extLst>
-      <p:ext uri="{BB962C8B-B14F-4D97-AF65-F5344CB8AC3E}">
-        <p14:creationId xmlns:p14="http://schemas.microsoft.com/office/powerpoint/2010/main" val="3771805064"/>
-      </p:ext>
-    </p:extLst>
-  </p:cSld>
-  <p:clrMapOvr>
-    <a:masterClrMapping/>
-  </p:clrMapOvr>
-</p:sld>
-</file>
-
-<file path=ppt/slides/slide8.xml><?xml version="1.0" encoding="utf-8"?>
-<p:sld xmlns:a="http://schemas.openxmlformats.org/drawingml/2006/main" xmlns:r="http://schemas.openxmlformats.org/officeDocument/2006/relationships" xmlns:p="http://schemas.openxmlformats.org/presentationml/2006/main">
-  <p:cSld>
-    <p:spTree>
-      <p:nvGrpSpPr>
-        <p:cNvPr id="1" name=""/>
-        <p:cNvGrpSpPr/>
-        <p:nvPr/>
-      </p:nvGrpSpPr>
-      <p:grpSpPr>
-        <a:xfrm>
-          <a:off x="0" y="0"/>
-          <a:ext cx="0" cy="0"/>
-          <a:chOff x="0" y="0"/>
-          <a:chExt cx="0" cy="0"/>
-        </a:xfrm>
-      </p:grpSpPr>
-      <p:sp>
-        <p:nvSpPr>
-          <p:cNvPr id="2" name="Title 1"/>
-          <p:cNvSpPr>
-            <a:spLocks noGrp="1"/>
-          </p:cNvSpPr>
-          <p:nvPr>
-            <p:ph type="title"/>
-          </p:nvPr>
-        </p:nvSpPr>
-        <p:spPr/>
-        <p:txBody>
-          <a:bodyPr/>
-          <a:lstStyle/>
-          <a:p>
-            <a:r>
-              <a:rPr lang="en-US" dirty="0"/>
-              <a:t>Preliminary Results</a:t>
-            </a:r>
-          </a:p>
-        </p:txBody>
-      </p:sp>
-      <p:sp>
-        <p:nvSpPr>
-          <p:cNvPr id="5" name="Content Placeholder 4">
-            <a:extLst>
-              <a:ext uri="{FF2B5EF4-FFF2-40B4-BE49-F238E27FC236}">
-                <a16:creationId xmlns:a16="http://schemas.microsoft.com/office/drawing/2014/main" xmlns="" id="{905301C1-B205-E74E-A1BC-348C940E813B}"/>
+                <a16:creationId xmlns="" xmlns:a16="http://schemas.microsoft.com/office/drawing/2014/main" id="{905301C1-B205-E74E-A1BC-348C940E813B}"/>
               </a:ext>
             </a:extLst>
           </p:cNvPr>
@@ -5209,7 +4350,7 @@
           <p:cNvPr id="4" name="Picture 3">
             <a:extLst>
               <a:ext uri="{FF2B5EF4-FFF2-40B4-BE49-F238E27FC236}">
-                <a16:creationId xmlns:a16="http://schemas.microsoft.com/office/drawing/2014/main" xmlns="" id="{86D9A4EE-3865-B146-BE85-7340B3FBA3CA}"/>
+                <a16:creationId xmlns="" xmlns:a16="http://schemas.microsoft.com/office/drawing/2014/main" id="{86D9A4EE-3865-B146-BE85-7340B3FBA3CA}"/>
               </a:ext>
             </a:extLst>
           </p:cNvPr>
@@ -5244,7 +4385,7 @@
           <p:cNvPr id="6" name="Picture 5">
             <a:extLst>
               <a:ext uri="{FF2B5EF4-FFF2-40B4-BE49-F238E27FC236}">
-                <a16:creationId xmlns:a16="http://schemas.microsoft.com/office/drawing/2014/main" xmlns="" id="{E5ECEFCE-AAA5-1047-B334-7F79C8B16681}"/>
+                <a16:creationId xmlns="" xmlns:a16="http://schemas.microsoft.com/office/drawing/2014/main" id="{E5ECEFCE-AAA5-1047-B334-7F79C8B16681}"/>
               </a:ext>
             </a:extLst>
           </p:cNvPr>
@@ -5288,6 +4429,1645 @@
 </p:sld>
 </file>
 
+<file path=ppt/slides/slide13.xml><?xml version="1.0" encoding="utf-8"?>
+<p:sld xmlns:a="http://schemas.openxmlformats.org/drawingml/2006/main" xmlns:r="http://schemas.openxmlformats.org/officeDocument/2006/relationships" xmlns:p="http://schemas.openxmlformats.org/presentationml/2006/main">
+  <p:cSld>
+    <p:spTree>
+      <p:nvGrpSpPr>
+        <p:cNvPr id="1" name=""/>
+        <p:cNvGrpSpPr/>
+        <p:nvPr/>
+      </p:nvGrpSpPr>
+      <p:grpSpPr>
+        <a:xfrm>
+          <a:off x="0" y="0"/>
+          <a:ext cx="0" cy="0"/>
+          <a:chOff x="0" y="0"/>
+          <a:chExt cx="0" cy="0"/>
+        </a:xfrm>
+      </p:grpSpPr>
+      <p:sp>
+        <p:nvSpPr>
+          <p:cNvPr id="2" name="Title 1"/>
+          <p:cNvSpPr>
+            <a:spLocks noGrp="1"/>
+          </p:cNvSpPr>
+          <p:nvPr>
+            <p:ph type="title"/>
+          </p:nvPr>
+        </p:nvSpPr>
+        <p:spPr/>
+        <p:txBody>
+          <a:bodyPr>
+            <a:normAutofit/>
+          </a:bodyPr>
+          <a:lstStyle/>
+          <a:p>
+            <a:r>
+              <a:rPr lang="en-US" dirty="0"/>
+              <a:t>References</a:t>
+            </a:r>
+          </a:p>
+        </p:txBody>
+      </p:sp>
+      <p:sp>
+        <p:nvSpPr>
+          <p:cNvPr id="5" name="Content Placeholder 4">
+            <a:extLst>
+              <a:ext uri="{FF2B5EF4-FFF2-40B4-BE49-F238E27FC236}">
+                <a16:creationId xmlns="" xmlns:a16="http://schemas.microsoft.com/office/drawing/2014/main" id="{905301C1-B205-E74E-A1BC-348C940E813B}"/>
+              </a:ext>
+            </a:extLst>
+          </p:cNvPr>
+          <p:cNvSpPr>
+            <a:spLocks noGrp="1"/>
+          </p:cNvSpPr>
+          <p:nvPr>
+            <p:ph idx="1"/>
+          </p:nvPr>
+        </p:nvSpPr>
+        <p:spPr/>
+        <p:txBody>
+          <a:bodyPr/>
+          <a:lstStyle/>
+          <a:p>
+            <a:endParaRPr lang="sv-SE" dirty="0"/>
+          </a:p>
+        </p:txBody>
+      </p:sp>
+    </p:spTree>
+    <p:extLst>
+      <p:ext uri="{BB962C8B-B14F-4D97-AF65-F5344CB8AC3E}">
+        <p14:creationId xmlns:p14="http://schemas.microsoft.com/office/powerpoint/2010/main" val="3524345119"/>
+      </p:ext>
+    </p:extLst>
+  </p:cSld>
+  <p:clrMapOvr>
+    <a:masterClrMapping/>
+  </p:clrMapOvr>
+</p:sld>
+</file>
+
+<file path=ppt/slides/slide2.xml><?xml version="1.0" encoding="utf-8"?>
+<p:sld xmlns:a="http://schemas.openxmlformats.org/drawingml/2006/main" xmlns:r="http://schemas.openxmlformats.org/officeDocument/2006/relationships" xmlns:p="http://schemas.openxmlformats.org/presentationml/2006/main">
+  <p:cSld>
+    <p:spTree>
+      <p:nvGrpSpPr>
+        <p:cNvPr id="1" name=""/>
+        <p:cNvGrpSpPr/>
+        <p:nvPr/>
+      </p:nvGrpSpPr>
+      <p:grpSpPr>
+        <a:xfrm>
+          <a:off x="0" y="0"/>
+          <a:ext cx="0" cy="0"/>
+          <a:chOff x="0" y="0"/>
+          <a:chExt cx="0" cy="0"/>
+        </a:xfrm>
+      </p:grpSpPr>
+      <p:sp>
+        <p:nvSpPr>
+          <p:cNvPr id="2" name="Title 1"/>
+          <p:cNvSpPr>
+            <a:spLocks noGrp="1"/>
+          </p:cNvSpPr>
+          <p:nvPr>
+            <p:ph type="title"/>
+          </p:nvPr>
+        </p:nvSpPr>
+        <p:spPr>
+          <a:xfrm>
+            <a:off x="457200" y="569951"/>
+            <a:ext cx="8229600" cy="990600"/>
+          </a:xfrm>
+        </p:spPr>
+        <p:txBody>
+          <a:bodyPr/>
+          <a:lstStyle/>
+          <a:p>
+            <a:r>
+              <a:rPr lang="en-US" dirty="0" smtClean="0"/>
+              <a:t>Presentation Outline</a:t>
+            </a:r>
+            <a:endParaRPr lang="en-US" dirty="0"/>
+          </a:p>
+        </p:txBody>
+      </p:sp>
+      <p:sp>
+        <p:nvSpPr>
+          <p:cNvPr id="5" name="Content Placeholder 4">
+            <a:extLst>
+              <a:ext uri="{FF2B5EF4-FFF2-40B4-BE49-F238E27FC236}">
+                <a16:creationId xmlns="" xmlns:a16="http://schemas.microsoft.com/office/drawing/2014/main" id="{59F35F09-3D93-6942-9815-83581FE0BF48}"/>
+              </a:ext>
+            </a:extLst>
+          </p:cNvPr>
+          <p:cNvSpPr>
+            <a:spLocks noGrp="1"/>
+          </p:cNvSpPr>
+          <p:nvPr>
+            <p:ph idx="1"/>
+          </p:nvPr>
+        </p:nvSpPr>
+        <p:spPr/>
+        <p:txBody>
+          <a:bodyPr/>
+          <a:lstStyle/>
+          <a:p>
+            <a:pPr lvl="1"/>
+            <a:endParaRPr lang="sv-SE" dirty="0" smtClean="0"/>
+          </a:p>
+          <a:p>
+            <a:pPr marL="274320" lvl="1" indent="0">
+              <a:buNone/>
+            </a:pPr>
+            <a:endParaRPr lang="sv-SE" dirty="0"/>
+          </a:p>
+          <a:p>
+            <a:pPr marL="274320" lvl="1" indent="0">
+              <a:buNone/>
+            </a:pPr>
+            <a:endParaRPr lang="sv-SE" dirty="0" smtClean="0"/>
+          </a:p>
+          <a:p>
+            <a:pPr marL="274320" lvl="1" indent="0">
+              <a:buNone/>
+            </a:pPr>
+            <a:endParaRPr lang="sv-SE" dirty="0" smtClean="0"/>
+          </a:p>
+        </p:txBody>
+      </p:sp>
+    </p:spTree>
+    <p:extLst>
+      <p:ext uri="{BB962C8B-B14F-4D97-AF65-F5344CB8AC3E}">
+        <p14:creationId xmlns:p14="http://schemas.microsoft.com/office/powerpoint/2010/main" val="3862794373"/>
+      </p:ext>
+    </p:extLst>
+  </p:cSld>
+  <p:clrMapOvr>
+    <a:masterClrMapping/>
+  </p:clrMapOvr>
+</p:sld>
+</file>
+
+<file path=ppt/slides/slide3.xml><?xml version="1.0" encoding="utf-8"?>
+<p:sld xmlns:a="http://schemas.openxmlformats.org/drawingml/2006/main" xmlns:r="http://schemas.openxmlformats.org/officeDocument/2006/relationships" xmlns:p="http://schemas.openxmlformats.org/presentationml/2006/main">
+  <p:cSld>
+    <p:spTree>
+      <p:nvGrpSpPr>
+        <p:cNvPr id="1" name=""/>
+        <p:cNvGrpSpPr/>
+        <p:nvPr/>
+      </p:nvGrpSpPr>
+      <p:grpSpPr>
+        <a:xfrm>
+          <a:off x="0" y="0"/>
+          <a:ext cx="0" cy="0"/>
+          <a:chOff x="0" y="0"/>
+          <a:chExt cx="0" cy="0"/>
+        </a:xfrm>
+      </p:grpSpPr>
+      <p:sp>
+        <p:nvSpPr>
+          <p:cNvPr id="2" name="Title 1"/>
+          <p:cNvSpPr>
+            <a:spLocks noGrp="1"/>
+          </p:cNvSpPr>
+          <p:nvPr>
+            <p:ph type="title"/>
+          </p:nvPr>
+        </p:nvSpPr>
+        <p:spPr>
+          <a:xfrm>
+            <a:off x="457200" y="569951"/>
+            <a:ext cx="8229600" cy="990600"/>
+          </a:xfrm>
+        </p:spPr>
+        <p:txBody>
+          <a:bodyPr/>
+          <a:lstStyle/>
+          <a:p>
+            <a:r>
+              <a:rPr lang="en-US" dirty="0" smtClean="0"/>
+              <a:t>Presentation Outline</a:t>
+            </a:r>
+            <a:endParaRPr lang="en-US" dirty="0"/>
+          </a:p>
+        </p:txBody>
+      </p:sp>
+      <p:sp>
+        <p:nvSpPr>
+          <p:cNvPr id="5" name="Content Placeholder 4">
+            <a:extLst>
+              <a:ext uri="{FF2B5EF4-FFF2-40B4-BE49-F238E27FC236}">
+                <a16:creationId xmlns="" xmlns:a16="http://schemas.microsoft.com/office/drawing/2014/main" id="{59F35F09-3D93-6942-9815-83581FE0BF48}"/>
+              </a:ext>
+            </a:extLst>
+          </p:cNvPr>
+          <p:cNvSpPr>
+            <a:spLocks noGrp="1"/>
+          </p:cNvSpPr>
+          <p:nvPr>
+            <p:ph idx="1"/>
+          </p:nvPr>
+        </p:nvSpPr>
+        <p:spPr/>
+        <p:txBody>
+          <a:bodyPr/>
+          <a:lstStyle/>
+          <a:p>
+            <a:pPr lvl="1"/>
+            <a:endParaRPr lang="sv-SE" dirty="0" smtClean="0"/>
+          </a:p>
+          <a:p>
+            <a:pPr lvl="1"/>
+            <a:endParaRPr lang="sv-SE" dirty="0" smtClean="0"/>
+          </a:p>
+          <a:p>
+            <a:pPr lvl="1"/>
+            <a:endParaRPr lang="sv-SE" dirty="0" smtClean="0"/>
+          </a:p>
+          <a:p>
+            <a:pPr lvl="1"/>
+            <a:r>
+              <a:rPr lang="sv-SE" i="1" dirty="0" err="1" smtClean="0"/>
+              <a:t>What</a:t>
+            </a:r>
+            <a:r>
+              <a:rPr lang="sv-SE" i="1" dirty="0" smtClean="0"/>
+              <a:t> is </a:t>
+            </a:r>
+            <a:r>
+              <a:rPr lang="sv-SE" i="1" dirty="0" err="1" smtClean="0"/>
+              <a:t>our</a:t>
+            </a:r>
+            <a:r>
+              <a:rPr lang="sv-SE" i="1" dirty="0" smtClean="0"/>
+              <a:t> </a:t>
+            </a:r>
+            <a:r>
+              <a:rPr lang="sv-SE" i="1" dirty="0" err="1" smtClean="0"/>
+              <a:t>dataset</a:t>
+            </a:r>
+            <a:r>
+              <a:rPr lang="sv-SE" dirty="0" smtClean="0"/>
+              <a:t>?</a:t>
+            </a:r>
+          </a:p>
+          <a:p>
+            <a:pPr lvl="1"/>
+            <a:r>
+              <a:rPr lang="sv-SE" dirty="0"/>
+              <a:t>A</a:t>
+            </a:r>
+            <a:r>
+              <a:rPr lang="sv-SE" dirty="0" smtClean="0"/>
+              <a:t>nd </a:t>
+            </a:r>
+            <a:r>
+              <a:rPr lang="sv-SE" i="1" dirty="0" err="1" smtClean="0"/>
+              <a:t>why</a:t>
+            </a:r>
+            <a:r>
+              <a:rPr lang="sv-SE" i="1" dirty="0" smtClean="0"/>
+              <a:t> is it </a:t>
+            </a:r>
+            <a:r>
+              <a:rPr lang="sv-SE" i="1" dirty="0" err="1" smtClean="0"/>
+              <a:t>interesting</a:t>
+            </a:r>
+            <a:r>
+              <a:rPr lang="sv-SE" dirty="0"/>
+              <a:t>?</a:t>
+            </a:r>
+          </a:p>
+          <a:p>
+            <a:pPr marL="274320" lvl="1" indent="0">
+              <a:buNone/>
+            </a:pPr>
+            <a:endParaRPr lang="sv-SE" dirty="0"/>
+          </a:p>
+          <a:p>
+            <a:pPr marL="274320" lvl="1" indent="0">
+              <a:buNone/>
+            </a:pPr>
+            <a:endParaRPr lang="sv-SE" dirty="0" smtClean="0"/>
+          </a:p>
+          <a:p>
+            <a:pPr marL="274320" lvl="1" indent="0">
+              <a:buNone/>
+            </a:pPr>
+            <a:endParaRPr lang="sv-SE" dirty="0" smtClean="0"/>
+          </a:p>
+        </p:txBody>
+      </p:sp>
+      <p:sp>
+        <p:nvSpPr>
+          <p:cNvPr id="3" name="Rectangle 2"/>
+          <p:cNvSpPr/>
+          <p:nvPr/>
+        </p:nvSpPr>
+        <p:spPr>
+          <a:xfrm>
+            <a:off x="686444" y="2482896"/>
+            <a:ext cx="7756812" cy="1235728"/>
+          </a:xfrm>
+          <a:prstGeom prst="rect">
+            <a:avLst/>
+          </a:prstGeom>
+          <a:noFill/>
+          <a:ln w="44450">
+            <a:solidFill>
+              <a:srgbClr val="1F5E12"/>
+            </a:solidFill>
+          </a:ln>
+        </p:spPr>
+        <p:style>
+          <a:lnRef idx="1">
+            <a:schemeClr val="accent1"/>
+          </a:lnRef>
+          <a:fillRef idx="3">
+            <a:schemeClr val="accent1"/>
+          </a:fillRef>
+          <a:effectRef idx="2">
+            <a:schemeClr val="accent1"/>
+          </a:effectRef>
+          <a:fontRef idx="minor">
+            <a:schemeClr val="lt1"/>
+          </a:fontRef>
+        </p:style>
+        <p:txBody>
+          <a:bodyPr rtlCol="0" anchor="ctr"/>
+          <a:lstStyle/>
+          <a:p>
+            <a:pPr algn="ctr"/>
+            <a:endParaRPr lang="en-US"/>
+          </a:p>
+        </p:txBody>
+      </p:sp>
+      <p:sp>
+        <p:nvSpPr>
+          <p:cNvPr id="4" name="TextBox 3"/>
+          <p:cNvSpPr txBox="1"/>
+          <p:nvPr/>
+        </p:nvSpPr>
+        <p:spPr>
+          <a:xfrm>
+            <a:off x="7390719" y="2837596"/>
+            <a:ext cx="1006784" cy="461665"/>
+          </a:xfrm>
+          <a:prstGeom prst="rect">
+            <a:avLst/>
+          </a:prstGeom>
+          <a:noFill/>
+        </p:spPr>
+        <p:txBody>
+          <a:bodyPr wrap="square" rtlCol="0">
+            <a:spAutoFit/>
+          </a:bodyPr>
+          <a:lstStyle/>
+          <a:p>
+            <a:r>
+              <a:rPr lang="en-US" sz="2400" i="1" dirty="0" smtClean="0">
+                <a:solidFill>
+                  <a:srgbClr val="C63D2E"/>
+                </a:solidFill>
+              </a:rPr>
+              <a:t>John</a:t>
+            </a:r>
+            <a:endParaRPr lang="en-US" sz="2400" i="1" dirty="0">
+              <a:solidFill>
+                <a:srgbClr val="C63D2E"/>
+              </a:solidFill>
+            </a:endParaRPr>
+          </a:p>
+        </p:txBody>
+      </p:sp>
+    </p:spTree>
+    <p:extLst>
+      <p:ext uri="{BB962C8B-B14F-4D97-AF65-F5344CB8AC3E}">
+        <p14:creationId xmlns:p14="http://schemas.microsoft.com/office/powerpoint/2010/main" val="877112333"/>
+      </p:ext>
+    </p:extLst>
+  </p:cSld>
+  <p:clrMapOvr>
+    <a:masterClrMapping/>
+  </p:clrMapOvr>
+</p:sld>
+</file>
+
+<file path=ppt/slides/slide4.xml><?xml version="1.0" encoding="utf-8"?>
+<p:sld xmlns:a="http://schemas.openxmlformats.org/drawingml/2006/main" xmlns:r="http://schemas.openxmlformats.org/officeDocument/2006/relationships" xmlns:p="http://schemas.openxmlformats.org/presentationml/2006/main">
+  <p:cSld>
+    <p:spTree>
+      <p:nvGrpSpPr>
+        <p:cNvPr id="1" name=""/>
+        <p:cNvGrpSpPr/>
+        <p:nvPr/>
+      </p:nvGrpSpPr>
+      <p:grpSpPr>
+        <a:xfrm>
+          <a:off x="0" y="0"/>
+          <a:ext cx="0" cy="0"/>
+          <a:chOff x="0" y="0"/>
+          <a:chExt cx="0" cy="0"/>
+        </a:xfrm>
+      </p:grpSpPr>
+      <p:sp>
+        <p:nvSpPr>
+          <p:cNvPr id="2" name="Title 1"/>
+          <p:cNvSpPr>
+            <a:spLocks noGrp="1"/>
+          </p:cNvSpPr>
+          <p:nvPr>
+            <p:ph type="title"/>
+          </p:nvPr>
+        </p:nvSpPr>
+        <p:spPr>
+          <a:xfrm>
+            <a:off x="457200" y="569951"/>
+            <a:ext cx="8229600" cy="990600"/>
+          </a:xfrm>
+        </p:spPr>
+        <p:txBody>
+          <a:bodyPr/>
+          <a:lstStyle/>
+          <a:p>
+            <a:r>
+              <a:rPr lang="en-US" dirty="0" smtClean="0"/>
+              <a:t>Presentation Outline</a:t>
+            </a:r>
+            <a:endParaRPr lang="en-US" dirty="0"/>
+          </a:p>
+        </p:txBody>
+      </p:sp>
+      <p:sp>
+        <p:nvSpPr>
+          <p:cNvPr id="5" name="Content Placeholder 4">
+            <a:extLst>
+              <a:ext uri="{FF2B5EF4-FFF2-40B4-BE49-F238E27FC236}">
+                <a16:creationId xmlns="" xmlns:a16="http://schemas.microsoft.com/office/drawing/2014/main" id="{59F35F09-3D93-6942-9815-83581FE0BF48}"/>
+              </a:ext>
+            </a:extLst>
+          </p:cNvPr>
+          <p:cNvSpPr>
+            <a:spLocks noGrp="1"/>
+          </p:cNvSpPr>
+          <p:nvPr>
+            <p:ph idx="1"/>
+          </p:nvPr>
+        </p:nvSpPr>
+        <p:spPr/>
+        <p:txBody>
+          <a:bodyPr/>
+          <a:lstStyle/>
+          <a:p>
+            <a:pPr lvl="1"/>
+            <a:endParaRPr lang="sv-SE" dirty="0" smtClean="0"/>
+          </a:p>
+          <a:p>
+            <a:pPr lvl="1"/>
+            <a:endParaRPr lang="sv-SE" dirty="0" smtClean="0"/>
+          </a:p>
+          <a:p>
+            <a:pPr lvl="1"/>
+            <a:endParaRPr lang="sv-SE" dirty="0" smtClean="0"/>
+          </a:p>
+          <a:p>
+            <a:pPr lvl="1"/>
+            <a:r>
+              <a:rPr lang="sv-SE" i="1" dirty="0" err="1" smtClean="0"/>
+              <a:t>What</a:t>
+            </a:r>
+            <a:r>
+              <a:rPr lang="sv-SE" i="1" dirty="0" smtClean="0"/>
+              <a:t> is </a:t>
+            </a:r>
+            <a:r>
+              <a:rPr lang="sv-SE" i="1" dirty="0" err="1" smtClean="0"/>
+              <a:t>our</a:t>
+            </a:r>
+            <a:r>
+              <a:rPr lang="sv-SE" i="1" dirty="0" smtClean="0"/>
+              <a:t> </a:t>
+            </a:r>
+            <a:r>
+              <a:rPr lang="sv-SE" i="1" dirty="0" err="1" smtClean="0"/>
+              <a:t>dataset</a:t>
+            </a:r>
+            <a:r>
+              <a:rPr lang="sv-SE" dirty="0" smtClean="0"/>
+              <a:t>?</a:t>
+            </a:r>
+          </a:p>
+          <a:p>
+            <a:pPr lvl="1"/>
+            <a:r>
+              <a:rPr lang="sv-SE" dirty="0"/>
+              <a:t>A</a:t>
+            </a:r>
+            <a:r>
+              <a:rPr lang="sv-SE" dirty="0" smtClean="0"/>
+              <a:t>nd </a:t>
+            </a:r>
+            <a:r>
+              <a:rPr lang="sv-SE" i="1" dirty="0" err="1" smtClean="0"/>
+              <a:t>why</a:t>
+            </a:r>
+            <a:r>
+              <a:rPr lang="sv-SE" i="1" dirty="0" smtClean="0"/>
+              <a:t> is it </a:t>
+            </a:r>
+            <a:r>
+              <a:rPr lang="sv-SE" i="1" dirty="0" err="1" smtClean="0"/>
+              <a:t>interesting</a:t>
+            </a:r>
+            <a:r>
+              <a:rPr lang="sv-SE" dirty="0"/>
+              <a:t>?</a:t>
+            </a:r>
+          </a:p>
+          <a:p>
+            <a:pPr marL="274320" lvl="1" indent="0">
+              <a:buNone/>
+            </a:pPr>
+            <a:endParaRPr lang="sv-SE" dirty="0"/>
+          </a:p>
+          <a:p>
+            <a:pPr marL="274320" lvl="1" indent="0">
+              <a:buNone/>
+            </a:pPr>
+            <a:endParaRPr lang="sv-SE" dirty="0" smtClean="0"/>
+          </a:p>
+          <a:p>
+            <a:pPr lvl="1"/>
+            <a:endParaRPr lang="sv-SE" dirty="0" smtClean="0"/>
+          </a:p>
+          <a:p>
+            <a:pPr lvl="1"/>
+            <a:r>
+              <a:rPr lang="sv-SE" i="1" dirty="0" err="1" smtClean="0"/>
+              <a:t>What</a:t>
+            </a:r>
+            <a:r>
+              <a:rPr lang="sv-SE" i="1" dirty="0" smtClean="0"/>
+              <a:t> </a:t>
+            </a:r>
+            <a:r>
+              <a:rPr lang="sv-SE" i="1" dirty="0" err="1" smtClean="0"/>
+              <a:t>tools</a:t>
+            </a:r>
+            <a:r>
+              <a:rPr lang="sv-SE" i="1" dirty="0" smtClean="0"/>
+              <a:t> </a:t>
+            </a:r>
+            <a:r>
+              <a:rPr lang="sv-SE" i="1" dirty="0" err="1" smtClean="0"/>
+              <a:t>are</a:t>
+            </a:r>
+            <a:r>
+              <a:rPr lang="sv-SE" i="1" dirty="0" smtClean="0"/>
+              <a:t> </a:t>
+            </a:r>
+            <a:r>
+              <a:rPr lang="sv-SE" i="1" dirty="0" err="1" smtClean="0"/>
+              <a:t>we</a:t>
+            </a:r>
+            <a:r>
+              <a:rPr lang="sv-SE" i="1" dirty="0" smtClean="0"/>
+              <a:t> </a:t>
+            </a:r>
+            <a:r>
+              <a:rPr lang="sv-SE" i="1" dirty="0" err="1" smtClean="0"/>
+              <a:t>using</a:t>
+            </a:r>
+            <a:r>
+              <a:rPr lang="sv-SE" dirty="0" smtClean="0"/>
+              <a:t> for </a:t>
+            </a:r>
+            <a:r>
+              <a:rPr lang="sv-SE" dirty="0" err="1" smtClean="0"/>
+              <a:t>processing</a:t>
+            </a:r>
+            <a:r>
+              <a:rPr lang="sv-SE" dirty="0" smtClean="0"/>
+              <a:t>?</a:t>
+            </a:r>
+          </a:p>
+          <a:p>
+            <a:pPr lvl="1"/>
+            <a:r>
+              <a:rPr lang="sv-SE" dirty="0"/>
+              <a:t>A</a:t>
+            </a:r>
+            <a:r>
+              <a:rPr lang="sv-SE" dirty="0" smtClean="0"/>
+              <a:t>nd </a:t>
+            </a:r>
+            <a:r>
+              <a:rPr lang="sv-SE" i="1" dirty="0" err="1" smtClean="0"/>
+              <a:t>how</a:t>
+            </a:r>
+            <a:r>
+              <a:rPr lang="sv-SE" i="1" dirty="0" smtClean="0"/>
+              <a:t> </a:t>
+            </a:r>
+            <a:r>
+              <a:rPr lang="sv-SE" i="1" dirty="0" err="1" smtClean="0"/>
+              <a:t>effective</a:t>
+            </a:r>
+            <a:r>
+              <a:rPr lang="sv-SE" i="1" dirty="0" smtClean="0"/>
+              <a:t> </a:t>
+            </a:r>
+            <a:r>
+              <a:rPr lang="sv-SE" i="1" dirty="0" err="1" smtClean="0"/>
+              <a:t>are</a:t>
+            </a:r>
+            <a:r>
+              <a:rPr lang="sv-SE" i="1" dirty="0" smtClean="0"/>
+              <a:t> </a:t>
+            </a:r>
+            <a:r>
+              <a:rPr lang="sv-SE" i="1" dirty="0" err="1" smtClean="0"/>
+              <a:t>they</a:t>
+            </a:r>
+            <a:r>
+              <a:rPr lang="sv-SE" dirty="0" smtClean="0"/>
+              <a:t>?</a:t>
+            </a:r>
+            <a:endParaRPr lang="sv-SE" dirty="0"/>
+          </a:p>
+        </p:txBody>
+      </p:sp>
+      <p:sp>
+        <p:nvSpPr>
+          <p:cNvPr id="3" name="Rectangle 2"/>
+          <p:cNvSpPr/>
+          <p:nvPr/>
+        </p:nvSpPr>
+        <p:spPr>
+          <a:xfrm>
+            <a:off x="686444" y="2482896"/>
+            <a:ext cx="7756812" cy="1235728"/>
+          </a:xfrm>
+          <a:prstGeom prst="rect">
+            <a:avLst/>
+          </a:prstGeom>
+          <a:noFill/>
+          <a:ln w="44450">
+            <a:solidFill>
+              <a:srgbClr val="1F5E12"/>
+            </a:solidFill>
+          </a:ln>
+        </p:spPr>
+        <p:style>
+          <a:lnRef idx="1">
+            <a:schemeClr val="accent1"/>
+          </a:lnRef>
+          <a:fillRef idx="3">
+            <a:schemeClr val="accent1"/>
+          </a:fillRef>
+          <a:effectRef idx="2">
+            <a:schemeClr val="accent1"/>
+          </a:effectRef>
+          <a:fontRef idx="minor">
+            <a:schemeClr val="lt1"/>
+          </a:fontRef>
+        </p:style>
+        <p:txBody>
+          <a:bodyPr rtlCol="0" anchor="ctr"/>
+          <a:lstStyle/>
+          <a:p>
+            <a:pPr algn="ctr"/>
+            <a:endParaRPr lang="en-US"/>
+          </a:p>
+        </p:txBody>
+      </p:sp>
+      <p:sp>
+        <p:nvSpPr>
+          <p:cNvPr id="6" name="Rectangle 5"/>
+          <p:cNvSpPr/>
+          <p:nvPr/>
+        </p:nvSpPr>
+        <p:spPr>
+          <a:xfrm>
+            <a:off x="686444" y="4305816"/>
+            <a:ext cx="7756812" cy="1235728"/>
+          </a:xfrm>
+          <a:prstGeom prst="rect">
+            <a:avLst/>
+          </a:prstGeom>
+          <a:noFill/>
+          <a:ln w="44450">
+            <a:solidFill>
+              <a:srgbClr val="1F5E12"/>
+            </a:solidFill>
+          </a:ln>
+        </p:spPr>
+        <p:style>
+          <a:lnRef idx="1">
+            <a:schemeClr val="accent1"/>
+          </a:lnRef>
+          <a:fillRef idx="3">
+            <a:schemeClr val="accent1"/>
+          </a:fillRef>
+          <a:effectRef idx="2">
+            <a:schemeClr val="accent1"/>
+          </a:effectRef>
+          <a:fontRef idx="minor">
+            <a:schemeClr val="lt1"/>
+          </a:fontRef>
+        </p:style>
+        <p:txBody>
+          <a:bodyPr rtlCol="0" anchor="ctr"/>
+          <a:lstStyle/>
+          <a:p>
+            <a:pPr algn="ctr"/>
+            <a:endParaRPr lang="en-US"/>
+          </a:p>
+        </p:txBody>
+      </p:sp>
+      <p:sp>
+        <p:nvSpPr>
+          <p:cNvPr id="4" name="TextBox 3"/>
+          <p:cNvSpPr txBox="1"/>
+          <p:nvPr/>
+        </p:nvSpPr>
+        <p:spPr>
+          <a:xfrm>
+            <a:off x="7390719" y="2837596"/>
+            <a:ext cx="1006784" cy="461665"/>
+          </a:xfrm>
+          <a:prstGeom prst="rect">
+            <a:avLst/>
+          </a:prstGeom>
+          <a:noFill/>
+        </p:spPr>
+        <p:txBody>
+          <a:bodyPr wrap="square" rtlCol="0">
+            <a:spAutoFit/>
+          </a:bodyPr>
+          <a:lstStyle/>
+          <a:p>
+            <a:r>
+              <a:rPr lang="en-US" sz="2400" i="1" dirty="0" smtClean="0">
+                <a:solidFill>
+                  <a:srgbClr val="C63D2E"/>
+                </a:solidFill>
+              </a:rPr>
+              <a:t>John</a:t>
+            </a:r>
+            <a:endParaRPr lang="en-US" sz="2400" i="1" dirty="0">
+              <a:solidFill>
+                <a:srgbClr val="C63D2E"/>
+              </a:solidFill>
+            </a:endParaRPr>
+          </a:p>
+        </p:txBody>
+      </p:sp>
+      <p:sp>
+        <p:nvSpPr>
+          <p:cNvPr id="7" name="TextBox 6"/>
+          <p:cNvSpPr txBox="1"/>
+          <p:nvPr/>
+        </p:nvSpPr>
+        <p:spPr>
+          <a:xfrm>
+            <a:off x="6063591" y="4717726"/>
+            <a:ext cx="2173738" cy="461665"/>
+          </a:xfrm>
+          <a:prstGeom prst="rect">
+            <a:avLst/>
+          </a:prstGeom>
+          <a:noFill/>
+        </p:spPr>
+        <p:txBody>
+          <a:bodyPr wrap="square" rtlCol="0">
+            <a:spAutoFit/>
+          </a:bodyPr>
+          <a:lstStyle/>
+          <a:p>
+            <a:r>
+              <a:rPr lang="en-US" sz="2400" i="1" dirty="0" smtClean="0">
+                <a:solidFill>
+                  <a:srgbClr val="C63D2E"/>
+                </a:solidFill>
+              </a:rPr>
+              <a:t>Pontus &amp; </a:t>
+            </a:r>
+            <a:r>
+              <a:rPr lang="en-US" sz="2400" i="1" dirty="0" err="1" smtClean="0">
+                <a:solidFill>
+                  <a:srgbClr val="C63D2E"/>
+                </a:solidFill>
+              </a:rPr>
+              <a:t>Albin</a:t>
+            </a:r>
+            <a:endParaRPr lang="en-US" sz="2400" i="1" dirty="0">
+              <a:solidFill>
+                <a:srgbClr val="C63D2E"/>
+              </a:solidFill>
+            </a:endParaRPr>
+          </a:p>
+        </p:txBody>
+      </p:sp>
+    </p:spTree>
+    <p:extLst>
+      <p:ext uri="{BB962C8B-B14F-4D97-AF65-F5344CB8AC3E}">
+        <p14:creationId xmlns:p14="http://schemas.microsoft.com/office/powerpoint/2010/main" val="1990212181"/>
+      </p:ext>
+    </p:extLst>
+  </p:cSld>
+  <p:clrMapOvr>
+    <a:masterClrMapping/>
+  </p:clrMapOvr>
+</p:sld>
+</file>
+
+<file path=ppt/slides/slide5.xml><?xml version="1.0" encoding="utf-8"?>
+<p:sld xmlns:a="http://schemas.openxmlformats.org/drawingml/2006/main" xmlns:r="http://schemas.openxmlformats.org/officeDocument/2006/relationships" xmlns:p="http://schemas.openxmlformats.org/presentationml/2006/main">
+  <p:cSld>
+    <p:spTree>
+      <p:nvGrpSpPr>
+        <p:cNvPr id="1" name=""/>
+        <p:cNvGrpSpPr/>
+        <p:nvPr/>
+      </p:nvGrpSpPr>
+      <p:grpSpPr>
+        <a:xfrm>
+          <a:off x="0" y="0"/>
+          <a:ext cx="0" cy="0"/>
+          <a:chOff x="0" y="0"/>
+          <a:chExt cx="0" cy="0"/>
+        </a:xfrm>
+      </p:grpSpPr>
+      <p:sp>
+        <p:nvSpPr>
+          <p:cNvPr id="2" name="Title 1"/>
+          <p:cNvSpPr>
+            <a:spLocks noGrp="1"/>
+          </p:cNvSpPr>
+          <p:nvPr>
+            <p:ph type="title"/>
+          </p:nvPr>
+        </p:nvSpPr>
+        <p:spPr/>
+        <p:txBody>
+          <a:bodyPr/>
+          <a:lstStyle/>
+          <a:p>
+            <a:r>
+              <a:rPr lang="en-US" dirty="0" smtClean="0"/>
+              <a:t>Dataset and Operations</a:t>
+            </a:r>
+            <a:endParaRPr lang="en-US" dirty="0"/>
+          </a:p>
+        </p:txBody>
+      </p:sp>
+      <p:sp>
+        <p:nvSpPr>
+          <p:cNvPr id="3" name="Content Placeholder 2"/>
+          <p:cNvSpPr>
+            <a:spLocks noGrp="1"/>
+          </p:cNvSpPr>
+          <p:nvPr>
+            <p:ph idx="1"/>
+          </p:nvPr>
+        </p:nvSpPr>
+        <p:spPr/>
+        <p:txBody>
+          <a:bodyPr/>
+          <a:lstStyle/>
+          <a:p>
+            <a:pPr marL="0" indent="0">
+              <a:buNone/>
+            </a:pPr>
+            <a:endParaRPr lang="en-US" dirty="0"/>
+          </a:p>
+          <a:p>
+            <a:endParaRPr lang="en-US" dirty="0"/>
+          </a:p>
+          <a:p>
+            <a:endParaRPr lang="en-US" dirty="0" smtClean="0"/>
+          </a:p>
+          <a:p>
+            <a:endParaRPr lang="en-US" dirty="0"/>
+          </a:p>
+          <a:p>
+            <a:endParaRPr lang="en-US" dirty="0" smtClean="0"/>
+          </a:p>
+        </p:txBody>
+      </p:sp>
+    </p:spTree>
+    <p:extLst>
+      <p:ext uri="{BB962C8B-B14F-4D97-AF65-F5344CB8AC3E}">
+        <p14:creationId xmlns:p14="http://schemas.microsoft.com/office/powerpoint/2010/main" val="73380307"/>
+      </p:ext>
+    </p:extLst>
+  </p:cSld>
+  <p:clrMapOvr>
+    <a:masterClrMapping/>
+  </p:clrMapOvr>
+</p:sld>
+</file>
+
+<file path=ppt/slides/slide6.xml><?xml version="1.0" encoding="utf-8"?>
+<p:sld xmlns:a="http://schemas.openxmlformats.org/drawingml/2006/main" xmlns:r="http://schemas.openxmlformats.org/officeDocument/2006/relationships" xmlns:p="http://schemas.openxmlformats.org/presentationml/2006/main">
+  <p:cSld>
+    <p:spTree>
+      <p:nvGrpSpPr>
+        <p:cNvPr id="1" name=""/>
+        <p:cNvGrpSpPr/>
+        <p:nvPr/>
+      </p:nvGrpSpPr>
+      <p:grpSpPr>
+        <a:xfrm>
+          <a:off x="0" y="0"/>
+          <a:ext cx="0" cy="0"/>
+          <a:chOff x="0" y="0"/>
+          <a:chExt cx="0" cy="0"/>
+        </a:xfrm>
+      </p:grpSpPr>
+      <p:sp>
+        <p:nvSpPr>
+          <p:cNvPr id="2" name="Title 1"/>
+          <p:cNvSpPr>
+            <a:spLocks noGrp="1"/>
+          </p:cNvSpPr>
+          <p:nvPr>
+            <p:ph type="title"/>
+          </p:nvPr>
+        </p:nvSpPr>
+        <p:spPr/>
+        <p:txBody>
+          <a:bodyPr/>
+          <a:lstStyle/>
+          <a:p>
+            <a:r>
+              <a:rPr lang="en-US" dirty="0" smtClean="0"/>
+              <a:t>Dataset and Operations</a:t>
+            </a:r>
+            <a:endParaRPr lang="en-US" dirty="0"/>
+          </a:p>
+        </p:txBody>
+      </p:sp>
+      <p:sp>
+        <p:nvSpPr>
+          <p:cNvPr id="3" name="Content Placeholder 2"/>
+          <p:cNvSpPr>
+            <a:spLocks noGrp="1"/>
+          </p:cNvSpPr>
+          <p:nvPr>
+            <p:ph idx="1"/>
+          </p:nvPr>
+        </p:nvSpPr>
+        <p:spPr/>
+        <p:txBody>
+          <a:bodyPr/>
+          <a:lstStyle/>
+          <a:p>
+            <a:r>
+              <a:rPr lang="en-US" dirty="0" smtClean="0"/>
+              <a:t>1.4 billion username-password pairs </a:t>
+            </a:r>
+            <a:r>
+              <a:rPr lang="en-US" dirty="0" smtClean="0"/>
+              <a:t>in multiple text files.</a:t>
+            </a:r>
+            <a:endParaRPr lang="en-US" dirty="0"/>
+          </a:p>
+          <a:p>
+            <a:pPr marL="0" indent="0">
+              <a:buNone/>
+            </a:pPr>
+            <a:endParaRPr lang="en-US" dirty="0"/>
+          </a:p>
+          <a:p>
+            <a:endParaRPr lang="en-US" dirty="0"/>
+          </a:p>
+          <a:p>
+            <a:endParaRPr lang="en-US" dirty="0" smtClean="0"/>
+          </a:p>
+          <a:p>
+            <a:endParaRPr lang="en-US" dirty="0"/>
+          </a:p>
+          <a:p>
+            <a:endParaRPr lang="en-US" dirty="0" smtClean="0"/>
+          </a:p>
+        </p:txBody>
+      </p:sp>
+    </p:spTree>
+    <p:extLst>
+      <p:ext uri="{BB962C8B-B14F-4D97-AF65-F5344CB8AC3E}">
+        <p14:creationId xmlns:p14="http://schemas.microsoft.com/office/powerpoint/2010/main" val="1828559288"/>
+      </p:ext>
+    </p:extLst>
+  </p:cSld>
+  <p:clrMapOvr>
+    <a:masterClrMapping/>
+  </p:clrMapOvr>
+</p:sld>
+</file>
+
+<file path=ppt/slides/slide7.xml><?xml version="1.0" encoding="utf-8"?>
+<p:sld xmlns:a="http://schemas.openxmlformats.org/drawingml/2006/main" xmlns:r="http://schemas.openxmlformats.org/officeDocument/2006/relationships" xmlns:p="http://schemas.openxmlformats.org/presentationml/2006/main">
+  <p:cSld>
+    <p:spTree>
+      <p:nvGrpSpPr>
+        <p:cNvPr id="1" name=""/>
+        <p:cNvGrpSpPr/>
+        <p:nvPr/>
+      </p:nvGrpSpPr>
+      <p:grpSpPr>
+        <a:xfrm>
+          <a:off x="0" y="0"/>
+          <a:ext cx="0" cy="0"/>
+          <a:chOff x="0" y="0"/>
+          <a:chExt cx="0" cy="0"/>
+        </a:xfrm>
+      </p:grpSpPr>
+      <p:sp>
+        <p:nvSpPr>
+          <p:cNvPr id="2" name="Title 1"/>
+          <p:cNvSpPr>
+            <a:spLocks noGrp="1"/>
+          </p:cNvSpPr>
+          <p:nvPr>
+            <p:ph type="title"/>
+          </p:nvPr>
+        </p:nvSpPr>
+        <p:spPr/>
+        <p:txBody>
+          <a:bodyPr/>
+          <a:lstStyle/>
+          <a:p>
+            <a:r>
+              <a:rPr lang="en-US" dirty="0" smtClean="0"/>
+              <a:t>Dataset and Operations</a:t>
+            </a:r>
+            <a:endParaRPr lang="en-US" dirty="0"/>
+          </a:p>
+        </p:txBody>
+      </p:sp>
+      <p:sp>
+        <p:nvSpPr>
+          <p:cNvPr id="3" name="Content Placeholder 2"/>
+          <p:cNvSpPr>
+            <a:spLocks noGrp="1"/>
+          </p:cNvSpPr>
+          <p:nvPr>
+            <p:ph idx="1"/>
+          </p:nvPr>
+        </p:nvSpPr>
+        <p:spPr/>
+        <p:txBody>
+          <a:bodyPr/>
+          <a:lstStyle/>
+          <a:p>
+            <a:r>
+              <a:rPr lang="en-US" dirty="0" smtClean="0"/>
+              <a:t>1.4 billion username-password pairs </a:t>
+            </a:r>
+            <a:r>
+              <a:rPr lang="en-US" dirty="0" smtClean="0"/>
+              <a:t>in multiple text files.</a:t>
+            </a:r>
+            <a:endParaRPr lang="en-US" dirty="0"/>
+          </a:p>
+          <a:p>
+            <a:pPr marL="0" indent="0">
+              <a:buNone/>
+            </a:pPr>
+            <a:endParaRPr lang="en-US" dirty="0"/>
+          </a:p>
+          <a:p>
+            <a:r>
+              <a:rPr lang="en-US" dirty="0" smtClean="0"/>
+              <a:t>Focus </a:t>
+            </a:r>
+            <a:r>
+              <a:rPr lang="en-US" dirty="0" smtClean="0"/>
+              <a:t>on passwords only and reduce by count.</a:t>
+            </a:r>
+          </a:p>
+          <a:p>
+            <a:endParaRPr lang="en-US" dirty="0"/>
+          </a:p>
+          <a:p>
+            <a:endParaRPr lang="en-US" dirty="0"/>
+          </a:p>
+          <a:p>
+            <a:endParaRPr lang="en-US" dirty="0" smtClean="0"/>
+          </a:p>
+          <a:p>
+            <a:endParaRPr lang="en-US" dirty="0"/>
+          </a:p>
+          <a:p>
+            <a:endParaRPr lang="en-US" dirty="0" smtClean="0"/>
+          </a:p>
+        </p:txBody>
+      </p:sp>
+    </p:spTree>
+    <p:extLst>
+      <p:ext uri="{BB962C8B-B14F-4D97-AF65-F5344CB8AC3E}">
+        <p14:creationId xmlns:p14="http://schemas.microsoft.com/office/powerpoint/2010/main" val="3592380380"/>
+      </p:ext>
+    </p:extLst>
+  </p:cSld>
+  <p:clrMapOvr>
+    <a:masterClrMapping/>
+  </p:clrMapOvr>
+</p:sld>
+</file>
+
+<file path=ppt/slides/slide8.xml><?xml version="1.0" encoding="utf-8"?>
+<p:sld xmlns:a="http://schemas.openxmlformats.org/drawingml/2006/main" xmlns:r="http://schemas.openxmlformats.org/officeDocument/2006/relationships" xmlns:p="http://schemas.openxmlformats.org/presentationml/2006/main">
+  <p:cSld>
+    <p:spTree>
+      <p:nvGrpSpPr>
+        <p:cNvPr id="1" name=""/>
+        <p:cNvGrpSpPr/>
+        <p:nvPr/>
+      </p:nvGrpSpPr>
+      <p:grpSpPr>
+        <a:xfrm>
+          <a:off x="0" y="0"/>
+          <a:ext cx="0" cy="0"/>
+          <a:chOff x="0" y="0"/>
+          <a:chExt cx="0" cy="0"/>
+        </a:xfrm>
+      </p:grpSpPr>
+      <p:sp>
+        <p:nvSpPr>
+          <p:cNvPr id="2" name="Title 1"/>
+          <p:cNvSpPr>
+            <a:spLocks noGrp="1"/>
+          </p:cNvSpPr>
+          <p:nvPr>
+            <p:ph type="title"/>
+          </p:nvPr>
+        </p:nvSpPr>
+        <p:spPr/>
+        <p:txBody>
+          <a:bodyPr/>
+          <a:lstStyle/>
+          <a:p>
+            <a:r>
+              <a:rPr lang="en-US" dirty="0" smtClean="0"/>
+              <a:t>Dataset and Operations</a:t>
+            </a:r>
+            <a:endParaRPr lang="en-US" dirty="0"/>
+          </a:p>
+        </p:txBody>
+      </p:sp>
+      <p:sp>
+        <p:nvSpPr>
+          <p:cNvPr id="3" name="Content Placeholder 2"/>
+          <p:cNvSpPr>
+            <a:spLocks noGrp="1"/>
+          </p:cNvSpPr>
+          <p:nvPr>
+            <p:ph idx="1"/>
+          </p:nvPr>
+        </p:nvSpPr>
+        <p:spPr/>
+        <p:txBody>
+          <a:bodyPr/>
+          <a:lstStyle/>
+          <a:p>
+            <a:r>
+              <a:rPr lang="en-US" dirty="0" smtClean="0"/>
+              <a:t>1.4 billion username-password pairs </a:t>
+            </a:r>
+            <a:r>
+              <a:rPr lang="en-US" dirty="0" smtClean="0"/>
+              <a:t>in multiple text files.</a:t>
+            </a:r>
+            <a:endParaRPr lang="en-US" dirty="0"/>
+          </a:p>
+          <a:p>
+            <a:pPr marL="0" indent="0">
+              <a:buNone/>
+            </a:pPr>
+            <a:endParaRPr lang="en-US" dirty="0"/>
+          </a:p>
+          <a:p>
+            <a:r>
+              <a:rPr lang="en-US" dirty="0" smtClean="0"/>
+              <a:t>Focus </a:t>
+            </a:r>
+            <a:r>
+              <a:rPr lang="en-US" dirty="0" smtClean="0"/>
+              <a:t>on passwords only and reduce by count.</a:t>
+            </a:r>
+          </a:p>
+          <a:p>
+            <a:endParaRPr lang="en-US" dirty="0"/>
+          </a:p>
+          <a:p>
+            <a:r>
+              <a:rPr lang="en-US" dirty="0" smtClean="0"/>
+              <a:t>Split passwords into ‘alpha-strings’, ‘digit-strings’, ‘special-strings’</a:t>
+            </a:r>
+            <a:r>
+              <a:rPr lang="en-US" dirty="0" smtClean="0"/>
+              <a:t>.</a:t>
+            </a:r>
+          </a:p>
+          <a:p>
+            <a:endParaRPr lang="en-US" dirty="0"/>
+          </a:p>
+          <a:p>
+            <a:endParaRPr lang="en-US" dirty="0" smtClean="0"/>
+          </a:p>
+          <a:p>
+            <a:endParaRPr lang="en-US" dirty="0"/>
+          </a:p>
+          <a:p>
+            <a:pPr marL="0" indent="0">
+              <a:buNone/>
+            </a:pPr>
+            <a:endParaRPr lang="en-US" dirty="0"/>
+          </a:p>
+          <a:p>
+            <a:endParaRPr lang="en-US" dirty="0" smtClean="0"/>
+          </a:p>
+          <a:p>
+            <a:endParaRPr lang="en-US" dirty="0"/>
+          </a:p>
+          <a:p>
+            <a:endParaRPr lang="en-US" dirty="0" smtClean="0"/>
+          </a:p>
+        </p:txBody>
+      </p:sp>
+      <p:sp>
+        <p:nvSpPr>
+          <p:cNvPr id="5" name="Rectangle 4"/>
+          <p:cNvSpPr/>
+          <p:nvPr/>
+        </p:nvSpPr>
+        <p:spPr>
+          <a:xfrm>
+            <a:off x="3276151" y="4227843"/>
+            <a:ext cx="2227045" cy="487721"/>
+          </a:xfrm>
+          <a:prstGeom prst="rect">
+            <a:avLst/>
+          </a:prstGeom>
+          <a:solidFill>
+            <a:srgbClr val="1F5E12"/>
+          </a:solidFill>
+        </p:spPr>
+        <p:style>
+          <a:lnRef idx="1">
+            <a:schemeClr val="accent1"/>
+          </a:lnRef>
+          <a:fillRef idx="3">
+            <a:schemeClr val="accent1"/>
+          </a:fillRef>
+          <a:effectRef idx="2">
+            <a:schemeClr val="accent1"/>
+          </a:effectRef>
+          <a:fontRef idx="minor">
+            <a:schemeClr val="lt1"/>
+          </a:fontRef>
+        </p:style>
+        <p:txBody>
+          <a:bodyPr rtlCol="0" anchor="ctr"/>
+          <a:lstStyle/>
+          <a:p>
+            <a:pPr algn="ctr"/>
+            <a:r>
+              <a:rPr lang="en-US" dirty="0" smtClean="0"/>
+              <a:t>Password123$$A</a:t>
+            </a:r>
+            <a:endParaRPr lang="en-US" dirty="0"/>
+          </a:p>
+        </p:txBody>
+      </p:sp>
+      <p:sp>
+        <p:nvSpPr>
+          <p:cNvPr id="6" name="Rectangle 5"/>
+          <p:cNvSpPr/>
+          <p:nvPr/>
+        </p:nvSpPr>
+        <p:spPr>
+          <a:xfrm>
+            <a:off x="1246407" y="4624100"/>
+            <a:ext cx="1444819" cy="395698"/>
+          </a:xfrm>
+          <a:prstGeom prst="rect">
+            <a:avLst/>
+          </a:prstGeom>
+          <a:solidFill>
+            <a:schemeClr val="tx2">
+              <a:lumMod val="75000"/>
+            </a:schemeClr>
+          </a:solidFill>
+        </p:spPr>
+        <p:style>
+          <a:lnRef idx="1">
+            <a:schemeClr val="accent1"/>
+          </a:lnRef>
+          <a:fillRef idx="3">
+            <a:schemeClr val="accent1"/>
+          </a:fillRef>
+          <a:effectRef idx="2">
+            <a:schemeClr val="accent1"/>
+          </a:effectRef>
+          <a:fontRef idx="minor">
+            <a:schemeClr val="lt1"/>
+          </a:fontRef>
+        </p:style>
+        <p:txBody>
+          <a:bodyPr rtlCol="0" anchor="ctr"/>
+          <a:lstStyle/>
+          <a:p>
+            <a:pPr algn="ctr"/>
+            <a:r>
+              <a:rPr lang="en-US" dirty="0" smtClean="0"/>
+              <a:t>Password</a:t>
+            </a:r>
+            <a:endParaRPr lang="en-US" dirty="0"/>
+          </a:p>
+        </p:txBody>
+      </p:sp>
+      <p:sp>
+        <p:nvSpPr>
+          <p:cNvPr id="7" name="Rectangle 6"/>
+          <p:cNvSpPr/>
+          <p:nvPr/>
+        </p:nvSpPr>
+        <p:spPr>
+          <a:xfrm>
+            <a:off x="2967306" y="5200366"/>
+            <a:ext cx="1233157" cy="395698"/>
+          </a:xfrm>
+          <a:prstGeom prst="rect">
+            <a:avLst/>
+          </a:prstGeom>
+          <a:solidFill>
+            <a:schemeClr val="bg2">
+              <a:lumMod val="25000"/>
+            </a:schemeClr>
+          </a:solidFill>
+        </p:spPr>
+        <p:style>
+          <a:lnRef idx="1">
+            <a:schemeClr val="accent1"/>
+          </a:lnRef>
+          <a:fillRef idx="3">
+            <a:schemeClr val="accent1"/>
+          </a:fillRef>
+          <a:effectRef idx="2">
+            <a:schemeClr val="accent1"/>
+          </a:effectRef>
+          <a:fontRef idx="minor">
+            <a:schemeClr val="lt1"/>
+          </a:fontRef>
+        </p:style>
+        <p:txBody>
+          <a:bodyPr rtlCol="0" anchor="ctr"/>
+          <a:lstStyle/>
+          <a:p>
+            <a:pPr algn="ctr"/>
+            <a:r>
+              <a:rPr lang="en-US" dirty="0" smtClean="0"/>
+              <a:t>123</a:t>
+            </a:r>
+            <a:endParaRPr lang="en-US" dirty="0"/>
+          </a:p>
+        </p:txBody>
+      </p:sp>
+      <p:sp>
+        <p:nvSpPr>
+          <p:cNvPr id="8" name="Rectangle 7"/>
+          <p:cNvSpPr/>
+          <p:nvPr/>
+        </p:nvSpPr>
+        <p:spPr>
+          <a:xfrm>
+            <a:off x="4684159" y="5217647"/>
+            <a:ext cx="1233157" cy="395698"/>
+          </a:xfrm>
+          <a:prstGeom prst="rect">
+            <a:avLst/>
+          </a:prstGeom>
+          <a:solidFill>
+            <a:schemeClr val="accent4">
+              <a:lumMod val="75000"/>
+            </a:schemeClr>
+          </a:solidFill>
+        </p:spPr>
+        <p:style>
+          <a:lnRef idx="1">
+            <a:schemeClr val="accent1"/>
+          </a:lnRef>
+          <a:fillRef idx="3">
+            <a:schemeClr val="accent1"/>
+          </a:fillRef>
+          <a:effectRef idx="2">
+            <a:schemeClr val="accent1"/>
+          </a:effectRef>
+          <a:fontRef idx="minor">
+            <a:schemeClr val="lt1"/>
+          </a:fontRef>
+        </p:style>
+        <p:txBody>
+          <a:bodyPr rtlCol="0" anchor="ctr"/>
+          <a:lstStyle/>
+          <a:p>
+            <a:pPr algn="ctr"/>
+            <a:r>
+              <a:rPr lang="en-US" dirty="0" smtClean="0"/>
+              <a:t>$$</a:t>
+            </a:r>
+            <a:endParaRPr lang="en-US" dirty="0"/>
+          </a:p>
+        </p:txBody>
+      </p:sp>
+      <p:sp>
+        <p:nvSpPr>
+          <p:cNvPr id="9" name="Rectangle 8"/>
+          <p:cNvSpPr/>
+          <p:nvPr/>
+        </p:nvSpPr>
+        <p:spPr>
+          <a:xfrm>
+            <a:off x="6323343" y="4624100"/>
+            <a:ext cx="1233157" cy="395698"/>
+          </a:xfrm>
+          <a:prstGeom prst="rect">
+            <a:avLst/>
+          </a:prstGeom>
+          <a:solidFill>
+            <a:schemeClr val="tx2">
+              <a:lumMod val="75000"/>
+            </a:schemeClr>
+          </a:solidFill>
+        </p:spPr>
+        <p:style>
+          <a:lnRef idx="1">
+            <a:schemeClr val="accent1"/>
+          </a:lnRef>
+          <a:fillRef idx="3">
+            <a:schemeClr val="accent1"/>
+          </a:fillRef>
+          <a:effectRef idx="2">
+            <a:schemeClr val="accent1"/>
+          </a:effectRef>
+          <a:fontRef idx="minor">
+            <a:schemeClr val="lt1"/>
+          </a:fontRef>
+        </p:style>
+        <p:txBody>
+          <a:bodyPr rtlCol="0" anchor="ctr"/>
+          <a:lstStyle/>
+          <a:p>
+            <a:pPr algn="ctr"/>
+            <a:r>
+              <a:rPr lang="en-US" dirty="0"/>
+              <a:t>A</a:t>
+            </a:r>
+          </a:p>
+        </p:txBody>
+      </p:sp>
+      <p:cxnSp>
+        <p:nvCxnSpPr>
+          <p:cNvPr id="11" name="Straight Connector 10"/>
+          <p:cNvCxnSpPr>
+            <a:stCxn id="6" idx="3"/>
+          </p:cNvCxnSpPr>
+          <p:nvPr/>
+        </p:nvCxnSpPr>
+        <p:spPr>
+          <a:xfrm flipV="1">
+            <a:off x="2691226" y="4439492"/>
+            <a:ext cx="584925" cy="382457"/>
+          </a:xfrm>
+          <a:prstGeom prst="line">
+            <a:avLst/>
+          </a:prstGeom>
+        </p:spPr>
+        <p:style>
+          <a:lnRef idx="2">
+            <a:schemeClr val="accent1"/>
+          </a:lnRef>
+          <a:fillRef idx="0">
+            <a:schemeClr val="accent1"/>
+          </a:fillRef>
+          <a:effectRef idx="1">
+            <a:schemeClr val="accent1"/>
+          </a:effectRef>
+          <a:fontRef idx="minor">
+            <a:schemeClr val="tx1"/>
+          </a:fontRef>
+        </p:style>
+      </p:cxnSp>
+      <p:cxnSp>
+        <p:nvCxnSpPr>
+          <p:cNvPr id="12" name="Straight Connector 11"/>
+          <p:cNvCxnSpPr/>
+          <p:nvPr/>
+        </p:nvCxnSpPr>
+        <p:spPr>
+          <a:xfrm flipV="1">
+            <a:off x="3615538" y="4715564"/>
+            <a:ext cx="314001" cy="484803"/>
+          </a:xfrm>
+          <a:prstGeom prst="line">
+            <a:avLst/>
+          </a:prstGeom>
+        </p:spPr>
+        <p:style>
+          <a:lnRef idx="2">
+            <a:schemeClr val="accent1"/>
+          </a:lnRef>
+          <a:fillRef idx="0">
+            <a:schemeClr val="accent1"/>
+          </a:fillRef>
+          <a:effectRef idx="1">
+            <a:schemeClr val="accent1"/>
+          </a:effectRef>
+          <a:fontRef idx="minor">
+            <a:schemeClr val="tx1"/>
+          </a:fontRef>
+        </p:style>
+      </p:cxnSp>
+      <p:cxnSp>
+        <p:nvCxnSpPr>
+          <p:cNvPr id="14" name="Straight Connector 13"/>
+          <p:cNvCxnSpPr/>
+          <p:nvPr/>
+        </p:nvCxnSpPr>
+        <p:spPr>
+          <a:xfrm flipH="1" flipV="1">
+            <a:off x="5057424" y="4715565"/>
+            <a:ext cx="243312" cy="484801"/>
+          </a:xfrm>
+          <a:prstGeom prst="line">
+            <a:avLst/>
+          </a:prstGeom>
+        </p:spPr>
+        <p:style>
+          <a:lnRef idx="2">
+            <a:schemeClr val="accent1"/>
+          </a:lnRef>
+          <a:fillRef idx="0">
+            <a:schemeClr val="accent1"/>
+          </a:fillRef>
+          <a:effectRef idx="1">
+            <a:schemeClr val="accent1"/>
+          </a:effectRef>
+          <a:fontRef idx="minor">
+            <a:schemeClr val="tx1"/>
+          </a:fontRef>
+        </p:style>
+      </p:cxnSp>
+      <p:cxnSp>
+        <p:nvCxnSpPr>
+          <p:cNvPr id="16" name="Straight Connector 15"/>
+          <p:cNvCxnSpPr/>
+          <p:nvPr/>
+        </p:nvCxnSpPr>
+        <p:spPr>
+          <a:xfrm flipH="1" flipV="1">
+            <a:off x="5503196" y="4439493"/>
+            <a:ext cx="820147" cy="382456"/>
+          </a:xfrm>
+          <a:prstGeom prst="line">
+            <a:avLst/>
+          </a:prstGeom>
+        </p:spPr>
+        <p:style>
+          <a:lnRef idx="2">
+            <a:schemeClr val="accent1"/>
+          </a:lnRef>
+          <a:fillRef idx="0">
+            <a:schemeClr val="accent1"/>
+          </a:fillRef>
+          <a:effectRef idx="1">
+            <a:schemeClr val="accent1"/>
+          </a:effectRef>
+          <a:fontRef idx="minor">
+            <a:schemeClr val="tx1"/>
+          </a:fontRef>
+        </p:style>
+      </p:cxnSp>
+    </p:spTree>
+    <p:extLst>
+      <p:ext uri="{BB962C8B-B14F-4D97-AF65-F5344CB8AC3E}">
+        <p14:creationId xmlns:p14="http://schemas.microsoft.com/office/powerpoint/2010/main" val="3580289045"/>
+      </p:ext>
+    </p:extLst>
+  </p:cSld>
+  <p:clrMapOvr>
+    <a:masterClrMapping/>
+  </p:clrMapOvr>
+</p:sld>
+</file>
+
 <file path=ppt/slides/slide9.xml><?xml version="1.0" encoding="utf-8"?>
 <p:sld xmlns:a="http://schemas.openxmlformats.org/drawingml/2006/main" xmlns:r="http://schemas.openxmlformats.org/officeDocument/2006/relationships" xmlns:p="http://schemas.openxmlformats.org/presentationml/2006/main">
   <p:cSld>
@@ -5317,47 +6097,478 @@
         </p:nvSpPr>
         <p:spPr/>
         <p:txBody>
-          <a:bodyPr>
-            <a:normAutofit/>
-          </a:bodyPr>
-          <a:lstStyle/>
+          <a:bodyPr/>
+          <a:lstStyle/>
+          <a:p>
+            <a:r>
+              <a:rPr lang="en-US" dirty="0" smtClean="0"/>
+              <a:t>Dataset and Operations</a:t>
+            </a:r>
+            <a:endParaRPr lang="en-US" dirty="0"/>
+          </a:p>
+        </p:txBody>
+      </p:sp>
+      <p:sp>
+        <p:nvSpPr>
+          <p:cNvPr id="3" name="Content Placeholder 2"/>
+          <p:cNvSpPr>
+            <a:spLocks noGrp="1"/>
+          </p:cNvSpPr>
+          <p:nvPr>
+            <p:ph idx="1"/>
+          </p:nvPr>
+        </p:nvSpPr>
+        <p:spPr/>
+        <p:txBody>
+          <a:bodyPr/>
+          <a:lstStyle/>
+          <a:p>
+            <a:r>
+              <a:rPr lang="en-US" dirty="0" smtClean="0"/>
+              <a:t>1.4 billion username-password pairs </a:t>
+            </a:r>
+            <a:r>
+              <a:rPr lang="en-US" dirty="0" smtClean="0"/>
+              <a:t>in multiple text files.</a:t>
+            </a:r>
+            <a:endParaRPr lang="en-US" dirty="0"/>
+          </a:p>
+          <a:p>
+            <a:pPr marL="0" indent="0">
+              <a:buNone/>
+            </a:pPr>
+            <a:endParaRPr lang="en-US" dirty="0"/>
+          </a:p>
+          <a:p>
+            <a:r>
+              <a:rPr lang="en-US" dirty="0" smtClean="0"/>
+              <a:t>Focus </a:t>
+            </a:r>
+            <a:r>
+              <a:rPr lang="en-US" dirty="0" smtClean="0"/>
+              <a:t>on passwords only and reduce by count.</a:t>
+            </a:r>
+          </a:p>
+          <a:p>
+            <a:endParaRPr lang="en-US" dirty="0"/>
+          </a:p>
+          <a:p>
+            <a:r>
+              <a:rPr lang="en-US" dirty="0" smtClean="0"/>
+              <a:t>Split passwords into ‘alpha-strings’, ‘digit-strings’, ‘special-strings’</a:t>
+            </a:r>
+            <a:r>
+              <a:rPr lang="en-US" dirty="0" smtClean="0"/>
+              <a:t>.</a:t>
+            </a:r>
+          </a:p>
+          <a:p>
+            <a:endParaRPr lang="en-US" dirty="0"/>
+          </a:p>
+          <a:p>
+            <a:endParaRPr lang="en-US" dirty="0" smtClean="0"/>
+          </a:p>
+          <a:p>
+            <a:endParaRPr lang="en-US" dirty="0"/>
+          </a:p>
+          <a:p>
+            <a:endParaRPr lang="en-US" dirty="0" smtClean="0"/>
+          </a:p>
           <a:p>
             <a:r>
               <a:rPr lang="en-US" dirty="0"/>
-              <a:t>References</a:t>
-            </a:r>
-          </a:p>
-        </p:txBody>
-      </p:sp>
-      <p:sp>
-        <p:nvSpPr>
-          <p:cNvPr id="5" name="Content Placeholder 4">
-            <a:extLst>
-              <a:ext uri="{FF2B5EF4-FFF2-40B4-BE49-F238E27FC236}">
-                <a16:creationId xmlns:a16="http://schemas.microsoft.com/office/drawing/2014/main" xmlns="" id="{905301C1-B205-E74E-A1BC-348C940E813B}"/>
-              </a:ext>
-            </a:extLst>
-          </p:cNvPr>
-          <p:cNvSpPr>
-            <a:spLocks noGrp="1"/>
-          </p:cNvSpPr>
-          <p:nvPr>
-            <p:ph idx="1"/>
-          </p:nvPr>
-        </p:nvSpPr>
-        <p:spPr/>
-        <p:txBody>
-          <a:bodyPr/>
-          <a:lstStyle/>
-          <a:p>
-            <a:endParaRPr lang="sv-SE" dirty="0"/>
-          </a:p>
-        </p:txBody>
-      </p:sp>
+              <a:t>P</a:t>
+            </a:r>
+            <a:r>
+              <a:rPr lang="en-US" dirty="0" smtClean="0"/>
+              <a:t>ipeline of map, filter, </a:t>
+            </a:r>
+            <a:r>
+              <a:rPr lang="en-US" dirty="0" err="1" smtClean="0"/>
+              <a:t>flatMap</a:t>
+            </a:r>
+            <a:r>
+              <a:rPr lang="en-US" dirty="0" smtClean="0"/>
+              <a:t>, </a:t>
+            </a:r>
+            <a:r>
+              <a:rPr lang="en-US" dirty="0" smtClean="0"/>
+              <a:t>reduce, sort operations.</a:t>
+            </a:r>
+            <a:endParaRPr lang="en-US" dirty="0" smtClean="0"/>
+          </a:p>
+          <a:p>
+            <a:endParaRPr lang="en-US" dirty="0"/>
+          </a:p>
+          <a:p>
+            <a:endParaRPr lang="en-US" dirty="0" smtClean="0"/>
+          </a:p>
+          <a:p>
+            <a:endParaRPr lang="en-US" dirty="0"/>
+          </a:p>
+          <a:p>
+            <a:endParaRPr lang="en-US" dirty="0" smtClean="0"/>
+          </a:p>
+        </p:txBody>
+      </p:sp>
+      <p:sp>
+        <p:nvSpPr>
+          <p:cNvPr id="5" name="Rectangle 4"/>
+          <p:cNvSpPr/>
+          <p:nvPr/>
+        </p:nvSpPr>
+        <p:spPr>
+          <a:xfrm>
+            <a:off x="3276151" y="4227843"/>
+            <a:ext cx="2227045" cy="487721"/>
+          </a:xfrm>
+          <a:prstGeom prst="rect">
+            <a:avLst/>
+          </a:prstGeom>
+          <a:solidFill>
+            <a:srgbClr val="1F5E12"/>
+          </a:solidFill>
+        </p:spPr>
+        <p:style>
+          <a:lnRef idx="1">
+            <a:schemeClr val="accent1"/>
+          </a:lnRef>
+          <a:fillRef idx="3">
+            <a:schemeClr val="accent1"/>
+          </a:fillRef>
+          <a:effectRef idx="2">
+            <a:schemeClr val="accent1"/>
+          </a:effectRef>
+          <a:fontRef idx="minor">
+            <a:schemeClr val="lt1"/>
+          </a:fontRef>
+        </p:style>
+        <p:txBody>
+          <a:bodyPr rtlCol="0" anchor="ctr"/>
+          <a:lstStyle/>
+          <a:p>
+            <a:pPr algn="ctr"/>
+            <a:r>
+              <a:rPr lang="en-US" dirty="0" smtClean="0"/>
+              <a:t>Password123$$A</a:t>
+            </a:r>
+            <a:endParaRPr lang="en-US" dirty="0"/>
+          </a:p>
+        </p:txBody>
+      </p:sp>
+      <p:sp>
+        <p:nvSpPr>
+          <p:cNvPr id="6" name="Rectangle 5"/>
+          <p:cNvSpPr/>
+          <p:nvPr/>
+        </p:nvSpPr>
+        <p:spPr>
+          <a:xfrm>
+            <a:off x="1246407" y="4624100"/>
+            <a:ext cx="1444819" cy="395698"/>
+          </a:xfrm>
+          <a:prstGeom prst="rect">
+            <a:avLst/>
+          </a:prstGeom>
+          <a:solidFill>
+            <a:schemeClr val="tx2">
+              <a:lumMod val="75000"/>
+            </a:schemeClr>
+          </a:solidFill>
+        </p:spPr>
+        <p:style>
+          <a:lnRef idx="1">
+            <a:schemeClr val="accent1"/>
+          </a:lnRef>
+          <a:fillRef idx="3">
+            <a:schemeClr val="accent1"/>
+          </a:fillRef>
+          <a:effectRef idx="2">
+            <a:schemeClr val="accent1"/>
+          </a:effectRef>
+          <a:fontRef idx="minor">
+            <a:schemeClr val="lt1"/>
+          </a:fontRef>
+        </p:style>
+        <p:txBody>
+          <a:bodyPr rtlCol="0" anchor="ctr"/>
+          <a:lstStyle/>
+          <a:p>
+            <a:pPr algn="ctr"/>
+            <a:r>
+              <a:rPr lang="en-US" dirty="0" smtClean="0"/>
+              <a:t>Password</a:t>
+            </a:r>
+            <a:endParaRPr lang="en-US" dirty="0"/>
+          </a:p>
+        </p:txBody>
+      </p:sp>
+      <p:sp>
+        <p:nvSpPr>
+          <p:cNvPr id="7" name="Rectangle 6"/>
+          <p:cNvSpPr/>
+          <p:nvPr/>
+        </p:nvSpPr>
+        <p:spPr>
+          <a:xfrm>
+            <a:off x="2967306" y="5200366"/>
+            <a:ext cx="1233157" cy="395698"/>
+          </a:xfrm>
+          <a:prstGeom prst="rect">
+            <a:avLst/>
+          </a:prstGeom>
+          <a:solidFill>
+            <a:schemeClr val="bg2">
+              <a:lumMod val="25000"/>
+            </a:schemeClr>
+          </a:solidFill>
+        </p:spPr>
+        <p:style>
+          <a:lnRef idx="1">
+            <a:schemeClr val="accent1"/>
+          </a:lnRef>
+          <a:fillRef idx="3">
+            <a:schemeClr val="accent1"/>
+          </a:fillRef>
+          <a:effectRef idx="2">
+            <a:schemeClr val="accent1"/>
+          </a:effectRef>
+          <a:fontRef idx="minor">
+            <a:schemeClr val="lt1"/>
+          </a:fontRef>
+        </p:style>
+        <p:txBody>
+          <a:bodyPr rtlCol="0" anchor="ctr"/>
+          <a:lstStyle/>
+          <a:p>
+            <a:pPr algn="ctr"/>
+            <a:r>
+              <a:rPr lang="en-US" dirty="0" smtClean="0"/>
+              <a:t>123</a:t>
+            </a:r>
+            <a:endParaRPr lang="en-US" dirty="0"/>
+          </a:p>
+        </p:txBody>
+      </p:sp>
+      <p:sp>
+        <p:nvSpPr>
+          <p:cNvPr id="8" name="Rectangle 7"/>
+          <p:cNvSpPr/>
+          <p:nvPr/>
+        </p:nvSpPr>
+        <p:spPr>
+          <a:xfrm>
+            <a:off x="4684159" y="5217647"/>
+            <a:ext cx="1233157" cy="395698"/>
+          </a:xfrm>
+          <a:prstGeom prst="rect">
+            <a:avLst/>
+          </a:prstGeom>
+          <a:solidFill>
+            <a:schemeClr val="accent4">
+              <a:lumMod val="75000"/>
+            </a:schemeClr>
+          </a:solidFill>
+        </p:spPr>
+        <p:style>
+          <a:lnRef idx="1">
+            <a:schemeClr val="accent1"/>
+          </a:lnRef>
+          <a:fillRef idx="3">
+            <a:schemeClr val="accent1"/>
+          </a:fillRef>
+          <a:effectRef idx="2">
+            <a:schemeClr val="accent1"/>
+          </a:effectRef>
+          <a:fontRef idx="minor">
+            <a:schemeClr val="lt1"/>
+          </a:fontRef>
+        </p:style>
+        <p:txBody>
+          <a:bodyPr rtlCol="0" anchor="ctr"/>
+          <a:lstStyle/>
+          <a:p>
+            <a:pPr algn="ctr"/>
+            <a:r>
+              <a:rPr lang="en-US" dirty="0" smtClean="0"/>
+              <a:t>$$</a:t>
+            </a:r>
+            <a:endParaRPr lang="en-US" dirty="0"/>
+          </a:p>
+        </p:txBody>
+      </p:sp>
+      <p:sp>
+        <p:nvSpPr>
+          <p:cNvPr id="9" name="Rectangle 8"/>
+          <p:cNvSpPr/>
+          <p:nvPr/>
+        </p:nvSpPr>
+        <p:spPr>
+          <a:xfrm>
+            <a:off x="6323343" y="4624100"/>
+            <a:ext cx="1233157" cy="395698"/>
+          </a:xfrm>
+          <a:prstGeom prst="rect">
+            <a:avLst/>
+          </a:prstGeom>
+          <a:solidFill>
+            <a:schemeClr val="tx2">
+              <a:lumMod val="75000"/>
+            </a:schemeClr>
+          </a:solidFill>
+        </p:spPr>
+        <p:style>
+          <a:lnRef idx="1">
+            <a:schemeClr val="accent1"/>
+          </a:lnRef>
+          <a:fillRef idx="3">
+            <a:schemeClr val="accent1"/>
+          </a:fillRef>
+          <a:effectRef idx="2">
+            <a:schemeClr val="accent1"/>
+          </a:effectRef>
+          <a:fontRef idx="minor">
+            <a:schemeClr val="lt1"/>
+          </a:fontRef>
+        </p:style>
+        <p:txBody>
+          <a:bodyPr rtlCol="0" anchor="ctr"/>
+          <a:lstStyle/>
+          <a:p>
+            <a:pPr algn="ctr"/>
+            <a:r>
+              <a:rPr lang="en-US" dirty="0"/>
+              <a:t>A</a:t>
+            </a:r>
+          </a:p>
+        </p:txBody>
+      </p:sp>
+      <p:cxnSp>
+        <p:nvCxnSpPr>
+          <p:cNvPr id="11" name="Straight Connector 10"/>
+          <p:cNvCxnSpPr>
+            <a:stCxn id="6" idx="3"/>
+          </p:cNvCxnSpPr>
+          <p:nvPr/>
+        </p:nvCxnSpPr>
+        <p:spPr>
+          <a:xfrm flipV="1">
+            <a:off x="2691226" y="4439492"/>
+            <a:ext cx="584925" cy="382457"/>
+          </a:xfrm>
+          <a:prstGeom prst="line">
+            <a:avLst/>
+          </a:prstGeom>
+        </p:spPr>
+        <p:style>
+          <a:lnRef idx="2">
+            <a:schemeClr val="accent1"/>
+          </a:lnRef>
+          <a:fillRef idx="0">
+            <a:schemeClr val="accent1"/>
+          </a:fillRef>
+          <a:effectRef idx="1">
+            <a:schemeClr val="accent1"/>
+          </a:effectRef>
+          <a:fontRef idx="minor">
+            <a:schemeClr val="tx1"/>
+          </a:fontRef>
+        </p:style>
+      </p:cxnSp>
+      <p:cxnSp>
+        <p:nvCxnSpPr>
+          <p:cNvPr id="12" name="Straight Connector 11"/>
+          <p:cNvCxnSpPr/>
+          <p:nvPr/>
+        </p:nvCxnSpPr>
+        <p:spPr>
+          <a:xfrm flipV="1">
+            <a:off x="3615538" y="4715564"/>
+            <a:ext cx="314001" cy="484803"/>
+          </a:xfrm>
+          <a:prstGeom prst="line">
+            <a:avLst/>
+          </a:prstGeom>
+        </p:spPr>
+        <p:style>
+          <a:lnRef idx="2">
+            <a:schemeClr val="accent1"/>
+          </a:lnRef>
+          <a:fillRef idx="0">
+            <a:schemeClr val="accent1"/>
+          </a:fillRef>
+          <a:effectRef idx="1">
+            <a:schemeClr val="accent1"/>
+          </a:effectRef>
+          <a:fontRef idx="minor">
+            <a:schemeClr val="tx1"/>
+          </a:fontRef>
+        </p:style>
+      </p:cxnSp>
+      <p:cxnSp>
+        <p:nvCxnSpPr>
+          <p:cNvPr id="14" name="Straight Connector 13"/>
+          <p:cNvCxnSpPr/>
+          <p:nvPr/>
+        </p:nvCxnSpPr>
+        <p:spPr>
+          <a:xfrm flipH="1" flipV="1">
+            <a:off x="5057424" y="4715565"/>
+            <a:ext cx="243312" cy="484801"/>
+          </a:xfrm>
+          <a:prstGeom prst="line">
+            <a:avLst/>
+          </a:prstGeom>
+        </p:spPr>
+        <p:style>
+          <a:lnRef idx="2">
+            <a:schemeClr val="accent1"/>
+          </a:lnRef>
+          <a:fillRef idx="0">
+            <a:schemeClr val="accent1"/>
+          </a:fillRef>
+          <a:effectRef idx="1">
+            <a:schemeClr val="accent1"/>
+          </a:effectRef>
+          <a:fontRef idx="minor">
+            <a:schemeClr val="tx1"/>
+          </a:fontRef>
+        </p:style>
+      </p:cxnSp>
+      <p:cxnSp>
+        <p:nvCxnSpPr>
+          <p:cNvPr id="16" name="Straight Connector 15"/>
+          <p:cNvCxnSpPr/>
+          <p:nvPr/>
+        </p:nvCxnSpPr>
+        <p:spPr>
+          <a:xfrm flipH="1" flipV="1">
+            <a:off x="5503196" y="4439493"/>
+            <a:ext cx="820147" cy="382456"/>
+          </a:xfrm>
+          <a:prstGeom prst="line">
+            <a:avLst/>
+          </a:prstGeom>
+        </p:spPr>
+        <p:style>
+          <a:lnRef idx="2">
+            <a:schemeClr val="accent1"/>
+          </a:lnRef>
+          <a:fillRef idx="0">
+            <a:schemeClr val="accent1"/>
+          </a:fillRef>
+          <a:effectRef idx="1">
+            <a:schemeClr val="accent1"/>
+          </a:effectRef>
+          <a:fontRef idx="minor">
+            <a:schemeClr val="tx1"/>
+          </a:fontRef>
+        </p:style>
+      </p:cxnSp>
     </p:spTree>
     <p:extLst>
       <p:ext uri="{BB962C8B-B14F-4D97-AF65-F5344CB8AC3E}">
-        <p14:creationId xmlns:p14="http://schemas.microsoft.com/office/powerpoint/2010/main" val="3524345119"/>
+        <p14:creationId xmlns:p14="http://schemas.microsoft.com/office/powerpoint/2010/main" val="4197476960"/>
       </p:ext>
     </p:extLst>
   </p:cSld>

</xml_diff>

<commit_message>
Insight into scientific usefulness slide added.
</commit_message>
<xml_diff>
--- a/presentation/group_presentation.pptx
+++ b/presentation/group_presentation.pptx
@@ -3543,6 +3543,13 @@
   <p:clrMapOvr>
     <a:masterClrMapping/>
   </p:clrMapOvr>
+  <p:timing>
+    <p:tnLst>
+      <p:par>
+        <p:cTn xmlns:p14="http://schemas.microsoft.com/office/powerpoint/2010/main" id="1" dur="indefinite" restart="never" nodeType="tmRoot"/>
+      </p:par>
+    </p:tnLst>
+  </p:timing>
 </p:sld>
 </file>
 
@@ -3579,8 +3586,8 @@
           <a:lstStyle/>
           <a:p>
             <a:r>
-              <a:rPr lang="en-US" smtClean="0"/>
-              <a:t>Choice of Study</a:t>
+              <a:rPr lang="en-US" dirty="0" smtClean="0"/>
+              <a:t>Why is this analysis useful?</a:t>
             </a:r>
             <a:endParaRPr lang="en-US" dirty="0"/>
           </a:p>
@@ -3604,263 +3611,256 @@
         </p:nvSpPr>
         <p:spPr/>
         <p:txBody>
-          <a:bodyPr/>
+          <a:bodyPr>
+            <a:normAutofit/>
+          </a:bodyPr>
           <a:lstStyle/>
           <a:p>
             <a:pPr lvl="1"/>
-            <a:r>
-              <a:rPr lang="sv-SE" dirty="0" err="1"/>
-              <a:t>What</a:t>
+            <a:endParaRPr lang="sv-SE" dirty="0" smtClean="0"/>
+          </a:p>
+          <a:p>
+            <a:pPr lvl="1"/>
+            <a:r>
+              <a:rPr lang="sv-SE" dirty="0" smtClean="0"/>
+              <a:t>Weir </a:t>
+            </a:r>
+            <a:r>
+              <a:rPr lang="sv-SE" dirty="0" err="1" smtClean="0"/>
+              <a:t>Probabilistic</a:t>
+            </a:r>
+            <a:r>
+              <a:rPr lang="sv-SE" dirty="0" smtClean="0"/>
+              <a:t> </a:t>
+            </a:r>
+            <a:r>
+              <a:rPr lang="sv-SE" dirty="0" err="1" smtClean="0"/>
+              <a:t>Password</a:t>
+            </a:r>
+            <a:r>
+              <a:rPr lang="sv-SE" dirty="0" smtClean="0"/>
+              <a:t> </a:t>
+            </a:r>
+            <a:r>
+              <a:rPr lang="sv-SE" dirty="0" err="1" smtClean="0"/>
+              <a:t>Cracking</a:t>
+            </a:r>
+            <a:r>
+              <a:rPr lang="sv-SE" dirty="0" smtClean="0"/>
+              <a:t> </a:t>
+            </a:r>
+            <a:r>
+              <a:rPr lang="sv-SE" dirty="0" err="1" smtClean="0"/>
+              <a:t>Algorithm</a:t>
+            </a:r>
+            <a:endParaRPr lang="sv-SE" dirty="0" smtClean="0"/>
+          </a:p>
+          <a:p>
+            <a:pPr lvl="2"/>
+            <a:r>
+              <a:rPr lang="sv-SE" dirty="0" err="1" smtClean="0"/>
+              <a:t>uses</a:t>
+            </a:r>
+            <a:r>
+              <a:rPr lang="sv-SE" dirty="0" smtClean="0"/>
+              <a:t> mangling </a:t>
+            </a:r>
+            <a:r>
+              <a:rPr lang="sv-SE" dirty="0" err="1" smtClean="0"/>
+              <a:t>techniques</a:t>
+            </a:r>
+            <a:r>
+              <a:rPr lang="sv-SE" dirty="0" smtClean="0"/>
+              <a:t> </a:t>
+            </a:r>
+            <a:r>
+              <a:rPr lang="sv-SE" dirty="0" err="1" smtClean="0"/>
+              <a:t>derived</a:t>
+            </a:r>
+            <a:r>
+              <a:rPr lang="sv-SE" dirty="0" smtClean="0"/>
+              <a:t> from ’</a:t>
+            </a:r>
+            <a:r>
+              <a:rPr lang="sv-SE" dirty="0" err="1" smtClean="0"/>
+              <a:t>alpha</a:t>
+            </a:r>
+            <a:r>
+              <a:rPr lang="sv-SE" dirty="0" smtClean="0"/>
+              <a:t>’, ’</a:t>
+            </a:r>
+            <a:r>
+              <a:rPr lang="sv-SE" dirty="0" err="1" smtClean="0"/>
+              <a:t>digit</a:t>
+            </a:r>
+            <a:r>
+              <a:rPr lang="sv-SE" dirty="0" smtClean="0"/>
+              <a:t>’ and ’special’ strings.</a:t>
+            </a:r>
+          </a:p>
+          <a:p>
+            <a:pPr lvl="2"/>
+            <a:endParaRPr lang="sv-SE" dirty="0"/>
+          </a:p>
+          <a:p>
+            <a:pPr lvl="1"/>
+            <a:r>
+              <a:rPr lang="sv-SE" dirty="0" err="1" smtClean="0"/>
+              <a:t>Gain</a:t>
+            </a:r>
+            <a:r>
+              <a:rPr lang="sv-SE" dirty="0" smtClean="0"/>
+              <a:t> </a:t>
+            </a:r>
+            <a:r>
+              <a:rPr lang="sv-SE" dirty="0" err="1" smtClean="0"/>
+              <a:t>understanding</a:t>
+            </a:r>
+            <a:r>
+              <a:rPr lang="sv-SE" dirty="0" smtClean="0"/>
+              <a:t> </a:t>
+            </a:r>
+            <a:r>
+              <a:rPr lang="sv-SE" dirty="0" err="1" smtClean="0"/>
+              <a:t>into</a:t>
+            </a:r>
+            <a:r>
+              <a:rPr lang="sv-SE" dirty="0" smtClean="0"/>
+              <a:t> </a:t>
+            </a:r>
+            <a:r>
+              <a:rPr lang="sv-SE" dirty="0" err="1" smtClean="0"/>
+              <a:t>user</a:t>
+            </a:r>
+            <a:r>
+              <a:rPr lang="sv-SE" dirty="0" smtClean="0"/>
+              <a:t> </a:t>
+            </a:r>
+            <a:r>
+              <a:rPr lang="sv-SE" dirty="0" err="1" smtClean="0"/>
+              <a:t>behaviour</a:t>
+            </a:r>
+            <a:r>
+              <a:rPr lang="sv-SE" dirty="0" smtClean="0"/>
+              <a:t> </a:t>
+            </a:r>
+            <a:r>
+              <a:rPr lang="sv-SE" dirty="0" err="1" smtClean="0"/>
+              <a:t>to</a:t>
+            </a:r>
+            <a:r>
+              <a:rPr lang="sv-SE" dirty="0" smtClean="0"/>
+              <a:t> </a:t>
+            </a:r>
+            <a:r>
+              <a:rPr lang="sv-SE" dirty="0" err="1" smtClean="0"/>
+              <a:t>enforce</a:t>
+            </a:r>
+            <a:r>
+              <a:rPr lang="sv-SE" dirty="0" smtClean="0"/>
+              <a:t> </a:t>
+            </a:r>
+            <a:r>
+              <a:rPr lang="sv-SE" dirty="0" err="1" smtClean="0"/>
+              <a:t>stronger</a:t>
+            </a:r>
+            <a:r>
+              <a:rPr lang="sv-SE" dirty="0" smtClean="0"/>
+              <a:t> </a:t>
+            </a:r>
+            <a:r>
+              <a:rPr lang="sv-SE" dirty="0" err="1" smtClean="0"/>
+              <a:t>security</a:t>
+            </a:r>
+            <a:endParaRPr lang="sv-SE" dirty="0" smtClean="0"/>
+          </a:p>
+          <a:p>
+            <a:pPr lvl="2"/>
+            <a:endParaRPr lang="sv-SE" dirty="0"/>
+          </a:p>
+          <a:p>
+            <a:pPr lvl="1"/>
+            <a:r>
+              <a:rPr lang="sv-SE" dirty="0" err="1" smtClean="0"/>
+              <a:t>Demonstrates</a:t>
             </a:r>
             <a:r>
               <a:rPr lang="sv-SE" dirty="0"/>
               <a:t> </a:t>
             </a:r>
             <a:r>
-              <a:rPr lang="sv-SE" dirty="0" err="1"/>
-              <a:t>analysis</a:t>
-            </a:r>
-            <a:r>
-              <a:rPr lang="sv-SE" dirty="0"/>
+              <a:rPr lang="sv-SE" dirty="0" err="1" smtClean="0"/>
+              <a:t>how</a:t>
+            </a:r>
+            <a:r>
+              <a:rPr lang="sv-SE" dirty="0" smtClean="0"/>
               <a:t> </a:t>
             </a:r>
             <a:r>
-              <a:rPr lang="sv-SE" dirty="0" err="1"/>
-              <a:t>have</a:t>
-            </a:r>
-            <a:r>
-              <a:rPr lang="sv-SE" dirty="0"/>
+              <a:rPr lang="sv-SE" dirty="0" err="1" smtClean="0"/>
+              <a:t>to</a:t>
+            </a:r>
+            <a:r>
+              <a:rPr lang="sv-SE" dirty="0" smtClean="0"/>
               <a:t> </a:t>
             </a:r>
             <a:r>
-              <a:rPr lang="sv-SE" dirty="0" err="1"/>
-              <a:t>others</a:t>
-            </a:r>
-            <a:r>
-              <a:rPr lang="sv-SE" dirty="0"/>
+              <a:rPr lang="sv-SE" dirty="0" err="1" smtClean="0"/>
+              <a:t>utilise</a:t>
+            </a:r>
+            <a:r>
+              <a:rPr lang="sv-SE" dirty="0" smtClean="0"/>
               <a:t> </a:t>
             </a:r>
             <a:r>
-              <a:rPr lang="sv-SE" dirty="0" err="1"/>
-              <a:t>done</a:t>
-            </a:r>
-            <a:r>
-              <a:rPr lang="sv-SE" dirty="0"/>
-              <a:t> on the </a:t>
-            </a:r>
-            <a:r>
-              <a:rPr lang="sv-SE" dirty="0" err="1"/>
+              <a:rPr lang="sv-SE" dirty="0" err="1" smtClean="0"/>
+              <a:t>this</a:t>
+            </a:r>
+            <a:r>
+              <a:rPr lang="sv-SE" dirty="0" smtClean="0"/>
+              <a:t> </a:t>
+            </a:r>
+            <a:r>
+              <a:rPr lang="sv-SE" dirty="0" err="1" smtClean="0"/>
+              <a:t>rich</a:t>
+            </a:r>
+            <a:r>
+              <a:rPr lang="sv-SE" dirty="0" smtClean="0"/>
+              <a:t> </a:t>
+            </a:r>
+            <a:r>
+              <a:rPr lang="sv-SE" dirty="0" err="1" smtClean="0"/>
               <a:t>dataset</a:t>
             </a:r>
-            <a:r>
-              <a:rPr lang="sv-SE" dirty="0"/>
-              <a:t>?</a:t>
-            </a:r>
-          </a:p>
-          <a:p>
-            <a:pPr lvl="1"/>
-            <a:r>
-              <a:rPr lang="sv-SE" dirty="0" err="1"/>
-              <a:t>What</a:t>
-            </a:r>
-            <a:r>
-              <a:rPr lang="sv-SE" dirty="0"/>
-              <a:t> </a:t>
-            </a:r>
-            <a:r>
-              <a:rPr lang="sv-SE" dirty="0" err="1"/>
-              <a:t>questions</a:t>
-            </a:r>
-            <a:r>
-              <a:rPr lang="sv-SE" dirty="0"/>
-              <a:t> </a:t>
-            </a:r>
-            <a:r>
-              <a:rPr lang="sv-SE" dirty="0" err="1"/>
-              <a:t>are</a:t>
-            </a:r>
-            <a:r>
-              <a:rPr lang="sv-SE" dirty="0"/>
-              <a:t> </a:t>
-            </a:r>
-            <a:r>
-              <a:rPr lang="sv-SE" dirty="0" err="1"/>
-              <a:t>interesting</a:t>
-            </a:r>
-            <a:r>
-              <a:rPr lang="sv-SE" dirty="0"/>
-              <a:t>?</a:t>
-            </a:r>
-          </a:p>
-          <a:p>
-            <a:pPr marL="274320" lvl="1" indent="0">
-              <a:buNone/>
-            </a:pPr>
-            <a:endParaRPr lang="sv-SE" dirty="0"/>
-          </a:p>
-          <a:p>
-            <a:pPr marL="274320" lvl="1" indent="0">
-              <a:buNone/>
-            </a:pPr>
-            <a:r>
-              <a:rPr lang="sv-SE" dirty="0" err="1"/>
-              <a:t>Previous</a:t>
-            </a:r>
-            <a:r>
-              <a:rPr lang="sv-SE" dirty="0"/>
-              <a:t> research:</a:t>
-            </a:r>
-          </a:p>
-          <a:p>
-            <a:pPr lvl="1"/>
-            <a:r>
-              <a:rPr lang="sv-SE" dirty="0" err="1"/>
-              <a:t>Reverse</a:t>
-            </a:r>
-            <a:r>
-              <a:rPr lang="sv-SE" dirty="0"/>
-              <a:t> </a:t>
-            </a:r>
-            <a:r>
-              <a:rPr lang="sv-SE" dirty="0" err="1"/>
-              <a:t>engineer</a:t>
-            </a:r>
-            <a:r>
-              <a:rPr lang="sv-SE" dirty="0"/>
-              <a:t> site </a:t>
-            </a:r>
-            <a:r>
-              <a:rPr lang="sv-SE" dirty="0" err="1"/>
-              <a:t>security</a:t>
-            </a:r>
-            <a:r>
-              <a:rPr lang="sv-SE" dirty="0"/>
-              <a:t> </a:t>
-            </a:r>
-            <a:r>
-              <a:rPr lang="sv-SE" dirty="0" err="1"/>
-              <a:t>practices</a:t>
-            </a:r>
-            <a:endParaRPr lang="sv-SE" dirty="0"/>
-          </a:p>
-          <a:p>
-            <a:pPr lvl="1"/>
-            <a:r>
-              <a:rPr lang="sv-SE" dirty="0" err="1"/>
-              <a:t>Understanding</a:t>
-            </a:r>
-            <a:r>
-              <a:rPr lang="sv-SE" dirty="0"/>
-              <a:t> </a:t>
-            </a:r>
-            <a:r>
-              <a:rPr lang="sv-SE" dirty="0" err="1"/>
-              <a:t>user</a:t>
-            </a:r>
-            <a:r>
-              <a:rPr lang="sv-SE" dirty="0"/>
-              <a:t> </a:t>
-            </a:r>
-            <a:r>
-              <a:rPr lang="sv-SE" dirty="0" err="1"/>
-              <a:t>behaviour</a:t>
-            </a:r>
-            <a:endParaRPr lang="sv-SE" dirty="0"/>
+            <a:endParaRPr lang="sv-SE" dirty="0" smtClean="0"/>
           </a:p>
           <a:p>
             <a:pPr lvl="2"/>
             <a:r>
-              <a:rPr lang="sv-SE" dirty="0" err="1"/>
+              <a:rPr lang="sv-SE" dirty="0" smtClean="0"/>
+              <a:t>Regional </a:t>
+            </a:r>
+            <a:r>
+              <a:rPr lang="sv-SE" dirty="0" err="1" smtClean="0"/>
+              <a:t>differences</a:t>
+            </a:r>
+            <a:endParaRPr lang="sv-SE" dirty="0" smtClean="0"/>
+          </a:p>
+          <a:p>
+            <a:pPr lvl="2"/>
+            <a:r>
+              <a:rPr lang="sv-SE" dirty="0" err="1" smtClean="0"/>
               <a:t>Password</a:t>
             </a:r>
             <a:r>
-              <a:rPr lang="sv-SE" dirty="0"/>
-              <a:t> </a:t>
-            </a:r>
-            <a:r>
-              <a:rPr lang="sv-SE" dirty="0" err="1"/>
-              <a:t>reuse</a:t>
-            </a:r>
-            <a:endParaRPr lang="sv-SE" dirty="0"/>
-          </a:p>
-          <a:p>
-            <a:pPr lvl="2"/>
-            <a:r>
-              <a:rPr lang="sv-SE" dirty="0" err="1"/>
-              <a:t>Patterns</a:t>
-            </a:r>
-            <a:r>
-              <a:rPr lang="sv-SE" dirty="0"/>
-              <a:t>, variations, and </a:t>
-            </a:r>
-            <a:r>
-              <a:rPr lang="sv-SE" dirty="0" err="1"/>
-              <a:t>password</a:t>
-            </a:r>
-            <a:r>
-              <a:rPr lang="sv-SE" dirty="0"/>
-              <a:t> </a:t>
-            </a:r>
-            <a:r>
-              <a:rPr lang="sv-SE" dirty="0" err="1"/>
-              <a:t>history</a:t>
-            </a:r>
-            <a:endParaRPr lang="sv-SE" dirty="0"/>
-          </a:p>
-          <a:p>
-            <a:pPr lvl="2"/>
-            <a:r>
-              <a:rPr lang="sv-SE" dirty="0"/>
-              <a:t>Regional </a:t>
-            </a:r>
-            <a:r>
-              <a:rPr lang="sv-SE" dirty="0" err="1"/>
-              <a:t>differences</a:t>
-            </a:r>
-            <a:endParaRPr lang="sv-SE" dirty="0"/>
-          </a:p>
-          <a:p>
-            <a:pPr lvl="1"/>
-            <a:r>
-              <a:rPr lang="sv-SE" dirty="0" err="1"/>
-              <a:t>Training</a:t>
-            </a:r>
-            <a:r>
-              <a:rPr lang="sv-SE" dirty="0"/>
-              <a:t> neural </a:t>
-            </a:r>
-            <a:r>
-              <a:rPr lang="sv-SE" dirty="0" err="1"/>
-              <a:t>networks</a:t>
-            </a:r>
-            <a:r>
-              <a:rPr lang="sv-SE" dirty="0"/>
-              <a:t> to </a:t>
-            </a:r>
-            <a:r>
-              <a:rPr lang="sv-SE" dirty="0" err="1"/>
-              <a:t>evaluate</a:t>
-            </a:r>
-            <a:r>
-              <a:rPr lang="sv-SE" dirty="0"/>
-              <a:t> </a:t>
-            </a:r>
-            <a:r>
-              <a:rPr lang="sv-SE" dirty="0" err="1"/>
-              <a:t>password</a:t>
-            </a:r>
-            <a:r>
-              <a:rPr lang="sv-SE" dirty="0"/>
-              <a:t> </a:t>
-            </a:r>
-            <a:r>
-              <a:rPr lang="sv-SE" dirty="0" err="1"/>
-              <a:t>security</a:t>
-            </a:r>
-            <a:r>
-              <a:rPr lang="sv-SE" dirty="0"/>
-              <a:t> (!)</a:t>
-            </a:r>
+              <a:rPr lang="sv-SE" dirty="0" smtClean="0"/>
+              <a:t> policy </a:t>
+            </a:r>
+            <a:r>
+              <a:rPr lang="sv-SE" dirty="0" err="1" smtClean="0"/>
+              <a:t>effectiveness</a:t>
+            </a:r>
+            <a:endParaRPr lang="sv-SE" dirty="0" smtClean="0"/>
           </a:p>
         </p:txBody>
       </p:sp>
@@ -3874,6 +3874,13 @@
   <p:clrMapOvr>
     <a:masterClrMapping/>
   </p:clrMapOvr>
+  <p:timing>
+    <p:tnLst>
+      <p:par>
+        <p:cTn xmlns:p14="http://schemas.microsoft.com/office/powerpoint/2010/main" id="1" dur="indefinite" restart="never" nodeType="tmRoot"/>
+      </p:par>
+    </p:tnLst>
+  </p:timing>
 </p:sld>
 </file>
 
@@ -4152,6 +4159,13 @@
   <p:clrMapOvr>
     <a:masterClrMapping/>
   </p:clrMapOvr>
+  <p:timing>
+    <p:tnLst>
+      <p:par>
+        <p:cTn xmlns:p14="http://schemas.microsoft.com/office/powerpoint/2010/main" id="1" dur="indefinite" restart="never" nodeType="tmRoot"/>
+      </p:par>
+    </p:tnLst>
+  </p:timing>
 </p:sld>
 </file>
 
@@ -4426,6 +4440,13 @@
   <p:clrMapOvr>
     <a:masterClrMapping/>
   </p:clrMapOvr>
+  <p:timing>
+    <p:tnLst>
+      <p:par>
+        <p:cTn xmlns:p14="http://schemas.microsoft.com/office/powerpoint/2010/main" id="1" dur="indefinite" restart="never" nodeType="tmRoot"/>
+      </p:par>
+    </p:tnLst>
+  </p:timing>
 </p:sld>
 </file>
 
@@ -4607,6 +4628,13 @@
   <p:clrMapOvr>
     <a:masterClrMapping/>
   </p:clrMapOvr>
+  <p:timing>
+    <p:tnLst>
+      <p:par>
+        <p:cTn xmlns:p14="http://schemas.microsoft.com/office/powerpoint/2010/main" id="1" dur="indefinite" restart="never" nodeType="tmRoot"/>
+      </p:par>
+    </p:tnLst>
+  </p:timing>
 </p:sld>
 </file>
 
@@ -4853,6 +4881,13 @@
   <p:clrMapOvr>
     <a:masterClrMapping/>
   </p:clrMapOvr>
+  <p:timing>
+    <p:tnLst>
+      <p:par>
+        <p:cTn xmlns:p14="http://schemas.microsoft.com/office/powerpoint/2010/main" id="1" dur="indefinite" restart="never" nodeType="tmRoot"/>
+      </p:par>
+    </p:tnLst>
+  </p:timing>
 </p:sld>
 </file>
 
@@ -5282,6 +5317,13 @@
   <p:clrMapOvr>
     <a:masterClrMapping/>
   </p:clrMapOvr>
+  <p:timing>
+    <p:tnLst>
+      <p:par>
+        <p:cTn xmlns:p14="http://schemas.microsoft.com/office/powerpoint/2010/main" id="1" dur="indefinite" restart="never" nodeType="tmRoot"/>
+      </p:par>
+    </p:tnLst>
+  </p:timing>
 </p:sld>
 </file>
 
@@ -5369,6 +5411,13 @@
   <p:clrMapOvr>
     <a:masterClrMapping/>
   </p:clrMapOvr>
+  <p:timing>
+    <p:tnLst>
+      <p:par>
+        <p:cTn xmlns:p14="http://schemas.microsoft.com/office/powerpoint/2010/main" id="1" dur="indefinite" restart="never" nodeType="tmRoot"/>
+      </p:par>
+    </p:tnLst>
+  </p:timing>
 </p:sld>
 </file>
 
@@ -5467,6 +5516,13 @@
   <p:clrMapOvr>
     <a:masterClrMapping/>
   </p:clrMapOvr>
+  <p:timing>
+    <p:tnLst>
+      <p:par>
+        <p:cTn xmlns:p14="http://schemas.microsoft.com/office/powerpoint/2010/main" id="1" dur="indefinite" restart="never" nodeType="tmRoot"/>
+      </p:par>
+    </p:tnLst>
+  </p:timing>
 </p:sld>
 </file>
 
@@ -5578,6 +5634,13 @@
   <p:clrMapOvr>
     <a:masterClrMapping/>
   </p:clrMapOvr>
+  <p:timing>
+    <p:tnLst>
+      <p:par>
+        <p:cTn xmlns:p14="http://schemas.microsoft.com/office/powerpoint/2010/main" id="1" dur="indefinite" restart="never" nodeType="tmRoot"/>
+      </p:par>
+    </p:tnLst>
+  </p:timing>
 </p:sld>
 </file>
 
@@ -6065,6 +6128,13 @@
   <p:clrMapOvr>
     <a:masterClrMapping/>
   </p:clrMapOvr>
+  <p:timing>
+    <p:tnLst>
+      <p:par>
+        <p:cTn xmlns:p14="http://schemas.microsoft.com/office/powerpoint/2010/main" id="1" dur="indefinite" restart="never" nodeType="tmRoot"/>
+      </p:par>
+    </p:tnLst>
+  </p:timing>
 </p:sld>
 </file>
 
@@ -6575,6 +6645,13 @@
   <p:clrMapOvr>
     <a:masterClrMapping/>
   </p:clrMapOvr>
+  <p:timing>
+    <p:tnLst>
+      <p:par>
+        <p:cTn xmlns:p14="http://schemas.microsoft.com/office/powerpoint/2010/main" id="1" dur="indefinite" restart="never" nodeType="tmRoot"/>
+      </p:par>
+    </p:tnLst>
+  </p:timing>
 </p:sld>
 </file>
 

</xml_diff>